<commit_message>
Added more slides and content to each slide
</commit_message>
<xml_diff>
--- a/IMT4904_Msc_Presentation.pptx
+++ b/IMT4904_Msc_Presentation.pptx
@@ -5,17 +5,19 @@
     <p:sldMasterId id="2147483648" r:id="rId1"/>
   </p:sldMasterIdLst>
   <p:notesMasterIdLst>
-    <p:notesMasterId r:id="rId10"/>
+    <p:notesMasterId r:id="rId12"/>
   </p:notesMasterIdLst>
   <p:sldIdLst>
     <p:sldId id="256" r:id="rId2"/>
     <p:sldId id="259" r:id="rId3"/>
-    <p:sldId id="260" r:id="rId4"/>
-    <p:sldId id="263" r:id="rId5"/>
-    <p:sldId id="264" r:id="rId6"/>
-    <p:sldId id="262" r:id="rId7"/>
-    <p:sldId id="265" r:id="rId8"/>
-    <p:sldId id="261" r:id="rId9"/>
+    <p:sldId id="263" r:id="rId4"/>
+    <p:sldId id="267" r:id="rId5"/>
+    <p:sldId id="268" r:id="rId6"/>
+    <p:sldId id="264" r:id="rId7"/>
+    <p:sldId id="262" r:id="rId8"/>
+    <p:sldId id="265" r:id="rId9"/>
+    <p:sldId id="266" r:id="rId10"/>
+    <p:sldId id="261" r:id="rId11"/>
   </p:sldIdLst>
   <p:sldSz cx="9144000" cy="6858000" type="screen4x3"/>
   <p:notesSz cx="6858000" cy="9144000"/>
@@ -200,7 +202,7 @@
             <a:fld id="{423E070F-056A-EF46-8F28-B603D057C661}" type="datetimeFigureOut">
               <a:rPr lang="nb-NO" smtClean="0"/>
               <a:pPr/>
-              <a:t>31.05.2016</a:t>
+              <a:t>02.06.2016</a:t>
             </a:fld>
             <a:endParaRPr lang="nb-NO"/>
           </a:p>
@@ -369,7 +371,7 @@
     </p:spTree>
     <p:extLst>
       <p:ext uri="{BB962C8B-B14F-4D97-AF65-F5344CB8AC3E}">
-        <p14:creationId xmlns:p14="http://schemas.microsoft.com/office/powerpoint/2010/main" xmlns="" val="3760678024"/>
+        <p14:creationId xmlns="" xmlns:p14="http://schemas.microsoft.com/office/powerpoint/2010/main" val="3760678024"/>
       </p:ext>
     </p:extLst>
   </p:cSld>
@@ -636,7 +638,7 @@
     </p:spTree>
     <p:extLst>
       <p:ext uri="{BB962C8B-B14F-4D97-AF65-F5344CB8AC3E}">
-        <p14:creationId xmlns:p14="http://schemas.microsoft.com/office/powerpoint/2010/main" xmlns="" val="1000159590"/>
+        <p14:creationId xmlns="" xmlns:p14="http://schemas.microsoft.com/office/powerpoint/2010/main" val="1000159590"/>
       </p:ext>
     </p:extLst>
   </p:cSld>
@@ -741,7 +743,7 @@
     </p:spTree>
     <p:extLst>
       <p:ext uri="{BB962C8B-B14F-4D97-AF65-F5344CB8AC3E}">
-        <p14:creationId xmlns:p14="http://schemas.microsoft.com/office/powerpoint/2010/main" xmlns="" val="1983850659"/>
+        <p14:creationId xmlns="" xmlns:p14="http://schemas.microsoft.com/office/powerpoint/2010/main" val="1983850659"/>
       </p:ext>
     </p:extLst>
   </p:cSld>
@@ -856,7 +858,7 @@
     </p:spTree>
     <p:extLst>
       <p:ext uri="{BB962C8B-B14F-4D97-AF65-F5344CB8AC3E}">
-        <p14:creationId xmlns:p14="http://schemas.microsoft.com/office/powerpoint/2010/main" xmlns="" val="3031831969"/>
+        <p14:creationId xmlns="" xmlns:p14="http://schemas.microsoft.com/office/powerpoint/2010/main" val="3031831969"/>
       </p:ext>
     </p:extLst>
   </p:cSld>
@@ -1098,7 +1100,7 @@
     </p:spTree>
     <p:extLst>
       <p:ext uri="{BB962C8B-B14F-4D97-AF65-F5344CB8AC3E}">
-        <p14:creationId xmlns:p14="http://schemas.microsoft.com/office/powerpoint/2010/main" xmlns="" val="2060019826"/>
+        <p14:creationId xmlns="" xmlns:p14="http://schemas.microsoft.com/office/powerpoint/2010/main" val="2060019826"/>
       </p:ext>
     </p:extLst>
   </p:cSld>
@@ -1322,7 +1324,7 @@
     </p:spTree>
     <p:extLst>
       <p:ext uri="{BB962C8B-B14F-4D97-AF65-F5344CB8AC3E}">
-        <p14:creationId xmlns:p14="http://schemas.microsoft.com/office/powerpoint/2010/main" xmlns="" val="2982460490"/>
+        <p14:creationId xmlns="" xmlns:p14="http://schemas.microsoft.com/office/powerpoint/2010/main" val="2982460490"/>
       </p:ext>
     </p:extLst>
   </p:cSld>
@@ -1545,7 +1547,7 @@
     </p:spTree>
     <p:extLst>
       <p:ext uri="{BB962C8B-B14F-4D97-AF65-F5344CB8AC3E}">
-        <p14:creationId xmlns:p14="http://schemas.microsoft.com/office/powerpoint/2010/main" xmlns="" val="1372914248"/>
+        <p14:creationId xmlns="" xmlns:p14="http://schemas.microsoft.com/office/powerpoint/2010/main" val="1372914248"/>
       </p:ext>
     </p:extLst>
   </p:cSld>
@@ -1902,7 +1904,7 @@
     </p:spTree>
     <p:extLst>
       <p:ext uri="{BB962C8B-B14F-4D97-AF65-F5344CB8AC3E}">
-        <p14:creationId xmlns:p14="http://schemas.microsoft.com/office/powerpoint/2010/main" xmlns="" val="702236646"/>
+        <p14:creationId xmlns="" xmlns:p14="http://schemas.microsoft.com/office/powerpoint/2010/main" val="702236646"/>
       </p:ext>
     </p:extLst>
   </p:cSld>
@@ -1955,7 +1957,7 @@
     </p:spTree>
     <p:extLst>
       <p:ext uri="{BB962C8B-B14F-4D97-AF65-F5344CB8AC3E}">
-        <p14:creationId xmlns:p14="http://schemas.microsoft.com/office/powerpoint/2010/main" xmlns="" val="3172249624"/>
+        <p14:creationId xmlns="" xmlns:p14="http://schemas.microsoft.com/office/powerpoint/2010/main" val="3172249624"/>
       </p:ext>
     </p:extLst>
   </p:cSld>
@@ -1985,7 +1987,7 @@
     </p:spTree>
     <p:extLst>
       <p:ext uri="{BB962C8B-B14F-4D97-AF65-F5344CB8AC3E}">
-        <p14:creationId xmlns:p14="http://schemas.microsoft.com/office/powerpoint/2010/main" xmlns="" val="1649718507"/>
+        <p14:creationId xmlns="" xmlns:p14="http://schemas.microsoft.com/office/powerpoint/2010/main" val="1649718507"/>
       </p:ext>
     </p:extLst>
   </p:cSld>
@@ -2197,7 +2199,7 @@
     </p:spTree>
     <p:extLst>
       <p:ext uri="{BB962C8B-B14F-4D97-AF65-F5344CB8AC3E}">
-        <p14:creationId xmlns:p14="http://schemas.microsoft.com/office/powerpoint/2010/main" xmlns="" val="1596486207"/>
+        <p14:creationId xmlns="" xmlns:p14="http://schemas.microsoft.com/office/powerpoint/2010/main" val="1596486207"/>
       </p:ext>
     </p:extLst>
   </p:cSld>
@@ -2385,7 +2387,7 @@
     </p:spTree>
     <p:extLst>
       <p:ext uri="{BB962C8B-B14F-4D97-AF65-F5344CB8AC3E}">
-        <p14:creationId xmlns:p14="http://schemas.microsoft.com/office/powerpoint/2010/main" xmlns="" val="3532236857"/>
+        <p14:creationId xmlns="" xmlns:p14="http://schemas.microsoft.com/office/powerpoint/2010/main" val="3532236857"/>
       </p:ext>
     </p:extLst>
   </p:cSld>
@@ -2524,7 +2526,7 @@
           <a:blip r:embed="rId13">
             <a:extLst>
               <a:ext uri="{28A0092B-C50C-407E-A947-70E740481C1C}">
-                <a14:useLocalDpi xmlns:a14="http://schemas.microsoft.com/office/drawing/2010/main" xmlns="" val="0"/>
+                <a14:useLocalDpi xmlns="" xmlns:a14="http://schemas.microsoft.com/office/drawing/2010/main" val="0"/>
               </a:ext>
             </a:extLst>
           </a:blip>
@@ -2545,7 +2547,7 @@
     </p:spTree>
     <p:extLst>
       <p:ext uri="{BB962C8B-B14F-4D97-AF65-F5344CB8AC3E}">
-        <p14:creationId xmlns:p14="http://schemas.microsoft.com/office/powerpoint/2010/main" xmlns="" val="5777989"/>
+        <p14:creationId xmlns="" xmlns:p14="http://schemas.microsoft.com/office/powerpoint/2010/main" val="5777989"/>
       </p:ext>
     </p:extLst>
   </p:cSld>
@@ -2856,64 +2858,8 @@
           <a:lstStyle/>
           <a:p>
             <a:r>
-              <a:rPr lang="nb-NO" dirty="0" err="1" smtClean="0"/>
-              <a:t>Question</a:t>
-            </a:r>
-            <a:r>
-              <a:rPr lang="nb-NO" dirty="0" smtClean="0"/>
-              <a:t> </a:t>
-            </a:r>
-            <a:r>
-              <a:rPr lang="nb-NO" dirty="0" err="1" smtClean="0"/>
-              <a:t>analysis</a:t>
-            </a:r>
-            <a:r>
-              <a:rPr lang="nb-NO" dirty="0" smtClean="0"/>
-              <a:t> </a:t>
-            </a:r>
-            <a:r>
-              <a:rPr lang="nb-NO" dirty="0" err="1" smtClean="0"/>
-              <a:t>of</a:t>
-            </a:r>
-            <a:r>
-              <a:rPr lang="nb-NO" dirty="0" smtClean="0"/>
-              <a:t> </a:t>
-            </a:r>
-            <a:r>
-              <a:rPr lang="nb-NO" dirty="0" err="1" smtClean="0"/>
-              <a:t>programming</a:t>
-            </a:r>
-            <a:r>
-              <a:rPr lang="nb-NO" dirty="0" smtClean="0"/>
-              <a:t> </a:t>
-            </a:r>
-            <a:r>
-              <a:rPr lang="nb-NO" dirty="0" err="1" smtClean="0"/>
-              <a:t>questions</a:t>
-            </a:r>
-            <a:r>
-              <a:rPr lang="nb-NO" dirty="0" smtClean="0"/>
-              <a:t> </a:t>
-            </a:r>
-            <a:r>
-              <a:rPr lang="nb-NO" dirty="0" err="1" smtClean="0"/>
-              <a:t>on</a:t>
-            </a:r>
-            <a:r>
-              <a:rPr lang="nb-NO" dirty="0" smtClean="0"/>
-              <a:t> </a:t>
-            </a:r>
-            <a:r>
-              <a:rPr lang="nb-NO" dirty="0" err="1" smtClean="0"/>
-              <a:t>Stack</a:t>
-            </a:r>
-            <a:r>
-              <a:rPr lang="nb-NO" dirty="0" smtClean="0"/>
-              <a:t> </a:t>
-            </a:r>
-            <a:r>
-              <a:rPr lang="nb-NO" dirty="0" err="1" smtClean="0"/>
-              <a:t>Overflow</a:t>
+              <a:rPr lang="en-GB" dirty="0" smtClean="0"/>
+              <a:t>Predicting coding question quality using Stack Overflow ratings</a:t>
             </a:r>
             <a:endParaRPr lang="nb-NO" dirty="0"/>
           </a:p>
@@ -2952,10 +2898,6 @@
             <a:r>
               <a:rPr lang="nb-NO" sz="2300" dirty="0" smtClean="0"/>
               <a:t> – Spring 2016</a:t>
-            </a:r>
-            <a:r>
-              <a:rPr lang="nb-NO" sz="2300" dirty="0" smtClean="0"/>
-              <a:t/>
             </a:r>
             <a:br>
               <a:rPr lang="nb-NO" sz="2300" dirty="0" smtClean="0"/>
@@ -3022,7 +2964,118 @@
     </p:spTree>
     <p:extLst>
       <p:ext uri="{BB962C8B-B14F-4D97-AF65-F5344CB8AC3E}">
-        <p14:creationId xmlns:p14="http://schemas.microsoft.com/office/powerpoint/2010/main" xmlns="" val="3243102052"/>
+        <p14:creationId xmlns="" xmlns:p14="http://schemas.microsoft.com/office/powerpoint/2010/main" val="3243102052"/>
+      </p:ext>
+    </p:extLst>
+  </p:cSld>
+  <p:clrMapOvr>
+    <a:masterClrMapping/>
+  </p:clrMapOvr>
+  <p:timing>
+    <p:tnLst>
+      <p:par>
+        <p:cTn id="1" dur="indefinite" restart="never" nodeType="tmRoot"/>
+      </p:par>
+    </p:tnLst>
+  </p:timing>
+</p:sld>
+</file>
+
+<file path=ppt/slides/slide10.xml><?xml version="1.0" encoding="utf-8"?>
+<p:sld xmlns:a="http://schemas.openxmlformats.org/drawingml/2006/main" xmlns:r="http://schemas.openxmlformats.org/officeDocument/2006/relationships" xmlns:p="http://schemas.openxmlformats.org/presentationml/2006/main">
+  <p:cSld>
+    <p:spTree>
+      <p:nvGrpSpPr>
+        <p:cNvPr id="1" name=""/>
+        <p:cNvGrpSpPr/>
+        <p:nvPr/>
+      </p:nvGrpSpPr>
+      <p:grpSpPr>
+        <a:xfrm>
+          <a:off x="0" y="0"/>
+          <a:ext cx="0" cy="0"/>
+          <a:chOff x="0" y="0"/>
+          <a:chExt cx="0" cy="0"/>
+        </a:xfrm>
+      </p:grpSpPr>
+      <p:sp>
+        <p:nvSpPr>
+          <p:cNvPr id="2" name="Tittel 1"/>
+          <p:cNvSpPr>
+            <a:spLocks noGrp="1"/>
+          </p:cNvSpPr>
+          <p:nvPr>
+            <p:ph type="title"/>
+          </p:nvPr>
+        </p:nvSpPr>
+        <p:spPr>
+          <a:xfrm>
+            <a:off x="457200" y="2022990"/>
+            <a:ext cx="8229600" cy="1143000"/>
+          </a:xfrm>
+        </p:spPr>
+        <p:txBody>
+          <a:bodyPr/>
+          <a:lstStyle/>
+          <a:p>
+            <a:pPr algn="ctr"/>
+            <a:r>
+              <a:rPr lang="nb-NO" dirty="0" err="1" smtClean="0"/>
+              <a:t>Thanks</a:t>
+            </a:r>
+            <a:r>
+              <a:rPr lang="nb-NO" dirty="0" smtClean="0"/>
+              <a:t> for </a:t>
+            </a:r>
+            <a:r>
+              <a:rPr lang="nb-NO" dirty="0" err="1" smtClean="0"/>
+              <a:t>listening</a:t>
+            </a:r>
+            <a:endParaRPr lang="nb-NO" dirty="0"/>
+          </a:p>
+        </p:txBody>
+      </p:sp>
+      <p:sp>
+        <p:nvSpPr>
+          <p:cNvPr id="4" name="TekstSylinder 3"/>
+          <p:cNvSpPr txBox="1"/>
+          <p:nvPr/>
+        </p:nvSpPr>
+        <p:spPr>
+          <a:xfrm rot="16200000">
+            <a:off x="6866691" y="1723023"/>
+            <a:ext cx="3751343" cy="369332"/>
+          </a:xfrm>
+          <a:prstGeom prst="rect">
+            <a:avLst/>
+          </a:prstGeom>
+          <a:noFill/>
+        </p:spPr>
+        <p:txBody>
+          <a:bodyPr wrap="square" rtlCol="0">
+            <a:spAutoFit/>
+          </a:bodyPr>
+          <a:lstStyle/>
+          <a:p>
+            <a:r>
+              <a:rPr lang="nb-NO" spc="100" dirty="0">
+                <a:solidFill>
+                  <a:schemeClr val="bg1">
+                    <a:lumMod val="75000"/>
+                  </a:schemeClr>
+                </a:solidFill>
+                <a:latin typeface="Arial"/>
+                <a:cs typeface="Arial"/>
+              </a:rPr>
+              <a:t>Trondheim – Gjøvik – Ålesund</a:t>
+            </a:r>
+          </a:p>
+        </p:txBody>
+      </p:sp>
+    </p:spTree>
+    <p:extLst>
+      <p:ext uri="{BB962C8B-B14F-4D97-AF65-F5344CB8AC3E}">
+        <p14:creationId xmlns="" xmlns:p14="http://schemas.microsoft.com/office/powerpoint/2010/main" val="314013529"/>
       </p:ext>
     </p:extLst>
   </p:cSld>
@@ -3096,43 +3149,95 @@
           <a:p>
             <a:r>
               <a:rPr lang="nb-NO" dirty="0" err="1" smtClean="0"/>
-              <a:t>Introduction</a:t>
+              <a:t>Stack</a:t>
+            </a:r>
+            <a:r>
+              <a:rPr lang="nb-NO" dirty="0" smtClean="0"/>
+              <a:t> </a:t>
+            </a:r>
+            <a:r>
+              <a:rPr lang="nb-NO" dirty="0" err="1" smtClean="0"/>
+              <a:t>Overflow</a:t>
+            </a:r>
+            <a:r>
+              <a:rPr lang="nb-NO" dirty="0" smtClean="0"/>
+              <a:t> (SO)</a:t>
+            </a:r>
+          </a:p>
+          <a:p>
+            <a:r>
+              <a:rPr lang="nb-NO" dirty="0" err="1" smtClean="0"/>
+              <a:t>What</a:t>
+            </a:r>
+            <a:r>
+              <a:rPr lang="nb-NO" dirty="0" smtClean="0"/>
+              <a:t> is a </a:t>
+            </a:r>
+            <a:r>
+              <a:rPr lang="nb-NO" dirty="0" err="1" smtClean="0"/>
+              <a:t>question</a:t>
+            </a:r>
+            <a:r>
+              <a:rPr lang="nb-NO" dirty="0" smtClean="0"/>
+              <a:t>?</a:t>
+            </a:r>
+          </a:p>
+          <a:p>
+            <a:r>
+              <a:rPr lang="nb-NO" dirty="0" smtClean="0"/>
+              <a:t>Support </a:t>
+            </a:r>
+            <a:r>
+              <a:rPr lang="nb-NO" dirty="0" err="1" smtClean="0"/>
+              <a:t>Vector</a:t>
+            </a:r>
+            <a:r>
+              <a:rPr lang="nb-NO" dirty="0" smtClean="0"/>
+              <a:t> </a:t>
+            </a:r>
+            <a:r>
+              <a:rPr lang="nb-NO" dirty="0" err="1" smtClean="0"/>
+              <a:t>Machine</a:t>
+            </a:r>
+            <a:r>
+              <a:rPr lang="nb-NO" dirty="0" smtClean="0"/>
+              <a:t> (SVM)</a:t>
             </a:r>
             <a:endParaRPr lang="nb-NO" dirty="0" smtClean="0"/>
           </a:p>
           <a:p>
             <a:r>
               <a:rPr lang="nb-NO" dirty="0" err="1" smtClean="0"/>
-              <a:t>Stack</a:t>
-            </a:r>
-            <a:r>
-              <a:rPr lang="nb-NO" dirty="0" smtClean="0"/>
-              <a:t> </a:t>
-            </a:r>
-            <a:r>
-              <a:rPr lang="nb-NO" dirty="0" err="1" smtClean="0"/>
-              <a:t>Overflow</a:t>
+              <a:t>Methodology</a:t>
             </a:r>
             <a:endParaRPr lang="nb-NO" dirty="0" smtClean="0"/>
           </a:p>
           <a:p>
             <a:r>
               <a:rPr lang="nb-NO" dirty="0" err="1" smtClean="0"/>
-              <a:t>Development</a:t>
+              <a:t>Experiments</a:t>
+            </a:r>
+            <a:r>
+              <a:rPr lang="nb-NO" dirty="0" smtClean="0"/>
+              <a:t> and </a:t>
+            </a:r>
+            <a:r>
+              <a:rPr lang="nb-NO" dirty="0" err="1" smtClean="0"/>
+              <a:t>Results</a:t>
             </a:r>
             <a:endParaRPr lang="nb-NO" dirty="0" smtClean="0"/>
           </a:p>
           <a:p>
             <a:r>
               <a:rPr lang="nb-NO" dirty="0" err="1" smtClean="0"/>
-              <a:t>Results</a:t>
+              <a:t>Summary</a:t>
             </a:r>
             <a:endParaRPr lang="nb-NO" dirty="0" smtClean="0"/>
           </a:p>
           <a:p>
             <a:r>
-              <a:rPr lang="nb-NO" dirty="0" err="1" smtClean="0"/>
-              <a:t>Summary</a:t>
+              <a:rPr lang="nb-NO" dirty="0" smtClean="0"/>
+              <a:t>Demo</a:t>
             </a:r>
             <a:endParaRPr lang="nb-NO" dirty="0"/>
           </a:p>
@@ -3178,7 +3283,7 @@
     </p:spTree>
     <p:extLst>
       <p:ext uri="{BB962C8B-B14F-4D97-AF65-F5344CB8AC3E}">
-        <p14:creationId xmlns:p14="http://schemas.microsoft.com/office/powerpoint/2010/main" xmlns="" val="314013529"/>
+        <p14:creationId xmlns="" xmlns:p14="http://schemas.microsoft.com/office/powerpoint/2010/main" val="314013529"/>
       </p:ext>
     </p:extLst>
   </p:cSld>
@@ -3231,7 +3336,19 @@
           <a:p>
             <a:r>
               <a:rPr lang="nb-NO" dirty="0" err="1" smtClean="0"/>
-              <a:t>Introduction</a:t>
+              <a:t>Stack</a:t>
+            </a:r>
+            <a:r>
+              <a:rPr lang="nb-NO" dirty="0" smtClean="0"/>
+              <a:t> </a:t>
+            </a:r>
+            <a:r>
+              <a:rPr lang="nb-NO" dirty="0" err="1" smtClean="0"/>
+              <a:t>Overflow</a:t>
+            </a:r>
+            <a:r>
+              <a:rPr lang="nb-NO" dirty="0" smtClean="0"/>
+              <a:t> (SO)</a:t>
             </a:r>
             <a:endParaRPr lang="nb-NO" dirty="0"/>
           </a:p>
@@ -3252,7 +3369,244 @@
           <a:bodyPr/>
           <a:lstStyle/>
           <a:p>
-            <a:endParaRPr lang="nb-NO" dirty="0"/>
+            <a:r>
+              <a:rPr lang="nb-NO" dirty="0" err="1" smtClean="0"/>
+              <a:t>Released</a:t>
+            </a:r>
+            <a:r>
+              <a:rPr lang="nb-NO" dirty="0" smtClean="0"/>
+              <a:t> late 2008</a:t>
+            </a:r>
+          </a:p>
+          <a:p>
+            <a:r>
+              <a:rPr lang="nb-NO" dirty="0" smtClean="0"/>
+              <a:t>A </a:t>
+            </a:r>
+            <a:r>
+              <a:rPr lang="nb-NO" dirty="0" err="1" smtClean="0"/>
+              <a:t>Question-Answering</a:t>
+            </a:r>
+            <a:r>
+              <a:rPr lang="nb-NO" dirty="0" smtClean="0"/>
+              <a:t> (</a:t>
+            </a:r>
+            <a:r>
+              <a:rPr lang="nb-NO" dirty="0" err="1" smtClean="0"/>
+              <a:t>QnA</a:t>
+            </a:r>
+            <a:r>
+              <a:rPr lang="nb-NO" dirty="0" smtClean="0"/>
+              <a:t>) </a:t>
+            </a:r>
+            <a:r>
+              <a:rPr lang="nb-NO" dirty="0" err="1" smtClean="0"/>
+              <a:t>community</a:t>
+            </a:r>
+            <a:r>
+              <a:rPr lang="nb-NO" dirty="0" smtClean="0"/>
+              <a:t> for programmers</a:t>
+            </a:r>
+            <a:endParaRPr lang="nb-NO" dirty="0" smtClean="0"/>
+          </a:p>
+          <a:p>
+            <a:r>
+              <a:rPr lang="nb-NO" dirty="0" err="1" smtClean="0"/>
+              <a:t>Model</a:t>
+            </a:r>
+            <a:r>
+              <a:rPr lang="nb-NO" dirty="0" smtClean="0"/>
+              <a:t> </a:t>
+            </a:r>
+            <a:r>
+              <a:rPr lang="nb-NO" dirty="0" err="1" smtClean="0"/>
+              <a:t>which</a:t>
+            </a:r>
+            <a:r>
+              <a:rPr lang="nb-NO" dirty="0" smtClean="0"/>
+              <a:t> </a:t>
+            </a:r>
+            <a:r>
+              <a:rPr lang="nb-NO" dirty="0" err="1" smtClean="0"/>
+              <a:t>Stack</a:t>
+            </a:r>
+            <a:r>
+              <a:rPr lang="nb-NO" dirty="0" smtClean="0"/>
+              <a:t> Exchange is </a:t>
+            </a:r>
+            <a:r>
+              <a:rPr lang="nb-NO" dirty="0" err="1" smtClean="0"/>
+              <a:t>built</a:t>
+            </a:r>
+            <a:r>
+              <a:rPr lang="nb-NO" dirty="0" smtClean="0"/>
+              <a:t> </a:t>
+            </a:r>
+            <a:r>
+              <a:rPr lang="nb-NO" dirty="0" err="1" smtClean="0"/>
+              <a:t>on</a:t>
+            </a:r>
+            <a:endParaRPr lang="nb-NO" dirty="0" smtClean="0"/>
+          </a:p>
+          <a:p>
+            <a:r>
+              <a:rPr lang="nb-NO" dirty="0" err="1" smtClean="0"/>
+              <a:t>Uses</a:t>
+            </a:r>
+            <a:r>
+              <a:rPr lang="nb-NO" dirty="0" smtClean="0"/>
+              <a:t> </a:t>
+            </a:r>
+            <a:r>
+              <a:rPr lang="nb-NO" dirty="0" err="1" smtClean="0"/>
+              <a:t>gamification</a:t>
+            </a:r>
+            <a:r>
+              <a:rPr lang="nb-NO" dirty="0" smtClean="0"/>
+              <a:t> to </a:t>
+            </a:r>
+            <a:r>
+              <a:rPr lang="nb-NO" dirty="0" err="1" smtClean="0"/>
+              <a:t>reward</a:t>
+            </a:r>
+            <a:r>
+              <a:rPr lang="nb-NO" dirty="0" smtClean="0"/>
+              <a:t> </a:t>
+            </a:r>
+            <a:r>
+              <a:rPr lang="nb-NO" dirty="0" err="1" smtClean="0"/>
+              <a:t>users</a:t>
+            </a:r>
+            <a:r>
+              <a:rPr lang="nb-NO" dirty="0" smtClean="0"/>
+              <a:t> for </a:t>
+            </a:r>
+            <a:r>
+              <a:rPr lang="nb-NO" dirty="0" err="1" smtClean="0"/>
+              <a:t>participation</a:t>
+            </a:r>
+            <a:endParaRPr lang="nb-NO" dirty="0" smtClean="0"/>
+          </a:p>
+          <a:p>
+            <a:pPr lvl="1"/>
+            <a:r>
+              <a:rPr lang="nb-NO" dirty="0" err="1" smtClean="0"/>
+              <a:t>Reputation</a:t>
+            </a:r>
+            <a:endParaRPr lang="nb-NO" dirty="0" smtClean="0"/>
+          </a:p>
+          <a:p>
+            <a:pPr lvl="1"/>
+            <a:r>
+              <a:rPr lang="nb-NO" dirty="0" err="1" smtClean="0"/>
+              <a:t>Votes</a:t>
+            </a:r>
+            <a:endParaRPr lang="nb-NO" dirty="0" smtClean="0"/>
+          </a:p>
+          <a:p>
+            <a:pPr lvl="1"/>
+            <a:r>
+              <a:rPr lang="nb-NO" dirty="0" err="1" smtClean="0"/>
+              <a:t>Badges</a:t>
+            </a:r>
+            <a:endParaRPr lang="nb-NO" dirty="0" smtClean="0"/>
+          </a:p>
+          <a:p>
+            <a:pPr lvl="1"/>
+            <a:r>
+              <a:rPr lang="nb-NO" dirty="0" err="1" smtClean="0"/>
+              <a:t>Accepted</a:t>
+            </a:r>
+            <a:r>
+              <a:rPr lang="nb-NO" dirty="0" smtClean="0"/>
+              <a:t> </a:t>
+            </a:r>
+            <a:r>
+              <a:rPr lang="nb-NO" dirty="0" err="1" smtClean="0"/>
+              <a:t>answer</a:t>
+            </a:r>
+            <a:endParaRPr lang="nb-NO" dirty="0" smtClean="0"/>
+          </a:p>
+          <a:p>
+            <a:r>
+              <a:rPr lang="nb-NO" dirty="0" smtClean="0"/>
+              <a:t>Who </a:t>
+            </a:r>
+            <a:r>
+              <a:rPr lang="nb-NO" dirty="0" err="1" smtClean="0"/>
+              <a:t>are</a:t>
+            </a:r>
+            <a:r>
+              <a:rPr lang="nb-NO" dirty="0" smtClean="0"/>
+              <a:t> </a:t>
+            </a:r>
+            <a:r>
+              <a:rPr lang="nb-NO" dirty="0" err="1" smtClean="0"/>
+              <a:t>the</a:t>
+            </a:r>
+            <a:r>
+              <a:rPr lang="nb-NO" dirty="0" smtClean="0"/>
+              <a:t> </a:t>
+            </a:r>
+            <a:r>
+              <a:rPr lang="nb-NO" dirty="0" err="1" smtClean="0"/>
+              <a:t>experts</a:t>
+            </a:r>
+            <a:r>
+              <a:rPr lang="nb-NO" dirty="0" smtClean="0"/>
+              <a:t>?</a:t>
+            </a:r>
+          </a:p>
+          <a:p>
+            <a:r>
+              <a:rPr lang="nb-NO" dirty="0" err="1" smtClean="0"/>
+              <a:t>What</a:t>
+            </a:r>
+            <a:r>
+              <a:rPr lang="nb-NO" dirty="0" smtClean="0"/>
+              <a:t> </a:t>
+            </a:r>
+            <a:r>
+              <a:rPr lang="nb-NO" dirty="0" err="1" smtClean="0"/>
+              <a:t>defines</a:t>
+            </a:r>
+            <a:r>
+              <a:rPr lang="nb-NO" dirty="0" smtClean="0"/>
+              <a:t> a </a:t>
+            </a:r>
+            <a:r>
+              <a:rPr lang="nb-NO" dirty="0" err="1" smtClean="0"/>
+              <a:t>good</a:t>
+            </a:r>
+            <a:r>
+              <a:rPr lang="nb-NO" dirty="0" smtClean="0"/>
+              <a:t> </a:t>
+            </a:r>
+            <a:r>
+              <a:rPr lang="nb-NO" dirty="0" err="1" smtClean="0"/>
+              <a:t>Question</a:t>
+            </a:r>
+            <a:r>
+              <a:rPr lang="nb-NO" dirty="0" smtClean="0"/>
+              <a:t> and </a:t>
+            </a:r>
+            <a:r>
+              <a:rPr lang="nb-NO" dirty="0" err="1" smtClean="0"/>
+              <a:t>Answer</a:t>
+            </a:r>
+            <a:r>
+              <a:rPr lang="nb-NO" dirty="0" smtClean="0"/>
+              <a:t> </a:t>
+            </a:r>
+            <a:r>
+              <a:rPr lang="nb-NO" dirty="0" err="1" smtClean="0"/>
+              <a:t>on</a:t>
+            </a:r>
+            <a:r>
+              <a:rPr lang="nb-NO" dirty="0" smtClean="0"/>
+              <a:t> SO?</a:t>
+            </a:r>
+            <a:endParaRPr lang="nb-NO" dirty="0" smtClean="0"/>
           </a:p>
         </p:txBody>
       </p:sp>
@@ -3296,7 +3650,7 @@
     </p:spTree>
     <p:extLst>
       <p:ext uri="{BB962C8B-B14F-4D97-AF65-F5344CB8AC3E}">
-        <p14:creationId xmlns:p14="http://schemas.microsoft.com/office/powerpoint/2010/main" xmlns="" val="314013529"/>
+        <p14:creationId xmlns="" xmlns:p14="http://schemas.microsoft.com/office/powerpoint/2010/main" val="314013529"/>
       </p:ext>
     </p:extLst>
   </p:cSld>
@@ -3349,17 +3703,21 @@
           <a:p>
             <a:r>
               <a:rPr lang="nb-NO" dirty="0" err="1" smtClean="0"/>
-              <a:t>Stack</a:t>
-            </a:r>
-            <a:r>
-              <a:rPr lang="nb-NO" dirty="0" smtClean="0"/>
-              <a:t> </a:t>
-            </a:r>
-            <a:r>
-              <a:rPr lang="nb-NO" dirty="0" err="1" smtClean="0"/>
-              <a:t>Overflow</a:t>
-            </a:r>
-            <a:endParaRPr lang="nb-NO" dirty="0"/>
+              <a:t>What</a:t>
+            </a:r>
+            <a:r>
+              <a:rPr lang="nb-NO" dirty="0" smtClean="0"/>
+              <a:t> is a </a:t>
+            </a:r>
+            <a:r>
+              <a:rPr lang="nb-NO" dirty="0" err="1" smtClean="0"/>
+              <a:t>question</a:t>
+            </a:r>
+            <a:r>
+              <a:rPr lang="nb-NO" dirty="0" smtClean="0"/>
+              <a:t>?</a:t>
+            </a:r>
+            <a:endParaRPr lang="en-GB" dirty="0"/>
           </a:p>
         </p:txBody>
       </p:sp>
@@ -3378,64 +3736,64 @@
           <a:bodyPr/>
           <a:lstStyle/>
           <a:p>
-            <a:endParaRPr lang="nb-NO" dirty="0"/>
-          </a:p>
-        </p:txBody>
-      </p:sp>
-      <p:sp>
-        <p:nvSpPr>
-          <p:cNvPr id="4" name="TekstSylinder 3"/>
-          <p:cNvSpPr txBox="1"/>
-          <p:nvPr/>
-        </p:nvSpPr>
-        <p:spPr>
-          <a:xfrm rot="16200000">
-            <a:off x="6866691" y="1723023"/>
-            <a:ext cx="3751343" cy="369332"/>
-          </a:xfrm>
-          <a:prstGeom prst="rect">
-            <a:avLst/>
-          </a:prstGeom>
-          <a:noFill/>
-        </p:spPr>
-        <p:txBody>
-          <a:bodyPr wrap="square" rtlCol="0">
-            <a:spAutoFit/>
-          </a:bodyPr>
-          <a:lstStyle/>
-          <a:p>
-            <a:r>
-              <a:rPr lang="nb-NO" spc="100" dirty="0">
-                <a:solidFill>
-                  <a:schemeClr val="bg1">
-                    <a:lumMod val="75000"/>
-                  </a:schemeClr>
-                </a:solidFill>
-                <a:latin typeface="Arial"/>
-                <a:cs typeface="Arial"/>
-              </a:rPr>
-              <a:t>Trondheim – Gjøvik – Ålesund</a:t>
-            </a:r>
+            <a:r>
+              <a:rPr lang="en-GB" dirty="0" smtClean="0"/>
+              <a:t>Factoid vs. Broad questions</a:t>
+            </a:r>
+          </a:p>
+          <a:p>
+            <a:r>
+              <a:rPr lang="en-GB" dirty="0" smtClean="0"/>
+              <a:t>In education: Learn something new, or evaluate knowledge</a:t>
+            </a:r>
+          </a:p>
+          <a:p>
+            <a:r>
+              <a:rPr lang="en-GB" dirty="0" smtClean="0"/>
+              <a:t>Could be the goal of your research</a:t>
+            </a:r>
+          </a:p>
+          <a:p>
+            <a:r>
+              <a:rPr lang="en-GB" dirty="0" smtClean="0"/>
+              <a:t>The quality of a question can be equal to the quality of the answer</a:t>
+            </a:r>
+          </a:p>
+          <a:p>
+            <a:r>
+              <a:rPr lang="en-GB" dirty="0" smtClean="0"/>
+              <a:t>Question classification: Categorizing questions</a:t>
+            </a:r>
+          </a:p>
+          <a:p>
+            <a:pPr lvl="1"/>
+            <a:r>
+              <a:rPr lang="en-GB" dirty="0" smtClean="0"/>
+              <a:t>WH-words</a:t>
+            </a:r>
+          </a:p>
+          <a:p>
+            <a:pPr lvl="1"/>
+            <a:r>
+              <a:rPr lang="en-GB" dirty="0" smtClean="0"/>
+              <a:t>Bag-of-Words and N-grams</a:t>
+            </a:r>
+          </a:p>
+          <a:p>
+            <a:pPr lvl="1"/>
+            <a:r>
+              <a:rPr lang="en-GB" dirty="0" smtClean="0"/>
+              <a:t>Word mapping and processing</a:t>
+            </a:r>
+            <a:endParaRPr lang="en-GB" dirty="0"/>
           </a:p>
         </p:txBody>
       </p:sp>
     </p:spTree>
-    <p:extLst>
-      <p:ext uri="{BB962C8B-B14F-4D97-AF65-F5344CB8AC3E}">
-        <p14:creationId xmlns:p14="http://schemas.microsoft.com/office/powerpoint/2010/main" xmlns="" val="314013529"/>
-      </p:ext>
-    </p:extLst>
   </p:cSld>
   <p:clrMapOvr>
     <a:masterClrMapping/>
   </p:clrMapOvr>
-  <p:timing>
-    <p:tnLst>
-      <p:par>
-        <p:cTn id="1" dur="indefinite" restart="never" nodeType="tmRoot"/>
-      </p:par>
-    </p:tnLst>
-  </p:timing>
 </p:sld>
 </file>
 
@@ -3468,16 +3826,29 @@
         </p:nvSpPr>
         <p:spPr/>
         <p:txBody>
-          <a:bodyPr>
-            <a:normAutofit/>
-          </a:bodyPr>
+          <a:bodyPr/>
           <a:lstStyle/>
           <a:p>
             <a:r>
-              <a:rPr lang="nb-NO" dirty="0" err="1" smtClean="0"/>
-              <a:t>Development</a:t>
-            </a:r>
-            <a:endParaRPr lang="nb-NO" dirty="0"/>
+              <a:rPr lang="nb-NO" dirty="0" smtClean="0"/>
+              <a:t>Support </a:t>
+            </a:r>
+            <a:r>
+              <a:rPr lang="nb-NO" dirty="0" err="1" smtClean="0"/>
+              <a:t>Vector</a:t>
+            </a:r>
+            <a:r>
+              <a:rPr lang="nb-NO" dirty="0" smtClean="0"/>
+              <a:t> </a:t>
+            </a:r>
+            <a:r>
+              <a:rPr lang="nb-NO" dirty="0" err="1" smtClean="0"/>
+              <a:t>Machine</a:t>
+            </a:r>
+            <a:r>
+              <a:rPr lang="nb-NO" dirty="0" smtClean="0"/>
+              <a:t> (SVM)</a:t>
+            </a:r>
           </a:p>
         </p:txBody>
       </p:sp>
@@ -3496,64 +3867,76 @@
           <a:bodyPr/>
           <a:lstStyle/>
           <a:p>
-            <a:endParaRPr lang="nb-NO" dirty="0"/>
-          </a:p>
-        </p:txBody>
-      </p:sp>
-      <p:sp>
-        <p:nvSpPr>
-          <p:cNvPr id="4" name="TekstSylinder 3"/>
-          <p:cNvSpPr txBox="1"/>
-          <p:nvPr/>
-        </p:nvSpPr>
-        <p:spPr>
-          <a:xfrm rot="16200000">
-            <a:off x="6866691" y="1723023"/>
-            <a:ext cx="3751343" cy="369332"/>
-          </a:xfrm>
-          <a:prstGeom prst="rect">
-            <a:avLst/>
-          </a:prstGeom>
-          <a:noFill/>
-        </p:spPr>
-        <p:txBody>
-          <a:bodyPr wrap="square" rtlCol="0">
-            <a:spAutoFit/>
-          </a:bodyPr>
-          <a:lstStyle/>
-          <a:p>
-            <a:r>
-              <a:rPr lang="nb-NO" spc="100" dirty="0">
-                <a:solidFill>
-                  <a:schemeClr val="bg1">
-                    <a:lumMod val="75000"/>
-                  </a:schemeClr>
-                </a:solidFill>
-                <a:latin typeface="Arial"/>
-                <a:cs typeface="Arial"/>
-              </a:rPr>
-              <a:t>Trondheim – Gjøvik – Ålesund</a:t>
-            </a:r>
+            <a:r>
+              <a:rPr lang="en-GB" dirty="0" smtClean="0"/>
+              <a:t>Good for regression and classification problems</a:t>
+            </a:r>
+          </a:p>
+          <a:p>
+            <a:r>
+              <a:rPr lang="en-GB" dirty="0" smtClean="0"/>
+              <a:t>Main focus is binary classification</a:t>
+            </a:r>
+          </a:p>
+          <a:p>
+            <a:r>
+              <a:rPr lang="en-GB" dirty="0" smtClean="0"/>
+              <a:t>Often used for text classification</a:t>
+            </a:r>
+          </a:p>
+          <a:p>
+            <a:r>
+              <a:rPr lang="en-GB" dirty="0" smtClean="0"/>
+              <a:t>Separates classes by using a </a:t>
+            </a:r>
+            <a:r>
+              <a:rPr lang="en-GB" dirty="0" err="1" smtClean="0"/>
+              <a:t>hyperplane</a:t>
+            </a:r>
+            <a:endParaRPr lang="en-GB" dirty="0" smtClean="0"/>
+          </a:p>
+          <a:p>
+            <a:r>
+              <a:rPr lang="en-GB" dirty="0" smtClean="0"/>
+              <a:t>Four kernels:</a:t>
+            </a:r>
+          </a:p>
+          <a:p>
+            <a:pPr lvl="1"/>
+            <a:r>
+              <a:rPr lang="en-GB" dirty="0" smtClean="0"/>
+              <a:t>Linear</a:t>
+            </a:r>
+          </a:p>
+          <a:p>
+            <a:pPr lvl="1"/>
+            <a:r>
+              <a:rPr lang="en-GB" dirty="0" smtClean="0"/>
+              <a:t>Radial Basis Function (RBF)</a:t>
+            </a:r>
+          </a:p>
+          <a:p>
+            <a:pPr lvl="1"/>
+            <a:r>
+              <a:rPr lang="en-GB" dirty="0" smtClean="0"/>
+              <a:t>Polynomial</a:t>
+            </a:r>
+          </a:p>
+          <a:p>
+            <a:pPr lvl="1"/>
+            <a:r>
+              <a:rPr lang="en-GB" dirty="0" smtClean="0"/>
+              <a:t>Sigmoid</a:t>
+            </a:r>
+            <a:endParaRPr lang="en-GB" dirty="0"/>
           </a:p>
         </p:txBody>
       </p:sp>
     </p:spTree>
-    <p:extLst>
-      <p:ext uri="{BB962C8B-B14F-4D97-AF65-F5344CB8AC3E}">
-        <p14:creationId xmlns:p14="http://schemas.microsoft.com/office/powerpoint/2010/main" xmlns="" val="314013529"/>
-      </p:ext>
-    </p:extLst>
   </p:cSld>
   <p:clrMapOvr>
     <a:masterClrMapping/>
   </p:clrMapOvr>
-  <p:timing>
-    <p:tnLst>
-      <p:par>
-        <p:cTn id="1" dur="indefinite" restart="never" nodeType="tmRoot"/>
-      </p:par>
-    </p:tnLst>
-  </p:timing>
 </p:sld>
 </file>
 
@@ -3593,7 +3976,7 @@
           <a:p>
             <a:r>
               <a:rPr lang="nb-NO" dirty="0" err="1" smtClean="0"/>
-              <a:t>Results</a:t>
+              <a:t>Methodology</a:t>
             </a:r>
             <a:endParaRPr lang="nb-NO" dirty="0"/>
           </a:p>
@@ -3614,7 +3997,217 @@
           <a:bodyPr/>
           <a:lstStyle/>
           <a:p>
-            <a:endParaRPr lang="nb-NO" dirty="0"/>
+            <a:r>
+              <a:rPr lang="nb-NO" dirty="0" smtClean="0"/>
+              <a:t>Data </a:t>
+            </a:r>
+            <a:r>
+              <a:rPr lang="nb-NO" dirty="0" err="1" smtClean="0"/>
+              <a:t>set</a:t>
+            </a:r>
+            <a:r>
+              <a:rPr lang="nb-NO" dirty="0" smtClean="0"/>
+              <a:t> </a:t>
+            </a:r>
+            <a:r>
+              <a:rPr lang="nb-NO" dirty="0" err="1" smtClean="0"/>
+              <a:t>based</a:t>
+            </a:r>
+            <a:r>
+              <a:rPr lang="nb-NO" dirty="0" smtClean="0"/>
+              <a:t> </a:t>
+            </a:r>
+            <a:r>
+              <a:rPr lang="nb-NO" dirty="0" err="1" smtClean="0"/>
+              <a:t>on</a:t>
+            </a:r>
+            <a:r>
+              <a:rPr lang="nb-NO" dirty="0" smtClean="0"/>
+              <a:t> data dump from </a:t>
+            </a:r>
+            <a:r>
+              <a:rPr lang="nb-NO" dirty="0" err="1" smtClean="0"/>
+              <a:t>Stack</a:t>
+            </a:r>
+            <a:r>
+              <a:rPr lang="nb-NO" dirty="0" smtClean="0"/>
+              <a:t> Exchange </a:t>
+            </a:r>
+            <a:r>
+              <a:rPr lang="nb-NO" dirty="0" err="1" smtClean="0"/>
+              <a:t>Archive</a:t>
+            </a:r>
+            <a:endParaRPr lang="nb-NO" dirty="0" smtClean="0"/>
+          </a:p>
+          <a:p>
+            <a:pPr lvl="1"/>
+            <a:r>
+              <a:rPr lang="nb-NO" dirty="0" err="1" smtClean="0"/>
+              <a:t>Contains</a:t>
+            </a:r>
+            <a:r>
+              <a:rPr lang="nb-NO" dirty="0" smtClean="0"/>
+              <a:t> XML files </a:t>
+            </a:r>
+            <a:r>
+              <a:rPr lang="nb-NO" dirty="0" err="1" smtClean="0"/>
+              <a:t>based</a:t>
+            </a:r>
+            <a:r>
+              <a:rPr lang="nb-NO" dirty="0" smtClean="0"/>
+              <a:t> </a:t>
+            </a:r>
+            <a:r>
+              <a:rPr lang="nb-NO" dirty="0" err="1" smtClean="0"/>
+              <a:t>on</a:t>
+            </a:r>
+            <a:r>
+              <a:rPr lang="nb-NO" dirty="0" smtClean="0"/>
+              <a:t> </a:t>
+            </a:r>
+            <a:r>
+              <a:rPr lang="nb-NO" dirty="0" err="1" smtClean="0"/>
+              <a:t>table</a:t>
+            </a:r>
+            <a:r>
+              <a:rPr lang="nb-NO" dirty="0" smtClean="0"/>
+              <a:t> </a:t>
+            </a:r>
+            <a:r>
+              <a:rPr lang="nb-NO" dirty="0" err="1" smtClean="0"/>
+              <a:t>content</a:t>
+            </a:r>
+            <a:endParaRPr lang="nb-NO" dirty="0" smtClean="0"/>
+          </a:p>
+          <a:p>
+            <a:pPr lvl="1"/>
+            <a:r>
+              <a:rPr lang="nb-NO" dirty="0" err="1" smtClean="0"/>
+              <a:t>Imported</a:t>
+            </a:r>
+            <a:r>
+              <a:rPr lang="nb-NO" dirty="0" smtClean="0"/>
+              <a:t> data </a:t>
+            </a:r>
+            <a:r>
+              <a:rPr lang="nb-NO" dirty="0" err="1" smtClean="0"/>
+              <a:t>into</a:t>
+            </a:r>
+            <a:r>
+              <a:rPr lang="nb-NO" dirty="0" smtClean="0"/>
+              <a:t> </a:t>
+            </a:r>
+            <a:r>
+              <a:rPr lang="nb-NO" dirty="0" err="1" smtClean="0"/>
+              <a:t>MySQL</a:t>
+            </a:r>
+            <a:r>
+              <a:rPr lang="nb-NO" dirty="0" smtClean="0"/>
+              <a:t> database</a:t>
+            </a:r>
+          </a:p>
+          <a:p>
+            <a:pPr lvl="1"/>
+            <a:r>
+              <a:rPr lang="nb-NO" dirty="0" err="1" smtClean="0"/>
+              <a:t>Imported</a:t>
+            </a:r>
+            <a:r>
+              <a:rPr lang="nb-NO" dirty="0" smtClean="0"/>
+              <a:t> data from </a:t>
+            </a:r>
+            <a:r>
+              <a:rPr lang="nb-NO" dirty="0" err="1" smtClean="0"/>
+              <a:t>MySQL</a:t>
+            </a:r>
+            <a:r>
+              <a:rPr lang="nb-NO" dirty="0" smtClean="0"/>
+              <a:t> database </a:t>
+            </a:r>
+            <a:r>
+              <a:rPr lang="nb-NO" dirty="0" err="1" smtClean="0"/>
+              <a:t>into</a:t>
+            </a:r>
+            <a:r>
+              <a:rPr lang="nb-NO" dirty="0" smtClean="0"/>
+              <a:t> </a:t>
+            </a:r>
+            <a:r>
+              <a:rPr lang="nb-NO" dirty="0" err="1" smtClean="0"/>
+              <a:t>Pandas.DataFrame</a:t>
+            </a:r>
+            <a:endParaRPr lang="nb-NO" dirty="0" smtClean="0"/>
+          </a:p>
+          <a:p>
+            <a:r>
+              <a:rPr lang="nb-NO" dirty="0" err="1" smtClean="0"/>
+              <a:t>Development</a:t>
+            </a:r>
+            <a:r>
+              <a:rPr lang="nb-NO" dirty="0" smtClean="0"/>
+              <a:t>: </a:t>
+            </a:r>
+            <a:r>
+              <a:rPr lang="nb-NO" dirty="0" err="1" smtClean="0"/>
+              <a:t>Python</a:t>
+            </a:r>
+            <a:r>
+              <a:rPr lang="nb-NO" dirty="0" smtClean="0"/>
+              <a:t> 3.5 and </a:t>
+            </a:r>
+            <a:r>
+              <a:rPr lang="nb-NO" dirty="0" err="1" smtClean="0"/>
+              <a:t>Scikit-learn</a:t>
+            </a:r>
+            <a:r>
+              <a:rPr lang="nb-NO" dirty="0" smtClean="0"/>
+              <a:t> (</a:t>
+            </a:r>
+            <a:r>
+              <a:rPr lang="en-GB" dirty="0" smtClean="0"/>
+              <a:t>0.18.dev0)</a:t>
+            </a:r>
+            <a:endParaRPr lang="nb-NO" dirty="0" smtClean="0"/>
+          </a:p>
+          <a:p>
+            <a:r>
+              <a:rPr lang="nb-NO" dirty="0" err="1" smtClean="0"/>
+              <a:t>Question</a:t>
+            </a:r>
+            <a:r>
+              <a:rPr lang="nb-NO" dirty="0" smtClean="0"/>
+              <a:t> </a:t>
+            </a:r>
+            <a:r>
+              <a:rPr lang="nb-NO" dirty="0" err="1" smtClean="0"/>
+              <a:t>processing</a:t>
+            </a:r>
+            <a:endParaRPr lang="nb-NO" dirty="0" smtClean="0"/>
+          </a:p>
+          <a:p>
+            <a:r>
+              <a:rPr lang="nb-NO" dirty="0" err="1" smtClean="0"/>
+              <a:t>Selecting</a:t>
+            </a:r>
+            <a:r>
+              <a:rPr lang="nb-NO" dirty="0" smtClean="0"/>
+              <a:t> </a:t>
+            </a:r>
+            <a:r>
+              <a:rPr lang="nb-NO" dirty="0" err="1" smtClean="0"/>
+              <a:t>questions</a:t>
+            </a:r>
+            <a:r>
+              <a:rPr lang="nb-NO" dirty="0" smtClean="0"/>
+              <a:t> and features</a:t>
+            </a:r>
+          </a:p>
+          <a:p>
+            <a:r>
+              <a:rPr lang="en-US" dirty="0" smtClean="0"/>
+              <a:t>Selecting estimator and parameters for classification</a:t>
+            </a:r>
+            <a:endParaRPr lang="nb-NO" dirty="0" smtClean="0"/>
           </a:p>
         </p:txBody>
       </p:sp>
@@ -3658,7 +4251,7 @@
     </p:spTree>
     <p:extLst>
       <p:ext uri="{BB962C8B-B14F-4D97-AF65-F5344CB8AC3E}">
-        <p14:creationId xmlns:p14="http://schemas.microsoft.com/office/powerpoint/2010/main" xmlns="" val="314013529"/>
+        <p14:creationId xmlns="" xmlns:p14="http://schemas.microsoft.com/office/powerpoint/2010/main" val="314013529"/>
       </p:ext>
     </p:extLst>
   </p:cSld>
@@ -3711,7 +4304,15 @@
           <a:p>
             <a:r>
               <a:rPr lang="nb-NO" dirty="0" err="1" smtClean="0"/>
-              <a:t>Summary</a:t>
+              <a:t>Experiments</a:t>
+            </a:r>
+            <a:r>
+              <a:rPr lang="nb-NO" dirty="0" smtClean="0"/>
+              <a:t> and </a:t>
+            </a:r>
+            <a:r>
+              <a:rPr lang="nb-NO" dirty="0" err="1" smtClean="0"/>
+              <a:t>Results</a:t>
             </a:r>
             <a:endParaRPr lang="nb-NO" dirty="0"/>
           </a:p>
@@ -3727,12 +4328,271 @@
             <p:ph idx="1"/>
           </p:nvPr>
         </p:nvSpPr>
-        <p:spPr/>
-        <p:txBody>
-          <a:bodyPr/>
+        <p:spPr>
+          <a:xfrm>
+            <a:off x="457200" y="1600200"/>
+            <a:ext cx="8229600" cy="4830745"/>
+          </a:xfrm>
+        </p:spPr>
+        <p:txBody>
+          <a:bodyPr>
+            <a:normAutofit lnSpcReduction="10000"/>
+          </a:bodyPr>
           <a:lstStyle/>
           <a:p>
-            <a:endParaRPr lang="nb-NO" dirty="0"/>
+            <a:r>
+              <a:rPr lang="nb-NO" dirty="0" smtClean="0"/>
+              <a:t>6 </a:t>
+            </a:r>
+            <a:r>
+              <a:rPr lang="nb-NO" dirty="0" err="1" smtClean="0"/>
+              <a:t>different</a:t>
+            </a:r>
+            <a:r>
+              <a:rPr lang="nb-NO" dirty="0" smtClean="0"/>
+              <a:t> features</a:t>
+            </a:r>
+          </a:p>
+          <a:p>
+            <a:pPr lvl="1"/>
+            <a:r>
+              <a:rPr lang="nb-NO" dirty="0" err="1" smtClean="0"/>
+              <a:t>Code</a:t>
+            </a:r>
+            <a:r>
+              <a:rPr lang="nb-NO" dirty="0" smtClean="0"/>
+              <a:t> </a:t>
+            </a:r>
+            <a:r>
+              <a:rPr lang="nb-NO" dirty="0" err="1" smtClean="0"/>
+              <a:t>samples</a:t>
+            </a:r>
+            <a:endParaRPr lang="nb-NO" dirty="0" smtClean="0"/>
+          </a:p>
+          <a:p>
+            <a:pPr lvl="1"/>
+            <a:r>
+              <a:rPr lang="nb-NO" dirty="0" err="1" smtClean="0"/>
+              <a:t>Hexadecimal</a:t>
+            </a:r>
+            <a:endParaRPr lang="nb-NO" dirty="0" smtClean="0"/>
+          </a:p>
+          <a:p>
+            <a:pPr lvl="1"/>
+            <a:r>
+              <a:rPr lang="nb-NO" dirty="0" err="1" smtClean="0"/>
+              <a:t>Homework</a:t>
+            </a:r>
+            <a:r>
+              <a:rPr lang="nb-NO" dirty="0" smtClean="0"/>
+              <a:t> (synonyms for </a:t>
+            </a:r>
+            <a:r>
+              <a:rPr lang="nb-NO" dirty="0" err="1" smtClean="0"/>
+              <a:t>homework</a:t>
+            </a:r>
+            <a:r>
+              <a:rPr lang="nb-NO" dirty="0" smtClean="0"/>
+              <a:t>)</a:t>
+            </a:r>
+          </a:p>
+          <a:p>
+            <a:pPr lvl="1"/>
+            <a:r>
+              <a:rPr lang="nb-NO" dirty="0" smtClean="0"/>
+              <a:t>Links</a:t>
+            </a:r>
+          </a:p>
+          <a:p>
+            <a:pPr lvl="1"/>
+            <a:r>
+              <a:rPr lang="nb-NO" dirty="0" err="1" smtClean="0"/>
+              <a:t>Numerical</a:t>
+            </a:r>
+            <a:endParaRPr lang="nb-NO" dirty="0" smtClean="0"/>
+          </a:p>
+          <a:p>
+            <a:pPr lvl="1"/>
+            <a:r>
+              <a:rPr lang="nb-NO" dirty="0" err="1" smtClean="0"/>
+              <a:t>Tags</a:t>
+            </a:r>
+            <a:endParaRPr lang="nb-NO" dirty="0" smtClean="0"/>
+          </a:p>
+          <a:p>
+            <a:pPr lvl="1"/>
+            <a:r>
+              <a:rPr lang="nb-NO" dirty="0" smtClean="0"/>
+              <a:t>All features</a:t>
+            </a:r>
+            <a:endParaRPr lang="nb-NO" dirty="0" smtClean="0"/>
+          </a:p>
+          <a:p>
+            <a:r>
+              <a:rPr lang="nb-NO" dirty="0" smtClean="0"/>
+              <a:t>4 </a:t>
+            </a:r>
+            <a:r>
+              <a:rPr lang="nb-NO" dirty="0" err="1" smtClean="0"/>
+              <a:t>different</a:t>
+            </a:r>
+            <a:r>
+              <a:rPr lang="nb-NO" dirty="0" smtClean="0"/>
+              <a:t> </a:t>
+            </a:r>
+            <a:r>
+              <a:rPr lang="nb-NO" dirty="0" err="1" smtClean="0"/>
+              <a:t>experiments</a:t>
+            </a:r>
+            <a:endParaRPr lang="nb-NO" dirty="0" smtClean="0"/>
+          </a:p>
+          <a:p>
+            <a:pPr lvl="1"/>
+            <a:r>
+              <a:rPr lang="nb-NO" dirty="0" err="1" smtClean="0"/>
+              <a:t>Unprocessed</a:t>
+            </a:r>
+            <a:r>
+              <a:rPr lang="nb-NO" dirty="0" smtClean="0"/>
+              <a:t> data </a:t>
+            </a:r>
+            <a:r>
+              <a:rPr lang="nb-NO" dirty="0" err="1" smtClean="0"/>
+              <a:t>set</a:t>
+            </a:r>
+            <a:r>
+              <a:rPr lang="nb-NO" dirty="0" smtClean="0"/>
+              <a:t> vs. </a:t>
+            </a:r>
+            <a:r>
+              <a:rPr lang="nb-NO" dirty="0" smtClean="0"/>
+              <a:t>a</a:t>
+            </a:r>
+            <a:r>
+              <a:rPr lang="nb-NO" dirty="0" smtClean="0"/>
+              <a:t>ll singular feature, and all </a:t>
+            </a:r>
+            <a:r>
+              <a:rPr lang="nb-NO" dirty="0" err="1" smtClean="0"/>
+              <a:t>questions</a:t>
+            </a:r>
+            <a:endParaRPr lang="nb-NO" dirty="0" smtClean="0"/>
+          </a:p>
+          <a:p>
+            <a:pPr lvl="1"/>
+            <a:r>
+              <a:rPr lang="nb-NO" dirty="0" err="1" smtClean="0"/>
+              <a:t>Unprocessed</a:t>
+            </a:r>
+            <a:r>
+              <a:rPr lang="nb-NO" dirty="0" smtClean="0"/>
+              <a:t> data </a:t>
+            </a:r>
+            <a:r>
+              <a:rPr lang="nb-NO" dirty="0" err="1" smtClean="0"/>
+              <a:t>set</a:t>
+            </a:r>
+            <a:r>
+              <a:rPr lang="nb-NO" dirty="0" smtClean="0"/>
+              <a:t> vs. all singular features, and </a:t>
+            </a:r>
+            <a:r>
+              <a:rPr lang="nb-NO" dirty="0" err="1" smtClean="0"/>
+              <a:t>question</a:t>
+            </a:r>
+            <a:r>
+              <a:rPr lang="nb-NO" dirty="0" smtClean="0"/>
+              <a:t> </a:t>
+            </a:r>
+            <a:r>
+              <a:rPr lang="nb-NO" dirty="0" err="1" smtClean="0"/>
+              <a:t>occurence</a:t>
+            </a:r>
+            <a:r>
+              <a:rPr lang="nb-NO" dirty="0" smtClean="0"/>
+              <a:t> </a:t>
+            </a:r>
+            <a:r>
+              <a:rPr lang="nb-NO" dirty="0" err="1" smtClean="0"/>
+              <a:t>only</a:t>
+            </a:r>
+            <a:endParaRPr lang="nb-NO" dirty="0" smtClean="0"/>
+          </a:p>
+          <a:p>
+            <a:pPr lvl="1"/>
+            <a:r>
+              <a:rPr lang="nb-NO" dirty="0" err="1" smtClean="0"/>
+              <a:t>Unprocessed</a:t>
+            </a:r>
+            <a:r>
+              <a:rPr lang="nb-NO" dirty="0" smtClean="0"/>
+              <a:t> </a:t>
+            </a:r>
+            <a:r>
+              <a:rPr lang="nb-NO" dirty="0" smtClean="0"/>
+              <a:t>data </a:t>
+            </a:r>
+            <a:r>
+              <a:rPr lang="nb-NO" dirty="0" err="1" smtClean="0"/>
+              <a:t>set</a:t>
+            </a:r>
+            <a:r>
+              <a:rPr lang="nb-NO" dirty="0" smtClean="0"/>
+              <a:t> vs. </a:t>
+            </a:r>
+            <a:r>
+              <a:rPr lang="nb-NO" dirty="0" err="1" smtClean="0"/>
+              <a:t>selected</a:t>
+            </a:r>
+            <a:r>
+              <a:rPr lang="nb-NO" dirty="0" smtClean="0"/>
+              <a:t> </a:t>
+            </a:r>
+            <a:r>
+              <a:rPr lang="nb-NO" dirty="0" err="1" smtClean="0"/>
+              <a:t>set</a:t>
+            </a:r>
+            <a:r>
+              <a:rPr lang="nb-NO" dirty="0" smtClean="0"/>
+              <a:t> </a:t>
+            </a:r>
+            <a:r>
+              <a:rPr lang="nb-NO" dirty="0" err="1" smtClean="0"/>
+              <a:t>of</a:t>
+            </a:r>
+            <a:r>
+              <a:rPr lang="nb-NO" dirty="0" smtClean="0"/>
+              <a:t> features </a:t>
+            </a:r>
+            <a:r>
+              <a:rPr lang="nb-NO" dirty="0" err="1" smtClean="0"/>
+              <a:t>only</a:t>
+            </a:r>
+            <a:endParaRPr lang="nb-NO" dirty="0" smtClean="0"/>
+          </a:p>
+          <a:p>
+            <a:pPr lvl="1"/>
+            <a:r>
+              <a:rPr lang="nb-NO" dirty="0" err="1" smtClean="0"/>
+              <a:t>Stochastic</a:t>
+            </a:r>
+            <a:r>
+              <a:rPr lang="nb-NO" dirty="0" smtClean="0"/>
+              <a:t> Gradient </a:t>
+            </a:r>
+            <a:r>
+              <a:rPr lang="nb-NO" dirty="0" err="1" smtClean="0"/>
+              <a:t>Descent</a:t>
+            </a:r>
+            <a:r>
+              <a:rPr lang="nb-NO" dirty="0" smtClean="0"/>
+              <a:t> (SGD) as </a:t>
+            </a:r>
+            <a:r>
+              <a:rPr lang="nb-NO" dirty="0" err="1" smtClean="0"/>
+              <a:t>classifier</a:t>
+            </a:r>
+            <a:endParaRPr lang="nb-NO" dirty="0" smtClean="0"/>
           </a:p>
         </p:txBody>
       </p:sp>
@@ -3776,7 +4636,7 @@
     </p:spTree>
     <p:extLst>
       <p:ext uri="{BB962C8B-B14F-4D97-AF65-F5344CB8AC3E}">
-        <p14:creationId xmlns:p14="http://schemas.microsoft.com/office/powerpoint/2010/main" xmlns="" val="314013529"/>
+        <p14:creationId xmlns="" xmlns:p14="http://schemas.microsoft.com/office/powerpoint/2010/main" val="314013529"/>
       </p:ext>
     </p:extLst>
   </p:cSld>
@@ -3820,30 +4680,141 @@
             <p:ph type="title"/>
           </p:nvPr>
         </p:nvSpPr>
-        <p:spPr>
-          <a:xfrm>
-            <a:off x="457200" y="2022990"/>
-            <a:ext cx="8229600" cy="1143000"/>
-          </a:xfrm>
-        </p:spPr>
+        <p:spPr/>
+        <p:txBody>
+          <a:bodyPr>
+            <a:normAutofit/>
+          </a:bodyPr>
+          <a:lstStyle/>
+          <a:p>
+            <a:r>
+              <a:rPr lang="nb-NO" dirty="0" err="1" smtClean="0"/>
+              <a:t>Conclusion</a:t>
+            </a:r>
+            <a:endParaRPr lang="nb-NO" dirty="0"/>
+          </a:p>
+        </p:txBody>
+      </p:sp>
+      <p:sp>
+        <p:nvSpPr>
+          <p:cNvPr id="3" name="Plassholder for innhold 2"/>
+          <p:cNvSpPr>
+            <a:spLocks noGrp="1"/>
+          </p:cNvSpPr>
+          <p:nvPr>
+            <p:ph idx="1"/>
+          </p:nvPr>
+        </p:nvSpPr>
+        <p:spPr/>
         <p:txBody>
           <a:bodyPr/>
           <a:lstStyle/>
           <a:p>
-            <a:pPr algn="ctr"/>
-            <a:r>
-              <a:rPr lang="nb-NO" dirty="0" err="1" smtClean="0"/>
-              <a:t>Thanks</a:t>
-            </a:r>
-            <a:r>
-              <a:rPr lang="nb-NO" dirty="0" smtClean="0"/>
-              <a:t> for </a:t>
-            </a:r>
-            <a:r>
-              <a:rPr lang="nb-NO" dirty="0" err="1" smtClean="0"/>
-              <a:t>listening</a:t>
-            </a:r>
-            <a:endParaRPr lang="nb-NO" dirty="0"/>
+            <a:r>
+              <a:rPr lang="en-US" dirty="0" smtClean="0"/>
+              <a:t>Stack overflow as a question quality metric</a:t>
+            </a:r>
+          </a:p>
+          <a:p>
+            <a:r>
+              <a:rPr lang="en-US" dirty="0" smtClean="0"/>
+              <a:t>Limitations and issues</a:t>
+            </a:r>
+          </a:p>
+          <a:p>
+            <a:r>
+              <a:rPr lang="nb-NO" dirty="0" err="1" smtClean="0"/>
+              <a:t>Further</a:t>
+            </a:r>
+            <a:r>
+              <a:rPr lang="nb-NO" dirty="0" smtClean="0"/>
+              <a:t> </a:t>
+            </a:r>
+            <a:r>
+              <a:rPr lang="nb-NO" dirty="0" err="1" smtClean="0"/>
+              <a:t>work</a:t>
+            </a:r>
+            <a:endParaRPr lang="nb-NO" dirty="0" smtClean="0"/>
+          </a:p>
+          <a:p>
+            <a:pPr lvl="1"/>
+            <a:r>
+              <a:rPr lang="nb-NO" dirty="0" err="1" smtClean="0"/>
+              <a:t>Code</a:t>
+            </a:r>
+            <a:r>
+              <a:rPr lang="nb-NO" dirty="0" smtClean="0"/>
+              <a:t> </a:t>
+            </a:r>
+            <a:r>
+              <a:rPr lang="nb-NO" dirty="0" err="1" smtClean="0"/>
+              <a:t>blocks</a:t>
+            </a:r>
+            <a:r>
+              <a:rPr lang="nb-NO" dirty="0" smtClean="0"/>
+              <a:t>, Links and </a:t>
+            </a:r>
+            <a:r>
+              <a:rPr lang="nb-NO" dirty="0" err="1" smtClean="0"/>
+              <a:t>Numerical</a:t>
+            </a:r>
+            <a:r>
+              <a:rPr lang="nb-NO" dirty="0" smtClean="0"/>
+              <a:t> as a feature </a:t>
+            </a:r>
+            <a:r>
+              <a:rPr lang="nb-NO" dirty="0" err="1" smtClean="0"/>
+              <a:t>set</a:t>
+            </a:r>
+            <a:endParaRPr lang="nb-NO" dirty="0" smtClean="0"/>
+          </a:p>
+          <a:p>
+            <a:pPr lvl="1"/>
+            <a:r>
+              <a:rPr lang="nb-NO" dirty="0" err="1" smtClean="0"/>
+              <a:t>Code</a:t>
+            </a:r>
+            <a:r>
+              <a:rPr lang="nb-NO" dirty="0" smtClean="0"/>
+              <a:t> </a:t>
+            </a:r>
+            <a:r>
+              <a:rPr lang="nb-NO" dirty="0" err="1" smtClean="0"/>
+              <a:t>analysis</a:t>
+            </a:r>
+            <a:endParaRPr lang="nb-NO" dirty="0" smtClean="0"/>
+          </a:p>
+          <a:p>
+            <a:pPr lvl="1"/>
+            <a:r>
+              <a:rPr lang="nb-NO" dirty="0" err="1" smtClean="0"/>
+              <a:t>Sentiment</a:t>
+            </a:r>
+            <a:r>
+              <a:rPr lang="nb-NO" dirty="0" smtClean="0"/>
+              <a:t> </a:t>
+            </a:r>
+            <a:r>
+              <a:rPr lang="nb-NO" dirty="0" err="1" smtClean="0"/>
+              <a:t>analysis</a:t>
+            </a:r>
+            <a:endParaRPr lang="nb-NO" dirty="0" smtClean="0"/>
+          </a:p>
+          <a:p>
+            <a:pPr lvl="1"/>
+            <a:r>
+              <a:rPr lang="nb-NO" dirty="0" err="1" smtClean="0"/>
+              <a:t>Version</a:t>
+            </a:r>
+            <a:r>
+              <a:rPr lang="nb-NO" dirty="0" smtClean="0"/>
+              <a:t> </a:t>
+            </a:r>
+            <a:r>
+              <a:rPr lang="nb-NO" dirty="0" err="1" smtClean="0"/>
+              <a:t>numbering</a:t>
+            </a:r>
+            <a:endParaRPr lang="nb-NO" dirty="0" smtClean="0"/>
           </a:p>
         </p:txBody>
       </p:sp>
@@ -3887,7 +4858,110 @@
     </p:spTree>
     <p:extLst>
       <p:ext uri="{BB962C8B-B14F-4D97-AF65-F5344CB8AC3E}">
-        <p14:creationId xmlns:p14="http://schemas.microsoft.com/office/powerpoint/2010/main" xmlns="" val="314013529"/>
+        <p14:creationId xmlns="" xmlns:p14="http://schemas.microsoft.com/office/powerpoint/2010/main" val="314013529"/>
+      </p:ext>
+    </p:extLst>
+  </p:cSld>
+  <p:clrMapOvr>
+    <a:masterClrMapping/>
+  </p:clrMapOvr>
+  <p:timing>
+    <p:tnLst>
+      <p:par>
+        <p:cTn id="1" dur="indefinite" restart="never" nodeType="tmRoot"/>
+      </p:par>
+    </p:tnLst>
+  </p:timing>
+</p:sld>
+</file>
+
+<file path=ppt/slides/slide9.xml><?xml version="1.0" encoding="utf-8"?>
+<p:sld xmlns:a="http://schemas.openxmlformats.org/drawingml/2006/main" xmlns:r="http://schemas.openxmlformats.org/officeDocument/2006/relationships" xmlns:p="http://schemas.openxmlformats.org/presentationml/2006/main">
+  <p:cSld>
+    <p:spTree>
+      <p:nvGrpSpPr>
+        <p:cNvPr id="1" name=""/>
+        <p:cNvGrpSpPr/>
+        <p:nvPr/>
+      </p:nvGrpSpPr>
+      <p:grpSpPr>
+        <a:xfrm>
+          <a:off x="0" y="0"/>
+          <a:ext cx="0" cy="0"/>
+          <a:chOff x="0" y="0"/>
+          <a:chExt cx="0" cy="0"/>
+        </a:xfrm>
+      </p:grpSpPr>
+      <p:sp>
+        <p:nvSpPr>
+          <p:cNvPr id="2" name="Tittel 1"/>
+          <p:cNvSpPr>
+            <a:spLocks noGrp="1"/>
+          </p:cNvSpPr>
+          <p:nvPr>
+            <p:ph type="title"/>
+          </p:nvPr>
+        </p:nvSpPr>
+        <p:spPr>
+          <a:xfrm>
+            <a:off x="457200" y="2022990"/>
+            <a:ext cx="8229600" cy="1143000"/>
+          </a:xfrm>
+        </p:spPr>
+        <p:txBody>
+          <a:bodyPr/>
+          <a:lstStyle/>
+          <a:p>
+            <a:pPr algn="ctr"/>
+            <a:r>
+              <a:rPr lang="nb-NO" dirty="0" smtClean="0"/>
+              <a:t>Demo</a:t>
+            </a:r>
+            <a:endParaRPr lang="nb-NO" dirty="0"/>
+          </a:p>
+        </p:txBody>
+      </p:sp>
+      <p:sp>
+        <p:nvSpPr>
+          <p:cNvPr id="4" name="TekstSylinder 3"/>
+          <p:cNvSpPr txBox="1"/>
+          <p:nvPr/>
+        </p:nvSpPr>
+        <p:spPr>
+          <a:xfrm rot="16200000">
+            <a:off x="6866691" y="1723023"/>
+            <a:ext cx="3751343" cy="369332"/>
+          </a:xfrm>
+          <a:prstGeom prst="rect">
+            <a:avLst/>
+          </a:prstGeom>
+          <a:noFill/>
+        </p:spPr>
+        <p:txBody>
+          <a:bodyPr wrap="square" rtlCol="0">
+            <a:spAutoFit/>
+          </a:bodyPr>
+          <a:lstStyle/>
+          <a:p>
+            <a:r>
+              <a:rPr lang="nb-NO" spc="100" dirty="0">
+                <a:solidFill>
+                  <a:schemeClr val="bg1">
+                    <a:lumMod val="75000"/>
+                  </a:schemeClr>
+                </a:solidFill>
+                <a:latin typeface="Arial"/>
+                <a:cs typeface="Arial"/>
+              </a:rPr>
+              <a:t>Trondheim – Gjøvik – Ålesund</a:t>
+            </a:r>
+          </a:p>
+        </p:txBody>
+      </p:sp>
+    </p:spTree>
+    <p:extLst>
+      <p:ext uri="{BB962C8B-B14F-4D97-AF65-F5344CB8AC3E}">
+        <p14:creationId xmlns="" xmlns:p14="http://schemas.microsoft.com/office/powerpoint/2010/main" val="314013529"/>
       </p:ext>
     </p:extLst>
   </p:cSld>

</xml_diff>

<commit_message>
added pictures and added keyword list to word
</commit_message>
<xml_diff>
--- a/IMT4904_Msc_Presentation.pptx
+++ b/IMT4904_Msc_Presentation.pptx
@@ -5,19 +5,23 @@
     <p:sldMasterId id="2147483648" r:id="rId1"/>
   </p:sldMasterIdLst>
   <p:notesMasterIdLst>
-    <p:notesMasterId r:id="rId12"/>
+    <p:notesMasterId r:id="rId16"/>
   </p:notesMasterIdLst>
   <p:sldIdLst>
     <p:sldId id="256" r:id="rId2"/>
     <p:sldId id="259" r:id="rId3"/>
     <p:sldId id="263" r:id="rId4"/>
-    <p:sldId id="267" r:id="rId5"/>
-    <p:sldId id="268" r:id="rId6"/>
-    <p:sldId id="264" r:id="rId7"/>
-    <p:sldId id="262" r:id="rId8"/>
-    <p:sldId id="265" r:id="rId9"/>
-    <p:sldId id="266" r:id="rId10"/>
-    <p:sldId id="261" r:id="rId11"/>
+    <p:sldId id="269" r:id="rId5"/>
+    <p:sldId id="271" r:id="rId6"/>
+    <p:sldId id="270" r:id="rId7"/>
+    <p:sldId id="267" r:id="rId8"/>
+    <p:sldId id="268" r:id="rId9"/>
+    <p:sldId id="264" r:id="rId10"/>
+    <p:sldId id="262" r:id="rId11"/>
+    <p:sldId id="265" r:id="rId12"/>
+    <p:sldId id="266" r:id="rId13"/>
+    <p:sldId id="261" r:id="rId14"/>
+    <p:sldId id="272" r:id="rId15"/>
   </p:sldIdLst>
   <p:sldSz cx="9144000" cy="6858000" type="screen4x3"/>
   <p:notesSz cx="6858000" cy="9144000"/>
@@ -202,7 +206,7 @@
             <a:fld id="{423E070F-056A-EF46-8F28-B603D057C661}" type="datetimeFigureOut">
               <a:rPr lang="nb-NO" smtClean="0"/>
               <a:pPr/>
-              <a:t>02.06.2016</a:t>
+              <a:t>03.06.2016</a:t>
             </a:fld>
             <a:endParaRPr lang="nb-NO"/>
           </a:p>
@@ -469,6 +473,88 @@
     </a:lvl9pPr>
   </p:notesStyle>
 </p:notesMaster>
+</file>
+
+<file path=ppt/notesSlides/notesSlide1.xml><?xml version="1.0" encoding="utf-8"?>
+<p:notes xmlns:a="http://schemas.openxmlformats.org/drawingml/2006/main" xmlns:r="http://schemas.openxmlformats.org/officeDocument/2006/relationships" xmlns:p="http://schemas.openxmlformats.org/presentationml/2006/main">
+  <p:cSld>
+    <p:spTree>
+      <p:nvGrpSpPr>
+        <p:cNvPr id="1" name=""/>
+        <p:cNvGrpSpPr/>
+        <p:nvPr/>
+      </p:nvGrpSpPr>
+      <p:grpSpPr>
+        <a:xfrm>
+          <a:off x="0" y="0"/>
+          <a:ext cx="0" cy="0"/>
+          <a:chOff x="0" y="0"/>
+          <a:chExt cx="0" cy="0"/>
+        </a:xfrm>
+      </p:grpSpPr>
+      <p:sp>
+        <p:nvSpPr>
+          <p:cNvPr id="2" name="Plassholder for lysbilde 1"/>
+          <p:cNvSpPr>
+            <a:spLocks noGrp="1" noRot="1" noChangeAspect="1"/>
+          </p:cNvSpPr>
+          <p:nvPr>
+            <p:ph type="sldImg"/>
+          </p:nvPr>
+        </p:nvSpPr>
+        <p:spPr/>
+      </p:sp>
+      <p:sp>
+        <p:nvSpPr>
+          <p:cNvPr id="3" name="Plassholder for notater 2"/>
+          <p:cNvSpPr>
+            <a:spLocks noGrp="1"/>
+          </p:cNvSpPr>
+          <p:nvPr>
+            <p:ph type="body" idx="1"/>
+          </p:nvPr>
+        </p:nvSpPr>
+        <p:spPr/>
+        <p:txBody>
+          <a:bodyPr>
+            <a:normAutofit/>
+          </a:bodyPr>
+          <a:lstStyle/>
+          <a:p>
+            <a:endParaRPr lang="en-GB" dirty="0"/>
+          </a:p>
+        </p:txBody>
+      </p:sp>
+      <p:sp>
+        <p:nvSpPr>
+          <p:cNvPr id="4" name="Plassholder for lysbildenummer 3"/>
+          <p:cNvSpPr>
+            <a:spLocks noGrp="1"/>
+          </p:cNvSpPr>
+          <p:nvPr>
+            <p:ph type="sldNum" sz="quarter" idx="10"/>
+          </p:nvPr>
+        </p:nvSpPr>
+        <p:spPr/>
+        <p:txBody>
+          <a:bodyPr/>
+          <a:lstStyle/>
+          <a:p>
+            <a:fld id="{13B71C88-A8C4-B64E-9416-E16EC2564890}" type="slidenum">
+              <a:rPr lang="nb-NO" smtClean="0"/>
+              <a:pPr/>
+              <a:t>5</a:t>
+            </a:fld>
+            <a:endParaRPr lang="nb-NO"/>
+          </a:p>
+        </p:txBody>
+      </p:sp>
+    </p:spTree>
+  </p:cSld>
+  <p:clrMapOvr>
+    <a:masterClrMapping/>
+  </p:clrMapOvr>
+</p:notes>
 </file>
 
 <file path=ppt/slideLayouts/slideLayout1.xml><?xml version="1.0" encoding="utf-8"?>
@@ -3008,30 +3094,291 @@
             <p:ph type="title"/>
           </p:nvPr>
         </p:nvSpPr>
+        <p:spPr/>
+        <p:txBody>
+          <a:bodyPr>
+            <a:normAutofit/>
+          </a:bodyPr>
+          <a:lstStyle/>
+          <a:p>
+            <a:r>
+              <a:rPr lang="nb-NO" dirty="0" err="1" smtClean="0"/>
+              <a:t>Experiments</a:t>
+            </a:r>
+            <a:r>
+              <a:rPr lang="nb-NO" dirty="0" smtClean="0"/>
+              <a:t> and </a:t>
+            </a:r>
+            <a:r>
+              <a:rPr lang="nb-NO" dirty="0" err="1" smtClean="0"/>
+              <a:t>Results</a:t>
+            </a:r>
+            <a:endParaRPr lang="nb-NO" dirty="0"/>
+          </a:p>
+        </p:txBody>
+      </p:sp>
+      <p:sp>
+        <p:nvSpPr>
+          <p:cNvPr id="3" name="Plassholder for innhold 2"/>
+          <p:cNvSpPr>
+            <a:spLocks noGrp="1"/>
+          </p:cNvSpPr>
+          <p:nvPr>
+            <p:ph idx="1"/>
+          </p:nvPr>
+        </p:nvSpPr>
         <p:spPr>
           <a:xfrm>
-            <a:off x="457200" y="2022990"/>
-            <a:ext cx="8229600" cy="1143000"/>
+            <a:off x="457200" y="1600200"/>
+            <a:ext cx="8229600" cy="4830745"/>
           </a:xfrm>
         </p:spPr>
         <p:txBody>
-          <a:bodyPr/>
+          <a:bodyPr>
+            <a:normAutofit lnSpcReduction="10000"/>
+          </a:bodyPr>
           <a:lstStyle/>
           <a:p>
-            <a:pPr algn="ctr"/>
-            <a:r>
-              <a:rPr lang="nb-NO" dirty="0" err="1" smtClean="0"/>
-              <a:t>Thanks</a:t>
-            </a:r>
-            <a:r>
-              <a:rPr lang="nb-NO" dirty="0" smtClean="0"/>
-              <a:t> for </a:t>
-            </a:r>
-            <a:r>
-              <a:rPr lang="nb-NO" dirty="0" err="1" smtClean="0"/>
-              <a:t>listening</a:t>
-            </a:r>
-            <a:endParaRPr lang="nb-NO" dirty="0"/>
+            <a:r>
+              <a:rPr lang="nb-NO" dirty="0" smtClean="0"/>
+              <a:t>6 </a:t>
+            </a:r>
+            <a:r>
+              <a:rPr lang="nb-NO" dirty="0" err="1" smtClean="0"/>
+              <a:t>different</a:t>
+            </a:r>
+            <a:r>
+              <a:rPr lang="nb-NO" dirty="0" smtClean="0"/>
+              <a:t> features</a:t>
+            </a:r>
+          </a:p>
+          <a:p>
+            <a:pPr lvl="1"/>
+            <a:r>
+              <a:rPr lang="nb-NO" dirty="0" err="1" smtClean="0"/>
+              <a:t>Code</a:t>
+            </a:r>
+            <a:r>
+              <a:rPr lang="nb-NO" dirty="0" smtClean="0"/>
+              <a:t> </a:t>
+            </a:r>
+            <a:r>
+              <a:rPr lang="nb-NO" dirty="0" err="1" smtClean="0"/>
+              <a:t>samples</a:t>
+            </a:r>
+            <a:endParaRPr lang="nb-NO" dirty="0" smtClean="0"/>
+          </a:p>
+          <a:p>
+            <a:pPr lvl="1"/>
+            <a:r>
+              <a:rPr lang="nb-NO" dirty="0" err="1" smtClean="0"/>
+              <a:t>Hexadecimal</a:t>
+            </a:r>
+            <a:endParaRPr lang="nb-NO" dirty="0" smtClean="0"/>
+          </a:p>
+          <a:p>
+            <a:pPr lvl="1"/>
+            <a:r>
+              <a:rPr lang="nb-NO" dirty="0" err="1" smtClean="0"/>
+              <a:t>Homework</a:t>
+            </a:r>
+            <a:r>
+              <a:rPr lang="nb-NO" dirty="0" smtClean="0"/>
+              <a:t> (synonyms for </a:t>
+            </a:r>
+            <a:r>
+              <a:rPr lang="nb-NO" dirty="0" err="1" smtClean="0"/>
+              <a:t>homework</a:t>
+            </a:r>
+            <a:r>
+              <a:rPr lang="nb-NO" dirty="0" smtClean="0"/>
+              <a:t>)</a:t>
+            </a:r>
+          </a:p>
+          <a:p>
+            <a:pPr lvl="1"/>
+            <a:r>
+              <a:rPr lang="nb-NO" dirty="0" smtClean="0"/>
+              <a:t>Links</a:t>
+            </a:r>
+          </a:p>
+          <a:p>
+            <a:pPr lvl="1"/>
+            <a:r>
+              <a:rPr lang="nb-NO" dirty="0" err="1" smtClean="0"/>
+              <a:t>Numerical</a:t>
+            </a:r>
+            <a:endParaRPr lang="nb-NO" dirty="0" smtClean="0"/>
+          </a:p>
+          <a:p>
+            <a:pPr lvl="1"/>
+            <a:r>
+              <a:rPr lang="nb-NO" dirty="0" err="1" smtClean="0"/>
+              <a:t>Tags</a:t>
+            </a:r>
+            <a:endParaRPr lang="nb-NO" dirty="0" smtClean="0"/>
+          </a:p>
+          <a:p>
+            <a:pPr lvl="1"/>
+            <a:r>
+              <a:rPr lang="nb-NO" dirty="0" smtClean="0"/>
+              <a:t>All features</a:t>
+            </a:r>
+          </a:p>
+          <a:p>
+            <a:r>
+              <a:rPr lang="nb-NO" dirty="0" smtClean="0"/>
+              <a:t>4 </a:t>
+            </a:r>
+            <a:r>
+              <a:rPr lang="nb-NO" dirty="0" err="1" smtClean="0"/>
+              <a:t>different</a:t>
+            </a:r>
+            <a:r>
+              <a:rPr lang="nb-NO" dirty="0" smtClean="0"/>
+              <a:t> </a:t>
+            </a:r>
+            <a:r>
+              <a:rPr lang="nb-NO" dirty="0" err="1" smtClean="0"/>
+              <a:t>experiments</a:t>
+            </a:r>
+            <a:endParaRPr lang="nb-NO" dirty="0" smtClean="0"/>
+          </a:p>
+          <a:p>
+            <a:pPr lvl="1"/>
+            <a:r>
+              <a:rPr lang="nb-NO" dirty="0" err="1" smtClean="0"/>
+              <a:t>Unprocessed</a:t>
+            </a:r>
+            <a:r>
+              <a:rPr lang="nb-NO" dirty="0" smtClean="0"/>
+              <a:t> data </a:t>
+            </a:r>
+            <a:r>
+              <a:rPr lang="nb-NO" dirty="0" err="1" smtClean="0"/>
+              <a:t>set</a:t>
+            </a:r>
+            <a:r>
+              <a:rPr lang="nb-NO" dirty="0" smtClean="0"/>
+              <a:t> vs. all singular feature, and all </a:t>
+            </a:r>
+            <a:r>
+              <a:rPr lang="nb-NO" dirty="0" err="1" smtClean="0"/>
+              <a:t>questions</a:t>
+            </a:r>
+            <a:endParaRPr lang="nb-NO" dirty="0" smtClean="0"/>
+          </a:p>
+          <a:p>
+            <a:pPr lvl="1"/>
+            <a:r>
+              <a:rPr lang="nb-NO" dirty="0" err="1" smtClean="0"/>
+              <a:t>Unprocessed</a:t>
+            </a:r>
+            <a:r>
+              <a:rPr lang="nb-NO" dirty="0" smtClean="0"/>
+              <a:t> data </a:t>
+            </a:r>
+            <a:r>
+              <a:rPr lang="nb-NO" dirty="0" err="1" smtClean="0"/>
+              <a:t>set</a:t>
+            </a:r>
+            <a:r>
+              <a:rPr lang="nb-NO" dirty="0" smtClean="0"/>
+              <a:t> vs. all singular features, and </a:t>
+            </a:r>
+            <a:r>
+              <a:rPr lang="nb-NO" dirty="0" err="1" smtClean="0"/>
+              <a:t>question</a:t>
+            </a:r>
+            <a:r>
+              <a:rPr lang="nb-NO" dirty="0" smtClean="0"/>
+              <a:t> </a:t>
+            </a:r>
+            <a:r>
+              <a:rPr lang="nb-NO" dirty="0" err="1" smtClean="0"/>
+              <a:t>occurence</a:t>
+            </a:r>
+            <a:r>
+              <a:rPr lang="nb-NO" dirty="0" smtClean="0"/>
+              <a:t> </a:t>
+            </a:r>
+            <a:r>
+              <a:rPr lang="nb-NO" dirty="0" err="1" smtClean="0"/>
+              <a:t>only</a:t>
+            </a:r>
+            <a:endParaRPr lang="nb-NO" dirty="0" smtClean="0"/>
+          </a:p>
+          <a:p>
+            <a:pPr lvl="1"/>
+            <a:r>
+              <a:rPr lang="nb-NO" dirty="0" err="1" smtClean="0"/>
+              <a:t>Unprocessed</a:t>
+            </a:r>
+            <a:r>
+              <a:rPr lang="nb-NO" dirty="0" smtClean="0"/>
+              <a:t> data </a:t>
+            </a:r>
+            <a:r>
+              <a:rPr lang="nb-NO" dirty="0" err="1" smtClean="0"/>
+              <a:t>set</a:t>
+            </a:r>
+            <a:r>
+              <a:rPr lang="nb-NO" dirty="0" smtClean="0"/>
+              <a:t> vs. </a:t>
+            </a:r>
+            <a:r>
+              <a:rPr lang="nb-NO" dirty="0" err="1" smtClean="0"/>
+              <a:t>selected</a:t>
+            </a:r>
+            <a:r>
+              <a:rPr lang="nb-NO" dirty="0" smtClean="0"/>
+              <a:t> </a:t>
+            </a:r>
+            <a:r>
+              <a:rPr lang="nb-NO" dirty="0" err="1" smtClean="0"/>
+              <a:t>set</a:t>
+            </a:r>
+            <a:r>
+              <a:rPr lang="nb-NO" dirty="0" smtClean="0"/>
+              <a:t> </a:t>
+            </a:r>
+            <a:r>
+              <a:rPr lang="nb-NO" dirty="0" err="1" smtClean="0"/>
+              <a:t>of</a:t>
+            </a:r>
+            <a:r>
+              <a:rPr lang="nb-NO" dirty="0" smtClean="0"/>
+              <a:t> features </a:t>
+            </a:r>
+            <a:r>
+              <a:rPr lang="nb-NO" dirty="0" err="1" smtClean="0"/>
+              <a:t>only</a:t>
+            </a:r>
+            <a:endParaRPr lang="nb-NO" dirty="0" smtClean="0"/>
+          </a:p>
+          <a:p>
+            <a:pPr lvl="1"/>
+            <a:r>
+              <a:rPr lang="nb-NO" dirty="0" err="1" smtClean="0"/>
+              <a:t>Stochastic</a:t>
+            </a:r>
+            <a:r>
+              <a:rPr lang="nb-NO" dirty="0" smtClean="0"/>
+              <a:t> Gradient </a:t>
+            </a:r>
+            <a:r>
+              <a:rPr lang="nb-NO" dirty="0" err="1" smtClean="0"/>
+              <a:t>Descent</a:t>
+            </a:r>
+            <a:r>
+              <a:rPr lang="nb-NO" dirty="0" smtClean="0"/>
+              <a:t> (SGD) as </a:t>
+            </a:r>
+            <a:r>
+              <a:rPr lang="nb-NO" dirty="0" err="1" smtClean="0"/>
+              <a:t>classifier</a:t>
+            </a:r>
+            <a:endParaRPr lang="nb-NO" dirty="0" smtClean="0"/>
           </a:p>
         </p:txBody>
       </p:sp>
@@ -3078,6 +3425,561 @@
         <p14:creationId xmlns="" xmlns:p14="http://schemas.microsoft.com/office/powerpoint/2010/main" val="314013529"/>
       </p:ext>
     </p:extLst>
+  </p:cSld>
+  <p:clrMapOvr>
+    <a:masterClrMapping/>
+  </p:clrMapOvr>
+  <p:timing>
+    <p:tnLst>
+      <p:par>
+        <p:cTn id="1" dur="indefinite" restart="never" nodeType="tmRoot"/>
+      </p:par>
+    </p:tnLst>
+  </p:timing>
+</p:sld>
+</file>
+
+<file path=ppt/slides/slide11.xml><?xml version="1.0" encoding="utf-8"?>
+<p:sld xmlns:a="http://schemas.openxmlformats.org/drawingml/2006/main" xmlns:r="http://schemas.openxmlformats.org/officeDocument/2006/relationships" xmlns:p="http://schemas.openxmlformats.org/presentationml/2006/main">
+  <p:cSld>
+    <p:spTree>
+      <p:nvGrpSpPr>
+        <p:cNvPr id="1" name=""/>
+        <p:cNvGrpSpPr/>
+        <p:nvPr/>
+      </p:nvGrpSpPr>
+      <p:grpSpPr>
+        <a:xfrm>
+          <a:off x="0" y="0"/>
+          <a:ext cx="0" cy="0"/>
+          <a:chOff x="0" y="0"/>
+          <a:chExt cx="0" cy="0"/>
+        </a:xfrm>
+      </p:grpSpPr>
+      <p:sp>
+        <p:nvSpPr>
+          <p:cNvPr id="2" name="Tittel 1"/>
+          <p:cNvSpPr>
+            <a:spLocks noGrp="1"/>
+          </p:cNvSpPr>
+          <p:nvPr>
+            <p:ph type="title"/>
+          </p:nvPr>
+        </p:nvSpPr>
+        <p:spPr/>
+        <p:txBody>
+          <a:bodyPr>
+            <a:normAutofit/>
+          </a:bodyPr>
+          <a:lstStyle/>
+          <a:p>
+            <a:r>
+              <a:rPr lang="nb-NO" dirty="0" err="1" smtClean="0"/>
+              <a:t>Conclusion</a:t>
+            </a:r>
+            <a:endParaRPr lang="nb-NO" dirty="0"/>
+          </a:p>
+        </p:txBody>
+      </p:sp>
+      <p:sp>
+        <p:nvSpPr>
+          <p:cNvPr id="3" name="Plassholder for innhold 2"/>
+          <p:cNvSpPr>
+            <a:spLocks noGrp="1"/>
+          </p:cNvSpPr>
+          <p:nvPr>
+            <p:ph idx="1"/>
+          </p:nvPr>
+        </p:nvSpPr>
+        <p:spPr/>
+        <p:txBody>
+          <a:bodyPr/>
+          <a:lstStyle/>
+          <a:p>
+            <a:r>
+              <a:rPr lang="en-US" dirty="0" smtClean="0"/>
+              <a:t>Stack overflow as a question quality metric</a:t>
+            </a:r>
+          </a:p>
+          <a:p>
+            <a:r>
+              <a:rPr lang="en-US" dirty="0" smtClean="0"/>
+              <a:t>Limitations and issues</a:t>
+            </a:r>
+          </a:p>
+          <a:p>
+            <a:r>
+              <a:rPr lang="nb-NO" dirty="0" err="1" smtClean="0"/>
+              <a:t>Further</a:t>
+            </a:r>
+            <a:r>
+              <a:rPr lang="nb-NO" dirty="0" smtClean="0"/>
+              <a:t> </a:t>
+            </a:r>
+            <a:r>
+              <a:rPr lang="nb-NO" dirty="0" err="1" smtClean="0"/>
+              <a:t>work</a:t>
+            </a:r>
+            <a:endParaRPr lang="nb-NO" dirty="0" smtClean="0"/>
+          </a:p>
+          <a:p>
+            <a:pPr lvl="1"/>
+            <a:r>
+              <a:rPr lang="nb-NO" dirty="0" err="1" smtClean="0"/>
+              <a:t>Code</a:t>
+            </a:r>
+            <a:r>
+              <a:rPr lang="nb-NO" dirty="0" smtClean="0"/>
+              <a:t> </a:t>
+            </a:r>
+            <a:r>
+              <a:rPr lang="nb-NO" dirty="0" err="1" smtClean="0"/>
+              <a:t>blocks</a:t>
+            </a:r>
+            <a:r>
+              <a:rPr lang="nb-NO" dirty="0" smtClean="0"/>
+              <a:t>, Links and </a:t>
+            </a:r>
+            <a:r>
+              <a:rPr lang="nb-NO" dirty="0" err="1" smtClean="0"/>
+              <a:t>Numerical</a:t>
+            </a:r>
+            <a:r>
+              <a:rPr lang="nb-NO" dirty="0" smtClean="0"/>
+              <a:t> as a feature </a:t>
+            </a:r>
+            <a:r>
+              <a:rPr lang="nb-NO" dirty="0" err="1" smtClean="0"/>
+              <a:t>set</a:t>
+            </a:r>
+            <a:endParaRPr lang="nb-NO" dirty="0" smtClean="0"/>
+          </a:p>
+          <a:p>
+            <a:pPr lvl="1"/>
+            <a:r>
+              <a:rPr lang="nb-NO" dirty="0" err="1" smtClean="0"/>
+              <a:t>Code</a:t>
+            </a:r>
+            <a:r>
+              <a:rPr lang="nb-NO" dirty="0" smtClean="0"/>
+              <a:t> </a:t>
+            </a:r>
+            <a:r>
+              <a:rPr lang="nb-NO" dirty="0" err="1" smtClean="0"/>
+              <a:t>analysis</a:t>
+            </a:r>
+            <a:endParaRPr lang="nb-NO" dirty="0" smtClean="0"/>
+          </a:p>
+          <a:p>
+            <a:pPr lvl="1"/>
+            <a:r>
+              <a:rPr lang="nb-NO" dirty="0" err="1" smtClean="0"/>
+              <a:t>Sentiment</a:t>
+            </a:r>
+            <a:r>
+              <a:rPr lang="nb-NO" dirty="0" smtClean="0"/>
+              <a:t> </a:t>
+            </a:r>
+            <a:r>
+              <a:rPr lang="nb-NO" dirty="0" err="1" smtClean="0"/>
+              <a:t>analysis</a:t>
+            </a:r>
+            <a:endParaRPr lang="nb-NO" dirty="0" smtClean="0"/>
+          </a:p>
+          <a:p>
+            <a:pPr lvl="1"/>
+            <a:r>
+              <a:rPr lang="nb-NO" dirty="0" err="1" smtClean="0"/>
+              <a:t>Version</a:t>
+            </a:r>
+            <a:r>
+              <a:rPr lang="nb-NO" dirty="0" smtClean="0"/>
+              <a:t> </a:t>
+            </a:r>
+            <a:r>
+              <a:rPr lang="nb-NO" dirty="0" err="1" smtClean="0"/>
+              <a:t>numbering</a:t>
+            </a:r>
+            <a:endParaRPr lang="nb-NO" dirty="0" smtClean="0"/>
+          </a:p>
+        </p:txBody>
+      </p:sp>
+      <p:sp>
+        <p:nvSpPr>
+          <p:cNvPr id="4" name="TekstSylinder 3"/>
+          <p:cNvSpPr txBox="1"/>
+          <p:nvPr/>
+        </p:nvSpPr>
+        <p:spPr>
+          <a:xfrm rot="16200000">
+            <a:off x="6866691" y="1723023"/>
+            <a:ext cx="3751343" cy="369332"/>
+          </a:xfrm>
+          <a:prstGeom prst="rect">
+            <a:avLst/>
+          </a:prstGeom>
+          <a:noFill/>
+        </p:spPr>
+        <p:txBody>
+          <a:bodyPr wrap="square" rtlCol="0">
+            <a:spAutoFit/>
+          </a:bodyPr>
+          <a:lstStyle/>
+          <a:p>
+            <a:r>
+              <a:rPr lang="nb-NO" spc="100" dirty="0">
+                <a:solidFill>
+                  <a:schemeClr val="bg1">
+                    <a:lumMod val="75000"/>
+                  </a:schemeClr>
+                </a:solidFill>
+                <a:latin typeface="Arial"/>
+                <a:cs typeface="Arial"/>
+              </a:rPr>
+              <a:t>Trondheim – Gjøvik – Ålesund</a:t>
+            </a:r>
+          </a:p>
+        </p:txBody>
+      </p:sp>
+    </p:spTree>
+    <p:extLst>
+      <p:ext uri="{BB962C8B-B14F-4D97-AF65-F5344CB8AC3E}">
+        <p14:creationId xmlns="" xmlns:p14="http://schemas.microsoft.com/office/powerpoint/2010/main" val="314013529"/>
+      </p:ext>
+    </p:extLst>
+  </p:cSld>
+  <p:clrMapOvr>
+    <a:masterClrMapping/>
+  </p:clrMapOvr>
+  <p:timing>
+    <p:tnLst>
+      <p:par>
+        <p:cTn id="1" dur="indefinite" restart="never" nodeType="tmRoot"/>
+      </p:par>
+    </p:tnLst>
+  </p:timing>
+</p:sld>
+</file>
+
+<file path=ppt/slides/slide12.xml><?xml version="1.0" encoding="utf-8"?>
+<p:sld xmlns:a="http://schemas.openxmlformats.org/drawingml/2006/main" xmlns:r="http://schemas.openxmlformats.org/officeDocument/2006/relationships" xmlns:p="http://schemas.openxmlformats.org/presentationml/2006/main">
+  <p:cSld>
+    <p:spTree>
+      <p:nvGrpSpPr>
+        <p:cNvPr id="1" name=""/>
+        <p:cNvGrpSpPr/>
+        <p:nvPr/>
+      </p:nvGrpSpPr>
+      <p:grpSpPr>
+        <a:xfrm>
+          <a:off x="0" y="0"/>
+          <a:ext cx="0" cy="0"/>
+          <a:chOff x="0" y="0"/>
+          <a:chExt cx="0" cy="0"/>
+        </a:xfrm>
+      </p:grpSpPr>
+      <p:sp>
+        <p:nvSpPr>
+          <p:cNvPr id="2" name="Tittel 1"/>
+          <p:cNvSpPr>
+            <a:spLocks noGrp="1"/>
+          </p:cNvSpPr>
+          <p:nvPr>
+            <p:ph type="title"/>
+          </p:nvPr>
+        </p:nvSpPr>
+        <p:spPr>
+          <a:xfrm>
+            <a:off x="457200" y="2022990"/>
+            <a:ext cx="8229600" cy="1143000"/>
+          </a:xfrm>
+        </p:spPr>
+        <p:txBody>
+          <a:bodyPr/>
+          <a:lstStyle/>
+          <a:p>
+            <a:pPr algn="ctr"/>
+            <a:r>
+              <a:rPr lang="nb-NO" dirty="0" smtClean="0"/>
+              <a:t>Demo</a:t>
+            </a:r>
+            <a:endParaRPr lang="nb-NO" dirty="0"/>
+          </a:p>
+        </p:txBody>
+      </p:sp>
+      <p:sp>
+        <p:nvSpPr>
+          <p:cNvPr id="4" name="TekstSylinder 3"/>
+          <p:cNvSpPr txBox="1"/>
+          <p:nvPr/>
+        </p:nvSpPr>
+        <p:spPr>
+          <a:xfrm rot="16200000">
+            <a:off x="6866691" y="1723023"/>
+            <a:ext cx="3751343" cy="369332"/>
+          </a:xfrm>
+          <a:prstGeom prst="rect">
+            <a:avLst/>
+          </a:prstGeom>
+          <a:noFill/>
+        </p:spPr>
+        <p:txBody>
+          <a:bodyPr wrap="square" rtlCol="0">
+            <a:spAutoFit/>
+          </a:bodyPr>
+          <a:lstStyle/>
+          <a:p>
+            <a:r>
+              <a:rPr lang="nb-NO" spc="100" dirty="0">
+                <a:solidFill>
+                  <a:schemeClr val="bg1">
+                    <a:lumMod val="75000"/>
+                  </a:schemeClr>
+                </a:solidFill>
+                <a:latin typeface="Arial"/>
+                <a:cs typeface="Arial"/>
+              </a:rPr>
+              <a:t>Trondheim – Gjøvik – Ålesund</a:t>
+            </a:r>
+          </a:p>
+        </p:txBody>
+      </p:sp>
+    </p:spTree>
+    <p:extLst>
+      <p:ext uri="{BB962C8B-B14F-4D97-AF65-F5344CB8AC3E}">
+        <p14:creationId xmlns="" xmlns:p14="http://schemas.microsoft.com/office/powerpoint/2010/main" val="314013529"/>
+      </p:ext>
+    </p:extLst>
+  </p:cSld>
+  <p:clrMapOvr>
+    <a:masterClrMapping/>
+  </p:clrMapOvr>
+  <p:timing>
+    <p:tnLst>
+      <p:par>
+        <p:cTn id="1" dur="indefinite" restart="never" nodeType="tmRoot"/>
+      </p:par>
+    </p:tnLst>
+  </p:timing>
+</p:sld>
+</file>
+
+<file path=ppt/slides/slide13.xml><?xml version="1.0" encoding="utf-8"?>
+<p:sld xmlns:a="http://schemas.openxmlformats.org/drawingml/2006/main" xmlns:r="http://schemas.openxmlformats.org/officeDocument/2006/relationships" xmlns:p="http://schemas.openxmlformats.org/presentationml/2006/main">
+  <p:cSld>
+    <p:spTree>
+      <p:nvGrpSpPr>
+        <p:cNvPr id="1" name=""/>
+        <p:cNvGrpSpPr/>
+        <p:nvPr/>
+      </p:nvGrpSpPr>
+      <p:grpSpPr>
+        <a:xfrm>
+          <a:off x="0" y="0"/>
+          <a:ext cx="0" cy="0"/>
+          <a:chOff x="0" y="0"/>
+          <a:chExt cx="0" cy="0"/>
+        </a:xfrm>
+      </p:grpSpPr>
+      <p:sp>
+        <p:nvSpPr>
+          <p:cNvPr id="2" name="Tittel 1"/>
+          <p:cNvSpPr>
+            <a:spLocks noGrp="1"/>
+          </p:cNvSpPr>
+          <p:nvPr>
+            <p:ph type="title"/>
+          </p:nvPr>
+        </p:nvSpPr>
+        <p:spPr>
+          <a:xfrm>
+            <a:off x="457200" y="2022990"/>
+            <a:ext cx="8229600" cy="1143000"/>
+          </a:xfrm>
+        </p:spPr>
+        <p:txBody>
+          <a:bodyPr/>
+          <a:lstStyle/>
+          <a:p>
+            <a:pPr algn="ctr"/>
+            <a:r>
+              <a:rPr lang="nb-NO" dirty="0" err="1" smtClean="0"/>
+              <a:t>Thanks</a:t>
+            </a:r>
+            <a:r>
+              <a:rPr lang="nb-NO" dirty="0" smtClean="0"/>
+              <a:t> for </a:t>
+            </a:r>
+            <a:r>
+              <a:rPr lang="nb-NO" dirty="0" err="1" smtClean="0"/>
+              <a:t>listening</a:t>
+            </a:r>
+            <a:endParaRPr lang="nb-NO" dirty="0"/>
+          </a:p>
+        </p:txBody>
+      </p:sp>
+      <p:sp>
+        <p:nvSpPr>
+          <p:cNvPr id="4" name="TekstSylinder 3"/>
+          <p:cNvSpPr txBox="1"/>
+          <p:nvPr/>
+        </p:nvSpPr>
+        <p:spPr>
+          <a:xfrm rot="16200000">
+            <a:off x="6866691" y="1723023"/>
+            <a:ext cx="3751343" cy="369332"/>
+          </a:xfrm>
+          <a:prstGeom prst="rect">
+            <a:avLst/>
+          </a:prstGeom>
+          <a:noFill/>
+        </p:spPr>
+        <p:txBody>
+          <a:bodyPr wrap="square" rtlCol="0">
+            <a:spAutoFit/>
+          </a:bodyPr>
+          <a:lstStyle/>
+          <a:p>
+            <a:r>
+              <a:rPr lang="nb-NO" spc="100" dirty="0">
+                <a:solidFill>
+                  <a:schemeClr val="bg1">
+                    <a:lumMod val="75000"/>
+                  </a:schemeClr>
+                </a:solidFill>
+                <a:latin typeface="Arial"/>
+                <a:cs typeface="Arial"/>
+              </a:rPr>
+              <a:t>Trondheim – Gjøvik – Ålesund</a:t>
+            </a:r>
+          </a:p>
+        </p:txBody>
+      </p:sp>
+    </p:spTree>
+    <p:extLst>
+      <p:ext uri="{BB962C8B-B14F-4D97-AF65-F5344CB8AC3E}">
+        <p14:creationId xmlns="" xmlns:p14="http://schemas.microsoft.com/office/powerpoint/2010/main" val="314013529"/>
+      </p:ext>
+    </p:extLst>
+  </p:cSld>
+  <p:clrMapOvr>
+    <a:masterClrMapping/>
+  </p:clrMapOvr>
+  <p:timing>
+    <p:tnLst>
+      <p:par>
+        <p:cTn id="1" dur="indefinite" restart="never" nodeType="tmRoot"/>
+      </p:par>
+    </p:tnLst>
+  </p:timing>
+</p:sld>
+</file>
+
+<file path=ppt/slides/slide14.xml><?xml version="1.0" encoding="utf-8"?>
+<p:sld xmlns:a="http://schemas.openxmlformats.org/drawingml/2006/main" xmlns:r="http://schemas.openxmlformats.org/officeDocument/2006/relationships" xmlns:p="http://schemas.openxmlformats.org/presentationml/2006/main">
+  <p:cSld>
+    <p:spTree>
+      <p:nvGrpSpPr>
+        <p:cNvPr id="1" name=""/>
+        <p:cNvGrpSpPr/>
+        <p:nvPr/>
+      </p:nvGrpSpPr>
+      <p:grpSpPr>
+        <a:xfrm>
+          <a:off x="0" y="0"/>
+          <a:ext cx="0" cy="0"/>
+          <a:chOff x="0" y="0"/>
+          <a:chExt cx="0" cy="0"/>
+        </a:xfrm>
+      </p:grpSpPr>
+      <p:sp>
+        <p:nvSpPr>
+          <p:cNvPr id="2" name="Tittel 1"/>
+          <p:cNvSpPr>
+            <a:spLocks noGrp="1"/>
+          </p:cNvSpPr>
+          <p:nvPr>
+            <p:ph type="title"/>
+          </p:nvPr>
+        </p:nvSpPr>
+        <p:spPr/>
+        <p:txBody>
+          <a:bodyPr/>
+          <a:lstStyle/>
+          <a:p>
+            <a:r>
+              <a:rPr lang="en-GB" dirty="0" smtClean="0"/>
+              <a:t>References</a:t>
+            </a:r>
+            <a:endParaRPr lang="en-GB" dirty="0"/>
+          </a:p>
+        </p:txBody>
+      </p:sp>
+      <p:sp>
+        <p:nvSpPr>
+          <p:cNvPr id="3" name="Plassholder for innhold 2"/>
+          <p:cNvSpPr>
+            <a:spLocks noGrp="1"/>
+          </p:cNvSpPr>
+          <p:nvPr>
+            <p:ph idx="1"/>
+          </p:nvPr>
+        </p:nvSpPr>
+        <p:spPr/>
+        <p:txBody>
+          <a:bodyPr/>
+          <a:lstStyle/>
+          <a:p>
+            <a:r>
+              <a:rPr lang="en-GB" dirty="0" smtClean="0"/>
+              <a:t>[1] </a:t>
+            </a:r>
+            <a:r>
+              <a:rPr lang="en-GB" dirty="0" smtClean="0">
+                <a:hlinkClick r:id="rId2"/>
+              </a:rPr>
+              <a:t>http://stackoverflow.com/questions/927358/how-do-you-undo-the-last-commit</a:t>
+            </a:r>
+            <a:endParaRPr lang="en-GB" dirty="0" smtClean="0"/>
+          </a:p>
+          <a:p>
+            <a:r>
+              <a:rPr lang="en-GB" dirty="0" smtClean="0"/>
+              <a:t>[2] </a:t>
+            </a:r>
+            <a:r>
+              <a:rPr lang="en-GB" dirty="0" smtClean="0">
+                <a:hlinkClick r:id="rId3"/>
+              </a:rPr>
+              <a:t>http://stackoverflow.com/questions/21068763/forcing-a-function-to-return-if-false</a:t>
+            </a:r>
+            <a:endParaRPr lang="en-GB" dirty="0" smtClean="0"/>
+          </a:p>
+          <a:p>
+            <a:r>
+              <a:rPr lang="en-GB" dirty="0" smtClean="0"/>
+              <a:t>[3] </a:t>
+            </a:r>
+            <a:r>
+              <a:rPr lang="en-GB" dirty="0" smtClean="0">
+                <a:hlinkClick r:id="rId4"/>
+              </a:rPr>
+              <a:t>http://stackoverflow.com/help/badges</a:t>
+            </a:r>
+            <a:endParaRPr lang="en-GB" dirty="0" smtClean="0"/>
+          </a:p>
+          <a:p>
+            <a:r>
+              <a:rPr lang="en-GB" dirty="0" smtClean="0"/>
+              <a:t>[X] </a:t>
+            </a:r>
+          </a:p>
+          <a:p>
+            <a:endParaRPr lang="en-GB" dirty="0"/>
+          </a:p>
+        </p:txBody>
+      </p:sp>
+    </p:spTree>
   </p:cSld>
   <p:clrMapOvr>
     <a:masterClrMapping/>
@@ -3203,7 +4105,6 @@
               <a:rPr lang="nb-NO" dirty="0" smtClean="0"/>
               <a:t> (SVM)</a:t>
             </a:r>
-            <a:endParaRPr lang="nb-NO" dirty="0" smtClean="0"/>
           </a:p>
           <a:p>
             <a:r>
@@ -3407,12 +4308,50 @@
               <a:rPr lang="nb-NO" dirty="0" smtClean="0"/>
               <a:t> for programmers</a:t>
             </a:r>
+          </a:p>
+          <a:p>
+            <a:r>
+              <a:rPr lang="nb-NO" dirty="0" err="1" smtClean="0"/>
+              <a:t>Model</a:t>
+            </a:r>
+            <a:r>
+              <a:rPr lang="nb-NO" dirty="0" smtClean="0"/>
+              <a:t> </a:t>
+            </a:r>
+            <a:r>
+              <a:rPr lang="nb-NO" dirty="0" err="1" smtClean="0"/>
+              <a:t>which</a:t>
+            </a:r>
+            <a:r>
+              <a:rPr lang="nb-NO" dirty="0" smtClean="0"/>
+              <a:t> </a:t>
+            </a:r>
+            <a:r>
+              <a:rPr lang="nb-NO" dirty="0" err="1" smtClean="0"/>
+              <a:t>Stack</a:t>
+            </a:r>
+            <a:r>
+              <a:rPr lang="nb-NO" dirty="0" smtClean="0"/>
+              <a:t> Exchange is </a:t>
+            </a:r>
+            <a:r>
+              <a:rPr lang="nb-NO" dirty="0" err="1" smtClean="0"/>
+              <a:t>built</a:t>
+            </a:r>
+            <a:r>
+              <a:rPr lang="nb-NO" dirty="0" smtClean="0"/>
+              <a:t> </a:t>
+            </a:r>
+            <a:r>
+              <a:rPr lang="nb-NO" dirty="0" err="1" smtClean="0"/>
+              <a:t>on</a:t>
+            </a:r>
             <a:endParaRPr lang="nb-NO" dirty="0" smtClean="0"/>
           </a:p>
           <a:p>
             <a:r>
               <a:rPr lang="nb-NO" dirty="0" err="1" smtClean="0"/>
-              <a:t>Model</a:t>
+              <a:t>Uses</a:t>
             </a:r>
             <a:r>
               <a:rPr lang="nb-NO" dirty="0" smtClean="0"/>
@@ -3420,7 +4359,15 @@
             </a:r>
             <a:r>
               <a:rPr lang="nb-NO" dirty="0" err="1" smtClean="0"/>
-              <a:t>which</a:t>
+              <a:t>gamification</a:t>
+            </a:r>
+            <a:r>
+              <a:rPr lang="nb-NO" dirty="0" smtClean="0"/>
+              <a:t> to </a:t>
+            </a:r>
+            <a:r>
+              <a:rPr lang="nb-NO" dirty="0" err="1" smtClean="0"/>
+              <a:t>reward</a:t>
             </a:r>
             <a:r>
               <a:rPr lang="nb-NO" dirty="0" smtClean="0"/>
@@ -3428,15 +4375,47 @@
             </a:r>
             <a:r>
               <a:rPr lang="nb-NO" dirty="0" err="1" smtClean="0"/>
-              <a:t>Stack</a:t>
-            </a:r>
-            <a:r>
-              <a:rPr lang="nb-NO" dirty="0" smtClean="0"/>
-              <a:t> Exchange is </a:t>
-            </a:r>
-            <a:r>
-              <a:rPr lang="nb-NO" dirty="0" err="1" smtClean="0"/>
-              <a:t>built</a:t>
+              <a:t>users</a:t>
+            </a:r>
+            <a:r>
+              <a:rPr lang="nb-NO" dirty="0" smtClean="0"/>
+              <a:t> for </a:t>
+            </a:r>
+            <a:r>
+              <a:rPr lang="nb-NO" dirty="0" err="1" smtClean="0"/>
+              <a:t>participation</a:t>
+            </a:r>
+            <a:endParaRPr lang="nb-NO" dirty="0" smtClean="0"/>
+          </a:p>
+          <a:p>
+            <a:pPr lvl="1"/>
+            <a:r>
+              <a:rPr lang="nb-NO" dirty="0" err="1" smtClean="0"/>
+              <a:t>Reputation</a:t>
+            </a:r>
+            <a:endParaRPr lang="nb-NO" dirty="0" smtClean="0"/>
+          </a:p>
+          <a:p>
+            <a:pPr lvl="1"/>
+            <a:r>
+              <a:rPr lang="nb-NO" dirty="0" err="1" smtClean="0"/>
+              <a:t>Votes</a:t>
+            </a:r>
+            <a:endParaRPr lang="nb-NO" dirty="0" smtClean="0"/>
+          </a:p>
+          <a:p>
+            <a:pPr lvl="1"/>
+            <a:r>
+              <a:rPr lang="nb-NO" dirty="0" err="1" smtClean="0"/>
+              <a:t>Badges</a:t>
+            </a:r>
+            <a:endParaRPr lang="nb-NO" dirty="0" smtClean="0"/>
+          </a:p>
+          <a:p>
+            <a:pPr lvl="1"/>
+            <a:r>
+              <a:rPr lang="nb-NO" dirty="0" err="1" smtClean="0"/>
+              <a:t>Accepted</a:t>
             </a:r>
             <a:r>
               <a:rPr lang="nb-NO" dirty="0" smtClean="0"/>
@@ -3444,169 +4423,89 @@
             </a:r>
             <a:r>
               <a:rPr lang="nb-NO" dirty="0" err="1" smtClean="0"/>
+              <a:t>answer</a:t>
+            </a:r>
+            <a:endParaRPr lang="nb-NO" dirty="0" smtClean="0"/>
+          </a:p>
+          <a:p>
+            <a:r>
+              <a:rPr lang="nb-NO" dirty="0" smtClean="0"/>
+              <a:t>Who </a:t>
+            </a:r>
+            <a:r>
+              <a:rPr lang="nb-NO" dirty="0" err="1" smtClean="0"/>
+              <a:t>are</a:t>
+            </a:r>
+            <a:r>
+              <a:rPr lang="nb-NO" dirty="0" smtClean="0"/>
+              <a:t> </a:t>
+            </a:r>
+            <a:r>
+              <a:rPr lang="nb-NO" dirty="0" err="1" smtClean="0"/>
+              <a:t>the</a:t>
+            </a:r>
+            <a:r>
+              <a:rPr lang="nb-NO" dirty="0" smtClean="0"/>
+              <a:t> </a:t>
+            </a:r>
+            <a:r>
+              <a:rPr lang="nb-NO" dirty="0" err="1" smtClean="0"/>
+              <a:t>experts</a:t>
+            </a:r>
+            <a:r>
+              <a:rPr lang="nb-NO" dirty="0" smtClean="0"/>
+              <a:t>?</a:t>
+            </a:r>
+          </a:p>
+          <a:p>
+            <a:r>
+              <a:rPr lang="nb-NO" dirty="0" err="1" smtClean="0"/>
+              <a:t>What</a:t>
+            </a:r>
+            <a:r>
+              <a:rPr lang="nb-NO" dirty="0" smtClean="0"/>
+              <a:t> </a:t>
+            </a:r>
+            <a:r>
+              <a:rPr lang="nb-NO" dirty="0" err="1" smtClean="0"/>
+              <a:t>defines</a:t>
+            </a:r>
+            <a:r>
+              <a:rPr lang="nb-NO" dirty="0" smtClean="0"/>
+              <a:t> a </a:t>
+            </a:r>
+            <a:r>
+              <a:rPr lang="nb-NO" dirty="0" err="1" smtClean="0"/>
+              <a:t>good</a:t>
+            </a:r>
+            <a:r>
+              <a:rPr lang="nb-NO" dirty="0" smtClean="0"/>
+              <a:t> </a:t>
+            </a:r>
+            <a:r>
+              <a:rPr lang="nb-NO" dirty="0" err="1" smtClean="0"/>
+              <a:t>Question</a:t>
+            </a:r>
+            <a:r>
+              <a:rPr lang="nb-NO" dirty="0" smtClean="0"/>
+              <a:t> and </a:t>
+            </a:r>
+            <a:r>
+              <a:rPr lang="nb-NO" dirty="0" err="1" smtClean="0"/>
+              <a:t>Answer</a:t>
+            </a:r>
+            <a:r>
+              <a:rPr lang="nb-NO" dirty="0" smtClean="0"/>
+              <a:t> </a:t>
+            </a:r>
+            <a:r>
+              <a:rPr lang="nb-NO" dirty="0" err="1" smtClean="0"/>
               <a:t>on</a:t>
             </a:r>
-            <a:endParaRPr lang="nb-NO" dirty="0" smtClean="0"/>
-          </a:p>
-          <a:p>
-            <a:r>
-              <a:rPr lang="nb-NO" dirty="0" err="1" smtClean="0"/>
-              <a:t>Uses</a:t>
-            </a:r>
-            <a:r>
-              <a:rPr lang="nb-NO" dirty="0" smtClean="0"/>
-              <a:t> </a:t>
-            </a:r>
-            <a:r>
-              <a:rPr lang="nb-NO" dirty="0" err="1" smtClean="0"/>
-              <a:t>gamification</a:t>
-            </a:r>
-            <a:r>
-              <a:rPr lang="nb-NO" dirty="0" smtClean="0"/>
-              <a:t> to </a:t>
-            </a:r>
-            <a:r>
-              <a:rPr lang="nb-NO" dirty="0" err="1" smtClean="0"/>
-              <a:t>reward</a:t>
-            </a:r>
-            <a:r>
-              <a:rPr lang="nb-NO" dirty="0" smtClean="0"/>
-              <a:t> </a:t>
-            </a:r>
-            <a:r>
-              <a:rPr lang="nb-NO" dirty="0" err="1" smtClean="0"/>
-              <a:t>users</a:t>
-            </a:r>
-            <a:r>
-              <a:rPr lang="nb-NO" dirty="0" smtClean="0"/>
-              <a:t> for </a:t>
-            </a:r>
-            <a:r>
-              <a:rPr lang="nb-NO" dirty="0" err="1" smtClean="0"/>
-              <a:t>participation</a:t>
-            </a:r>
-            <a:endParaRPr lang="nb-NO" dirty="0" smtClean="0"/>
-          </a:p>
-          <a:p>
-            <a:pPr lvl="1"/>
-            <a:r>
-              <a:rPr lang="nb-NO" dirty="0" err="1" smtClean="0"/>
-              <a:t>Reputation</a:t>
-            </a:r>
-            <a:endParaRPr lang="nb-NO" dirty="0" smtClean="0"/>
-          </a:p>
-          <a:p>
-            <a:pPr lvl="1"/>
-            <a:r>
-              <a:rPr lang="nb-NO" dirty="0" err="1" smtClean="0"/>
-              <a:t>Votes</a:t>
-            </a:r>
-            <a:endParaRPr lang="nb-NO" dirty="0" smtClean="0"/>
-          </a:p>
-          <a:p>
-            <a:pPr lvl="1"/>
-            <a:r>
-              <a:rPr lang="nb-NO" dirty="0" err="1" smtClean="0"/>
-              <a:t>Badges</a:t>
-            </a:r>
-            <a:endParaRPr lang="nb-NO" dirty="0" smtClean="0"/>
-          </a:p>
-          <a:p>
-            <a:pPr lvl="1"/>
-            <a:r>
-              <a:rPr lang="nb-NO" dirty="0" err="1" smtClean="0"/>
-              <a:t>Accepted</a:t>
-            </a:r>
-            <a:r>
-              <a:rPr lang="nb-NO" dirty="0" smtClean="0"/>
-              <a:t> </a:t>
-            </a:r>
-            <a:r>
-              <a:rPr lang="nb-NO" dirty="0" err="1" smtClean="0"/>
-              <a:t>answer</a:t>
-            </a:r>
-            <a:endParaRPr lang="nb-NO" dirty="0" smtClean="0"/>
-          </a:p>
-          <a:p>
-            <a:r>
-              <a:rPr lang="nb-NO" dirty="0" smtClean="0"/>
-              <a:t>Who </a:t>
-            </a:r>
-            <a:r>
-              <a:rPr lang="nb-NO" dirty="0" err="1" smtClean="0"/>
-              <a:t>are</a:t>
-            </a:r>
-            <a:r>
-              <a:rPr lang="nb-NO" dirty="0" smtClean="0"/>
-              <a:t> </a:t>
-            </a:r>
-            <a:r>
-              <a:rPr lang="nb-NO" dirty="0" err="1" smtClean="0"/>
-              <a:t>the</a:t>
-            </a:r>
-            <a:r>
-              <a:rPr lang="nb-NO" dirty="0" smtClean="0"/>
-              <a:t> </a:t>
-            </a:r>
-            <a:r>
-              <a:rPr lang="nb-NO" dirty="0" err="1" smtClean="0"/>
-              <a:t>experts</a:t>
-            </a:r>
-            <a:r>
-              <a:rPr lang="nb-NO" dirty="0" smtClean="0"/>
-              <a:t>?</a:t>
-            </a:r>
-          </a:p>
-          <a:p>
-            <a:r>
-              <a:rPr lang="nb-NO" dirty="0" err="1" smtClean="0"/>
-              <a:t>What</a:t>
-            </a:r>
-            <a:r>
-              <a:rPr lang="nb-NO" dirty="0" smtClean="0"/>
-              <a:t> </a:t>
-            </a:r>
-            <a:r>
-              <a:rPr lang="nb-NO" dirty="0" err="1" smtClean="0"/>
-              <a:t>defines</a:t>
-            </a:r>
-            <a:r>
-              <a:rPr lang="nb-NO" dirty="0" smtClean="0"/>
-              <a:t> a </a:t>
-            </a:r>
-            <a:r>
-              <a:rPr lang="nb-NO" dirty="0" err="1" smtClean="0"/>
-              <a:t>good</a:t>
-            </a:r>
-            <a:r>
-              <a:rPr lang="nb-NO" dirty="0" smtClean="0"/>
-              <a:t> </a:t>
-            </a:r>
-            <a:r>
-              <a:rPr lang="nb-NO" dirty="0" err="1" smtClean="0"/>
-              <a:t>Question</a:t>
-            </a:r>
-            <a:r>
-              <a:rPr lang="nb-NO" dirty="0" smtClean="0"/>
-              <a:t> and </a:t>
-            </a:r>
-            <a:r>
-              <a:rPr lang="nb-NO" dirty="0" err="1" smtClean="0"/>
-              <a:t>Answer</a:t>
-            </a:r>
-            <a:r>
-              <a:rPr lang="nb-NO" dirty="0" smtClean="0"/>
-              <a:t> </a:t>
-            </a:r>
-            <a:r>
-              <a:rPr lang="nb-NO" dirty="0" err="1" smtClean="0"/>
-              <a:t>on</a:t>
-            </a:r>
             <a:r>
               <a:rPr lang="nb-NO" dirty="0" smtClean="0"/>
               <a:t> SO?</a:t>
             </a:r>
-            <a:endParaRPr lang="nb-NO" dirty="0" smtClean="0"/>
           </a:p>
         </p:txBody>
       </p:sp>
@@ -3684,108 +4583,71 @@
           <a:chExt cx="0" cy="0"/>
         </a:xfrm>
       </p:grpSpPr>
-      <p:sp>
-        <p:nvSpPr>
-          <p:cNvPr id="2" name="Tittel 1"/>
-          <p:cNvSpPr>
-            <a:spLocks noGrp="1"/>
-          </p:cNvSpPr>
-          <p:nvPr>
-            <p:ph type="title"/>
-          </p:nvPr>
-        </p:nvSpPr>
-        <p:spPr/>
-        <p:txBody>
-          <a:bodyPr>
-            <a:normAutofit/>
+      <p:pic>
+        <p:nvPicPr>
+          <p:cNvPr id="8" name="Bilde 7" descr="up_voted.PNG"/>
+          <p:cNvPicPr>
+            <a:picLocks noChangeAspect="1"/>
+          </p:cNvPicPr>
+          <p:nvPr/>
+        </p:nvPicPr>
+        <p:blipFill>
+          <a:blip r:embed="rId2"/>
+          <a:stretch>
+            <a:fillRect/>
+          </a:stretch>
+        </p:blipFill>
+        <p:spPr>
+          <a:xfrm>
+            <a:off x="1185194" y="50240"/>
+            <a:ext cx="7139459" cy="6390752"/>
+          </a:xfrm>
+          <a:prstGeom prst="rect">
+            <a:avLst/>
+          </a:prstGeom>
+        </p:spPr>
+      </p:pic>
+      <p:sp>
+        <p:nvSpPr>
+          <p:cNvPr id="9" name="TekstSylinder 8"/>
+          <p:cNvSpPr txBox="1"/>
+          <p:nvPr/>
+        </p:nvSpPr>
+        <p:spPr>
+          <a:xfrm>
+            <a:off x="8551147" y="6035264"/>
+            <a:ext cx="442750" cy="369332"/>
+          </a:xfrm>
+          <a:prstGeom prst="rect">
+            <a:avLst/>
+          </a:prstGeom>
+          <a:noFill/>
+        </p:spPr>
+        <p:txBody>
+          <a:bodyPr wrap="none" rtlCol="0">
+            <a:spAutoFit/>
           </a:bodyPr>
           <a:lstStyle/>
           <a:p>
             <a:r>
-              <a:rPr lang="nb-NO" dirty="0" err="1" smtClean="0"/>
-              <a:t>What</a:t>
-            </a:r>
-            <a:r>
-              <a:rPr lang="nb-NO" dirty="0" smtClean="0"/>
-              <a:t> is a </a:t>
-            </a:r>
-            <a:r>
-              <a:rPr lang="nb-NO" dirty="0" err="1" smtClean="0"/>
-              <a:t>question</a:t>
-            </a:r>
-            <a:r>
-              <a:rPr lang="nb-NO" dirty="0" smtClean="0"/>
-              <a:t>?</a:t>
-            </a:r>
-            <a:endParaRPr lang="en-GB" dirty="0"/>
-          </a:p>
-        </p:txBody>
-      </p:sp>
-      <p:sp>
-        <p:nvSpPr>
-          <p:cNvPr id="3" name="Plassholder for innhold 2"/>
-          <p:cNvSpPr>
-            <a:spLocks noGrp="1"/>
-          </p:cNvSpPr>
-          <p:nvPr>
-            <p:ph idx="1"/>
-          </p:nvPr>
-        </p:nvSpPr>
-        <p:spPr/>
-        <p:txBody>
-          <a:bodyPr/>
-          <a:lstStyle/>
-          <a:p>
-            <a:r>
-              <a:rPr lang="en-GB" dirty="0" smtClean="0"/>
-              <a:t>Factoid vs. Broad questions</a:t>
-            </a:r>
-          </a:p>
-          <a:p>
-            <a:r>
-              <a:rPr lang="en-GB" dirty="0" smtClean="0"/>
-              <a:t>In education: Learn something new, or evaluate knowledge</a:t>
-            </a:r>
-          </a:p>
-          <a:p>
-            <a:r>
-              <a:rPr lang="en-GB" dirty="0" smtClean="0"/>
-              <a:t>Could be the goal of your research</a:t>
-            </a:r>
-          </a:p>
-          <a:p>
-            <a:r>
-              <a:rPr lang="en-GB" dirty="0" smtClean="0"/>
-              <a:t>The quality of a question can be equal to the quality of the answer</a:t>
-            </a:r>
-          </a:p>
-          <a:p>
-            <a:r>
-              <a:rPr lang="en-GB" dirty="0" smtClean="0"/>
-              <a:t>Question classification: Categorizing questions</a:t>
-            </a:r>
-          </a:p>
-          <a:p>
-            <a:pPr lvl="1"/>
-            <a:r>
-              <a:rPr lang="en-GB" dirty="0" smtClean="0"/>
-              <a:t>WH-words</a:t>
-            </a:r>
-          </a:p>
-          <a:p>
-            <a:pPr lvl="1"/>
-            <a:r>
-              <a:rPr lang="en-GB" dirty="0" smtClean="0"/>
-              <a:t>Bag-of-Words and N-grams</a:t>
-            </a:r>
-          </a:p>
-          <a:p>
-            <a:pPr lvl="1"/>
-            <a:r>
-              <a:rPr lang="en-GB" dirty="0" smtClean="0"/>
-              <a:t>Word mapping and processing</a:t>
-            </a:r>
-            <a:endParaRPr lang="en-GB" dirty="0"/>
+              <a:rPr lang="en-GB" dirty="0" smtClean="0">
+                <a:solidFill>
+                  <a:schemeClr val="tx1">
+                    <a:lumMod val="50000"/>
+                    <a:lumOff val="50000"/>
+                  </a:schemeClr>
+                </a:solidFill>
+              </a:rPr>
+              <a:t>[1]</a:t>
+            </a:r>
+            <a:endParaRPr lang="en-GB" dirty="0">
+              <a:solidFill>
+                <a:schemeClr val="tx1">
+                  <a:lumMod val="50000"/>
+                  <a:lumOff val="50000"/>
+                </a:schemeClr>
+              </a:solidFill>
+            </a:endParaRPr>
           </a:p>
         </p:txBody>
       </p:sp>
@@ -3794,6 +4656,13 @@
   <p:clrMapOvr>
     <a:masterClrMapping/>
   </p:clrMapOvr>
+  <p:timing>
+    <p:tnLst>
+      <p:par>
+        <p:cTn id="1" dur="indefinite" restart="never" nodeType="tmRoot"/>
+      </p:par>
+    </p:tnLst>
+  </p:timing>
 </p:sld>
 </file>
 
@@ -3814,121 +4683,71 @@
           <a:chExt cx="0" cy="0"/>
         </a:xfrm>
       </p:grpSpPr>
-      <p:sp>
-        <p:nvSpPr>
-          <p:cNvPr id="2" name="Tittel 1"/>
-          <p:cNvSpPr>
-            <a:spLocks noGrp="1"/>
-          </p:cNvSpPr>
-          <p:nvPr>
-            <p:ph type="title"/>
-          </p:nvPr>
-        </p:nvSpPr>
-        <p:spPr/>
-        <p:txBody>
-          <a:bodyPr/>
+      <p:pic>
+        <p:nvPicPr>
+          <p:cNvPr id="4" name="Bilde 3" descr="down_voted.PNG"/>
+          <p:cNvPicPr>
+            <a:picLocks noChangeAspect="1"/>
+          </p:cNvPicPr>
+          <p:nvPr/>
+        </p:nvPicPr>
+        <p:blipFill>
+          <a:blip r:embed="rId3"/>
+          <a:stretch>
+            <a:fillRect/>
+          </a:stretch>
+        </p:blipFill>
+        <p:spPr>
+          <a:xfrm>
+            <a:off x="2288671" y="0"/>
+            <a:ext cx="4268906" cy="6410848"/>
+          </a:xfrm>
+          <a:prstGeom prst="rect">
+            <a:avLst/>
+          </a:prstGeom>
+        </p:spPr>
+      </p:pic>
+      <p:sp>
+        <p:nvSpPr>
+          <p:cNvPr id="5" name="TekstSylinder 4"/>
+          <p:cNvSpPr txBox="1"/>
+          <p:nvPr/>
+        </p:nvSpPr>
+        <p:spPr>
+          <a:xfrm>
+            <a:off x="8551147" y="6035264"/>
+            <a:ext cx="442750" cy="369332"/>
+          </a:xfrm>
+          <a:prstGeom prst="rect">
+            <a:avLst/>
+          </a:prstGeom>
+          <a:noFill/>
+        </p:spPr>
+        <p:txBody>
+          <a:bodyPr wrap="none" rtlCol="0">
+            <a:spAutoFit/>
+          </a:bodyPr>
           <a:lstStyle/>
           <a:p>
             <a:r>
-              <a:rPr lang="nb-NO" dirty="0" smtClean="0"/>
-              <a:t>Support </a:t>
-            </a:r>
-            <a:r>
-              <a:rPr lang="nb-NO" dirty="0" err="1" smtClean="0"/>
-              <a:t>Vector</a:t>
-            </a:r>
-            <a:r>
-              <a:rPr lang="nb-NO" dirty="0" smtClean="0"/>
-              <a:t> </a:t>
-            </a:r>
-            <a:r>
-              <a:rPr lang="nb-NO" dirty="0" err="1" smtClean="0"/>
-              <a:t>Machine</a:t>
-            </a:r>
-            <a:r>
-              <a:rPr lang="nb-NO" dirty="0" smtClean="0"/>
-              <a:t> (SVM)</a:t>
-            </a:r>
-          </a:p>
-        </p:txBody>
-      </p:sp>
-      <p:sp>
-        <p:nvSpPr>
-          <p:cNvPr id="3" name="Plassholder for innhold 2"/>
-          <p:cNvSpPr>
-            <a:spLocks noGrp="1"/>
-          </p:cNvSpPr>
-          <p:nvPr>
-            <p:ph idx="1"/>
-          </p:nvPr>
-        </p:nvSpPr>
-        <p:spPr/>
-        <p:txBody>
-          <a:bodyPr/>
-          <a:lstStyle/>
-          <a:p>
-            <a:r>
-              <a:rPr lang="en-GB" dirty="0" smtClean="0"/>
-              <a:t>Good for regression and classification problems</a:t>
-            </a:r>
-          </a:p>
-          <a:p>
-            <a:r>
-              <a:rPr lang="en-GB" dirty="0" smtClean="0"/>
-              <a:t>Main focus is binary classification</a:t>
-            </a:r>
-          </a:p>
-          <a:p>
-            <a:r>
-              <a:rPr lang="en-GB" dirty="0" smtClean="0"/>
-              <a:t>Often used for text classification</a:t>
-            </a:r>
-          </a:p>
-          <a:p>
-            <a:r>
-              <a:rPr lang="en-GB" dirty="0" smtClean="0"/>
-              <a:t>Separates classes by using a </a:t>
-            </a:r>
-            <a:r>
-              <a:rPr lang="en-GB" dirty="0" err="1" smtClean="0"/>
-              <a:t>hyperplane</a:t>
-            </a:r>
-            <a:endParaRPr lang="en-GB" dirty="0" smtClean="0"/>
-          </a:p>
-          <a:p>
-            <a:r>
-              <a:rPr lang="en-GB" dirty="0" smtClean="0"/>
-              <a:t>Four kernels:</a:t>
-            </a:r>
-          </a:p>
-          <a:p>
-            <a:pPr lvl="1"/>
-            <a:r>
-              <a:rPr lang="en-GB" dirty="0" smtClean="0"/>
-              <a:t>Linear</a:t>
-            </a:r>
-          </a:p>
-          <a:p>
-            <a:pPr lvl="1"/>
-            <a:r>
-              <a:rPr lang="en-GB" dirty="0" smtClean="0"/>
-              <a:t>Radial Basis Function (RBF)</a:t>
-            </a:r>
-          </a:p>
-          <a:p>
-            <a:pPr lvl="1"/>
-            <a:r>
-              <a:rPr lang="en-GB" dirty="0" smtClean="0"/>
-              <a:t>Polynomial</a:t>
-            </a:r>
-          </a:p>
-          <a:p>
-            <a:pPr lvl="1"/>
-            <a:r>
-              <a:rPr lang="en-GB" dirty="0" smtClean="0"/>
-              <a:t>Sigmoid</a:t>
-            </a:r>
-            <a:endParaRPr lang="en-GB" dirty="0"/>
+              <a:rPr lang="en-GB" dirty="0" smtClean="0">
+                <a:solidFill>
+                  <a:schemeClr val="tx1">
+                    <a:lumMod val="50000"/>
+                    <a:lumOff val="50000"/>
+                  </a:schemeClr>
+                </a:solidFill>
+              </a:rPr>
+              <a:t>[2]</a:t>
+            </a:r>
+            <a:endParaRPr lang="en-GB" dirty="0">
+              <a:solidFill>
+                <a:schemeClr val="tx1">
+                  <a:lumMod val="50000"/>
+                  <a:lumOff val="50000"/>
+                </a:schemeClr>
+              </a:solidFill>
+            </a:endParaRPr>
           </a:p>
         </p:txBody>
       </p:sp>
@@ -3937,6 +4756,13 @@
   <p:clrMapOvr>
     <a:masterClrMapping/>
   </p:clrMapOvr>
+  <p:timing>
+    <p:tnLst>
+      <p:par>
+        <p:cTn id="1" dur="indefinite" restart="never" nodeType="tmRoot"/>
+      </p:par>
+    </p:tnLst>
+  </p:timing>
 </p:sld>
 </file>
 
@@ -3957,270 +4783,40 @@
           <a:chExt cx="0" cy="0"/>
         </a:xfrm>
       </p:grpSpPr>
-      <p:sp>
-        <p:nvSpPr>
-          <p:cNvPr id="2" name="Tittel 1"/>
-          <p:cNvSpPr>
-            <a:spLocks noGrp="1"/>
-          </p:cNvSpPr>
-          <p:nvPr>
-            <p:ph type="title"/>
-          </p:nvPr>
-        </p:nvSpPr>
-        <p:spPr/>
-        <p:txBody>
-          <a:bodyPr>
-            <a:normAutofit/>
-          </a:bodyPr>
-          <a:lstStyle/>
-          <a:p>
-            <a:r>
-              <a:rPr lang="nb-NO" dirty="0" err="1" smtClean="0"/>
-              <a:t>Methodology</a:t>
-            </a:r>
-            <a:endParaRPr lang="nb-NO" dirty="0"/>
-          </a:p>
-        </p:txBody>
-      </p:sp>
-      <p:sp>
-        <p:nvSpPr>
-          <p:cNvPr id="3" name="Plassholder for innhold 2"/>
-          <p:cNvSpPr>
-            <a:spLocks noGrp="1"/>
-          </p:cNvSpPr>
-          <p:nvPr>
-            <p:ph idx="1"/>
-          </p:nvPr>
-        </p:nvSpPr>
-        <p:spPr/>
-        <p:txBody>
-          <a:bodyPr/>
-          <a:lstStyle/>
-          <a:p>
-            <a:r>
-              <a:rPr lang="nb-NO" dirty="0" smtClean="0"/>
-              <a:t>Data </a:t>
-            </a:r>
-            <a:r>
-              <a:rPr lang="nb-NO" dirty="0" err="1" smtClean="0"/>
-              <a:t>set</a:t>
-            </a:r>
-            <a:r>
-              <a:rPr lang="nb-NO" dirty="0" smtClean="0"/>
-              <a:t> </a:t>
-            </a:r>
-            <a:r>
-              <a:rPr lang="nb-NO" dirty="0" err="1" smtClean="0"/>
-              <a:t>based</a:t>
-            </a:r>
-            <a:r>
-              <a:rPr lang="nb-NO" dirty="0" smtClean="0"/>
-              <a:t> </a:t>
-            </a:r>
-            <a:r>
-              <a:rPr lang="nb-NO" dirty="0" err="1" smtClean="0"/>
-              <a:t>on</a:t>
-            </a:r>
-            <a:r>
-              <a:rPr lang="nb-NO" dirty="0" smtClean="0"/>
-              <a:t> data dump from </a:t>
-            </a:r>
-            <a:r>
-              <a:rPr lang="nb-NO" dirty="0" err="1" smtClean="0"/>
-              <a:t>Stack</a:t>
-            </a:r>
-            <a:r>
-              <a:rPr lang="nb-NO" dirty="0" smtClean="0"/>
-              <a:t> Exchange </a:t>
-            </a:r>
-            <a:r>
-              <a:rPr lang="nb-NO" dirty="0" err="1" smtClean="0"/>
-              <a:t>Archive</a:t>
-            </a:r>
-            <a:endParaRPr lang="nb-NO" dirty="0" smtClean="0"/>
-          </a:p>
-          <a:p>
-            <a:pPr lvl="1"/>
-            <a:r>
-              <a:rPr lang="nb-NO" dirty="0" err="1" smtClean="0"/>
-              <a:t>Contains</a:t>
-            </a:r>
-            <a:r>
-              <a:rPr lang="nb-NO" dirty="0" smtClean="0"/>
-              <a:t> XML files </a:t>
-            </a:r>
-            <a:r>
-              <a:rPr lang="nb-NO" dirty="0" err="1" smtClean="0"/>
-              <a:t>based</a:t>
-            </a:r>
-            <a:r>
-              <a:rPr lang="nb-NO" dirty="0" smtClean="0"/>
-              <a:t> </a:t>
-            </a:r>
-            <a:r>
-              <a:rPr lang="nb-NO" dirty="0" err="1" smtClean="0"/>
-              <a:t>on</a:t>
-            </a:r>
-            <a:r>
-              <a:rPr lang="nb-NO" dirty="0" smtClean="0"/>
-              <a:t> </a:t>
-            </a:r>
-            <a:r>
-              <a:rPr lang="nb-NO" dirty="0" err="1" smtClean="0"/>
-              <a:t>table</a:t>
-            </a:r>
-            <a:r>
-              <a:rPr lang="nb-NO" dirty="0" smtClean="0"/>
-              <a:t> </a:t>
-            </a:r>
-            <a:r>
-              <a:rPr lang="nb-NO" dirty="0" err="1" smtClean="0"/>
-              <a:t>content</a:t>
-            </a:r>
-            <a:endParaRPr lang="nb-NO" dirty="0" smtClean="0"/>
-          </a:p>
-          <a:p>
-            <a:pPr lvl="1"/>
-            <a:r>
-              <a:rPr lang="nb-NO" dirty="0" err="1" smtClean="0"/>
-              <a:t>Imported</a:t>
-            </a:r>
-            <a:r>
-              <a:rPr lang="nb-NO" dirty="0" smtClean="0"/>
-              <a:t> data </a:t>
-            </a:r>
-            <a:r>
-              <a:rPr lang="nb-NO" dirty="0" err="1" smtClean="0"/>
-              <a:t>into</a:t>
-            </a:r>
-            <a:r>
-              <a:rPr lang="nb-NO" dirty="0" smtClean="0"/>
-              <a:t> </a:t>
-            </a:r>
-            <a:r>
-              <a:rPr lang="nb-NO" dirty="0" err="1" smtClean="0"/>
-              <a:t>MySQL</a:t>
-            </a:r>
-            <a:r>
-              <a:rPr lang="nb-NO" dirty="0" smtClean="0"/>
-              <a:t> database</a:t>
-            </a:r>
-          </a:p>
-          <a:p>
-            <a:pPr lvl="1"/>
-            <a:r>
-              <a:rPr lang="nb-NO" dirty="0" err="1" smtClean="0"/>
-              <a:t>Imported</a:t>
-            </a:r>
-            <a:r>
-              <a:rPr lang="nb-NO" dirty="0" smtClean="0"/>
-              <a:t> data from </a:t>
-            </a:r>
-            <a:r>
-              <a:rPr lang="nb-NO" dirty="0" err="1" smtClean="0"/>
-              <a:t>MySQL</a:t>
-            </a:r>
-            <a:r>
-              <a:rPr lang="nb-NO" dirty="0" smtClean="0"/>
-              <a:t> database </a:t>
-            </a:r>
-            <a:r>
-              <a:rPr lang="nb-NO" dirty="0" err="1" smtClean="0"/>
-              <a:t>into</a:t>
-            </a:r>
-            <a:r>
-              <a:rPr lang="nb-NO" dirty="0" smtClean="0"/>
-              <a:t> </a:t>
-            </a:r>
-            <a:r>
-              <a:rPr lang="nb-NO" dirty="0" err="1" smtClean="0"/>
-              <a:t>Pandas.DataFrame</a:t>
-            </a:r>
-            <a:endParaRPr lang="nb-NO" dirty="0" smtClean="0"/>
-          </a:p>
-          <a:p>
-            <a:r>
-              <a:rPr lang="nb-NO" dirty="0" err="1" smtClean="0"/>
-              <a:t>Development</a:t>
-            </a:r>
-            <a:r>
-              <a:rPr lang="nb-NO" dirty="0" smtClean="0"/>
-              <a:t>: </a:t>
-            </a:r>
-            <a:r>
-              <a:rPr lang="nb-NO" dirty="0" err="1" smtClean="0"/>
-              <a:t>Python</a:t>
-            </a:r>
-            <a:r>
-              <a:rPr lang="nb-NO" dirty="0" smtClean="0"/>
-              <a:t> 3.5 and </a:t>
-            </a:r>
-            <a:r>
-              <a:rPr lang="nb-NO" dirty="0" err="1" smtClean="0"/>
-              <a:t>Scikit-learn</a:t>
-            </a:r>
-            <a:r>
-              <a:rPr lang="nb-NO" dirty="0" smtClean="0"/>
-              <a:t> (</a:t>
-            </a:r>
-            <a:r>
-              <a:rPr lang="en-GB" dirty="0" smtClean="0"/>
-              <a:t>0.18.dev0)</a:t>
-            </a:r>
-            <a:endParaRPr lang="nb-NO" dirty="0" smtClean="0"/>
-          </a:p>
-          <a:p>
-            <a:r>
-              <a:rPr lang="nb-NO" dirty="0" err="1" smtClean="0"/>
-              <a:t>Question</a:t>
-            </a:r>
-            <a:r>
-              <a:rPr lang="nb-NO" dirty="0" smtClean="0"/>
-              <a:t> </a:t>
-            </a:r>
-            <a:r>
-              <a:rPr lang="nb-NO" dirty="0" err="1" smtClean="0"/>
-              <a:t>processing</a:t>
-            </a:r>
-            <a:endParaRPr lang="nb-NO" dirty="0" smtClean="0"/>
-          </a:p>
-          <a:p>
-            <a:r>
-              <a:rPr lang="nb-NO" dirty="0" err="1" smtClean="0"/>
-              <a:t>Selecting</a:t>
-            </a:r>
-            <a:r>
-              <a:rPr lang="nb-NO" dirty="0" smtClean="0"/>
-              <a:t> </a:t>
-            </a:r>
-            <a:r>
-              <a:rPr lang="nb-NO" dirty="0" err="1" smtClean="0"/>
-              <a:t>questions</a:t>
-            </a:r>
-            <a:r>
-              <a:rPr lang="nb-NO" dirty="0" smtClean="0"/>
-              <a:t> and features</a:t>
-            </a:r>
-          </a:p>
-          <a:p>
-            <a:r>
-              <a:rPr lang="en-US" dirty="0" smtClean="0"/>
-              <a:t>Selecting estimator and parameters for classification</a:t>
-            </a:r>
-            <a:endParaRPr lang="nb-NO" dirty="0" smtClean="0"/>
-          </a:p>
-        </p:txBody>
-      </p:sp>
-      <p:sp>
-        <p:nvSpPr>
-          <p:cNvPr id="4" name="TekstSylinder 3"/>
+      <p:pic>
+        <p:nvPicPr>
+          <p:cNvPr id="4" name="Bilde 3" descr="badges (1).PNG"/>
+          <p:cNvPicPr>
+            <a:picLocks noChangeAspect="1"/>
+          </p:cNvPicPr>
+          <p:nvPr/>
+        </p:nvPicPr>
+        <p:blipFill>
+          <a:blip r:embed="rId2"/>
+          <a:stretch>
+            <a:fillRect/>
+          </a:stretch>
+        </p:blipFill>
+        <p:spPr>
+          <a:xfrm>
+            <a:off x="0" y="0"/>
+            <a:ext cx="6390752" cy="6432962"/>
+          </a:xfrm>
+          <a:prstGeom prst="rect">
+            <a:avLst/>
+          </a:prstGeom>
+        </p:spPr>
+      </p:pic>
+      <p:sp>
+        <p:nvSpPr>
+          <p:cNvPr id="6" name="TekstSylinder 5"/>
           <p:cNvSpPr txBox="1"/>
           <p:nvPr/>
         </p:nvSpPr>
         <p:spPr>
-          <a:xfrm rot="16200000">
-            <a:off x="6866691" y="1723023"/>
-            <a:ext cx="3751343" cy="369332"/>
+          <a:xfrm>
+            <a:off x="8551147" y="6035264"/>
+            <a:ext cx="442750" cy="369332"/>
           </a:xfrm>
           <a:prstGeom prst="rect">
             <a:avLst/>
@@ -4228,32 +4824,34 @@
           <a:noFill/>
         </p:spPr>
         <p:txBody>
-          <a:bodyPr wrap="square" rtlCol="0">
+          <a:bodyPr wrap="none" rtlCol="0">
             <a:spAutoFit/>
           </a:bodyPr>
           <a:lstStyle/>
           <a:p>
             <a:r>
-              <a:rPr lang="nb-NO" spc="100" dirty="0">
+              <a:rPr lang="en-GB" dirty="0" smtClean="0">
                 <a:solidFill>
-                  <a:schemeClr val="bg1">
-                    <a:lumMod val="75000"/>
+                  <a:schemeClr val="tx1">
+                    <a:lumMod val="50000"/>
+                    <a:lumOff val="50000"/>
                   </a:schemeClr>
                 </a:solidFill>
-                <a:latin typeface="Arial"/>
-                <a:cs typeface="Arial"/>
               </a:rPr>
-              <a:t>Trondheim – Gjøvik – Ålesund</a:t>
-            </a:r>
+              <a:t>[3]</a:t>
+            </a:r>
+            <a:endParaRPr lang="en-GB" dirty="0">
+              <a:solidFill>
+                <a:schemeClr val="tx1">
+                  <a:lumMod val="50000"/>
+                  <a:lumOff val="50000"/>
+                </a:schemeClr>
+              </a:solidFill>
+            </a:endParaRPr>
           </a:p>
         </p:txBody>
       </p:sp>
     </p:spTree>
-    <p:extLst>
-      <p:ext uri="{BB962C8B-B14F-4D97-AF65-F5344CB8AC3E}">
-        <p14:creationId xmlns="" xmlns:p14="http://schemas.microsoft.com/office/powerpoint/2010/main" val="314013529"/>
-      </p:ext>
-    </p:extLst>
   </p:cSld>
   <p:clrMapOvr>
     <a:masterClrMapping/>
@@ -4304,17 +4902,21 @@
           <a:p>
             <a:r>
               <a:rPr lang="nb-NO" dirty="0" err="1" smtClean="0"/>
-              <a:t>Experiments</a:t>
-            </a:r>
-            <a:r>
-              <a:rPr lang="nb-NO" dirty="0" smtClean="0"/>
-              <a:t> and </a:t>
-            </a:r>
-            <a:r>
-              <a:rPr lang="nb-NO" dirty="0" err="1" smtClean="0"/>
-              <a:t>Results</a:t>
-            </a:r>
-            <a:endParaRPr lang="nb-NO" dirty="0"/>
+              <a:t>What</a:t>
+            </a:r>
+            <a:r>
+              <a:rPr lang="nb-NO" dirty="0" smtClean="0"/>
+              <a:t> is a </a:t>
+            </a:r>
+            <a:r>
+              <a:rPr lang="nb-NO" dirty="0" err="1" smtClean="0"/>
+              <a:t>question</a:t>
+            </a:r>
+            <a:r>
+              <a:rPr lang="nb-NO" dirty="0" smtClean="0"/>
+              <a:t>?</a:t>
+            </a:r>
+            <a:endParaRPr lang="en-GB" dirty="0"/>
           </a:p>
         </p:txBody>
       </p:sp>
@@ -4328,317 +4930,65 @@
             <p:ph idx="1"/>
           </p:nvPr>
         </p:nvSpPr>
-        <p:spPr>
-          <a:xfrm>
-            <a:off x="457200" y="1600200"/>
-            <a:ext cx="8229600" cy="4830745"/>
-          </a:xfrm>
-        </p:spPr>
-        <p:txBody>
-          <a:bodyPr>
-            <a:normAutofit lnSpcReduction="10000"/>
-          </a:bodyPr>
+        <p:spPr/>
+        <p:txBody>
+          <a:bodyPr/>
           <a:lstStyle/>
           <a:p>
             <a:r>
-              <a:rPr lang="nb-NO" dirty="0" smtClean="0"/>
-              <a:t>6 </a:t>
-            </a:r>
-            <a:r>
-              <a:rPr lang="nb-NO" dirty="0" err="1" smtClean="0"/>
-              <a:t>different</a:t>
-            </a:r>
-            <a:r>
-              <a:rPr lang="nb-NO" dirty="0" smtClean="0"/>
-              <a:t> features</a:t>
+              <a:rPr lang="en-GB" dirty="0" smtClean="0"/>
+              <a:t>Factoid vs. Broad questions</a:t>
+            </a:r>
+          </a:p>
+          <a:p>
+            <a:r>
+              <a:rPr lang="en-GB" dirty="0" smtClean="0"/>
+              <a:t>In education: Learn something new, or evaluate knowledge</a:t>
+            </a:r>
+          </a:p>
+          <a:p>
+            <a:r>
+              <a:rPr lang="en-GB" dirty="0" smtClean="0"/>
+              <a:t>Could be the goal of your research</a:t>
+            </a:r>
+          </a:p>
+          <a:p>
+            <a:r>
+              <a:rPr lang="en-GB" dirty="0" smtClean="0"/>
+              <a:t>The quality of a question can be equal to the quality of the answer</a:t>
+            </a:r>
+          </a:p>
+          <a:p>
+            <a:r>
+              <a:rPr lang="en-GB" dirty="0" smtClean="0"/>
+              <a:t>Question classification: Categorizing questions</a:t>
             </a:r>
           </a:p>
           <a:p>
             <a:pPr lvl="1"/>
             <a:r>
-              <a:rPr lang="nb-NO" dirty="0" err="1" smtClean="0"/>
-              <a:t>Code</a:t>
-            </a:r>
-            <a:r>
-              <a:rPr lang="nb-NO" dirty="0" smtClean="0"/>
-              <a:t> </a:t>
-            </a:r>
-            <a:r>
-              <a:rPr lang="nb-NO" dirty="0" err="1" smtClean="0"/>
-              <a:t>samples</a:t>
-            </a:r>
-            <a:endParaRPr lang="nb-NO" dirty="0" smtClean="0"/>
+              <a:rPr lang="en-GB" dirty="0" smtClean="0"/>
+              <a:t>WH-words</a:t>
+            </a:r>
           </a:p>
           <a:p>
             <a:pPr lvl="1"/>
             <a:r>
-              <a:rPr lang="nb-NO" dirty="0" err="1" smtClean="0"/>
-              <a:t>Hexadecimal</a:t>
-            </a:r>
-            <a:endParaRPr lang="nb-NO" dirty="0" smtClean="0"/>
+              <a:rPr lang="en-GB" dirty="0" smtClean="0"/>
+              <a:t>Bag-of-Words and N-grams</a:t>
+            </a:r>
           </a:p>
           <a:p>
             <a:pPr lvl="1"/>
             <a:r>
-              <a:rPr lang="nb-NO" dirty="0" err="1" smtClean="0"/>
-              <a:t>Homework</a:t>
-            </a:r>
-            <a:r>
-              <a:rPr lang="nb-NO" dirty="0" smtClean="0"/>
-              <a:t> (synonyms for </a:t>
-            </a:r>
-            <a:r>
-              <a:rPr lang="nb-NO" dirty="0" err="1" smtClean="0"/>
-              <a:t>homework</a:t>
-            </a:r>
-            <a:r>
-              <a:rPr lang="nb-NO" dirty="0" smtClean="0"/>
-              <a:t>)</a:t>
-            </a:r>
-          </a:p>
-          <a:p>
-            <a:pPr lvl="1"/>
-            <a:r>
-              <a:rPr lang="nb-NO" dirty="0" smtClean="0"/>
-              <a:t>Links</a:t>
-            </a:r>
-          </a:p>
-          <a:p>
-            <a:pPr lvl="1"/>
-            <a:r>
-              <a:rPr lang="nb-NO" dirty="0" err="1" smtClean="0"/>
-              <a:t>Numerical</a:t>
-            </a:r>
-            <a:endParaRPr lang="nb-NO" dirty="0" smtClean="0"/>
-          </a:p>
-          <a:p>
-            <a:pPr lvl="1"/>
-            <a:r>
-              <a:rPr lang="nb-NO" dirty="0" err="1" smtClean="0"/>
-              <a:t>Tags</a:t>
-            </a:r>
-            <a:endParaRPr lang="nb-NO" dirty="0" smtClean="0"/>
-          </a:p>
-          <a:p>
-            <a:pPr lvl="1"/>
-            <a:r>
-              <a:rPr lang="nb-NO" dirty="0" smtClean="0"/>
-              <a:t>All features</a:t>
-            </a:r>
-            <a:endParaRPr lang="nb-NO" dirty="0" smtClean="0"/>
-          </a:p>
-          <a:p>
-            <a:r>
-              <a:rPr lang="nb-NO" dirty="0" smtClean="0"/>
-              <a:t>4 </a:t>
-            </a:r>
-            <a:r>
-              <a:rPr lang="nb-NO" dirty="0" err="1" smtClean="0"/>
-              <a:t>different</a:t>
-            </a:r>
-            <a:r>
-              <a:rPr lang="nb-NO" dirty="0" smtClean="0"/>
-              <a:t> </a:t>
-            </a:r>
-            <a:r>
-              <a:rPr lang="nb-NO" dirty="0" err="1" smtClean="0"/>
-              <a:t>experiments</a:t>
-            </a:r>
-            <a:endParaRPr lang="nb-NO" dirty="0" smtClean="0"/>
-          </a:p>
-          <a:p>
-            <a:pPr lvl="1"/>
-            <a:r>
-              <a:rPr lang="nb-NO" dirty="0" err="1" smtClean="0"/>
-              <a:t>Unprocessed</a:t>
-            </a:r>
-            <a:r>
-              <a:rPr lang="nb-NO" dirty="0" smtClean="0"/>
-              <a:t> data </a:t>
-            </a:r>
-            <a:r>
-              <a:rPr lang="nb-NO" dirty="0" err="1" smtClean="0"/>
-              <a:t>set</a:t>
-            </a:r>
-            <a:r>
-              <a:rPr lang="nb-NO" dirty="0" smtClean="0"/>
-              <a:t> vs. </a:t>
-            </a:r>
-            <a:r>
-              <a:rPr lang="nb-NO" dirty="0" smtClean="0"/>
-              <a:t>a</a:t>
-            </a:r>
-            <a:r>
-              <a:rPr lang="nb-NO" dirty="0" smtClean="0"/>
-              <a:t>ll singular feature, and all </a:t>
-            </a:r>
-            <a:r>
-              <a:rPr lang="nb-NO" dirty="0" err="1" smtClean="0"/>
-              <a:t>questions</a:t>
-            </a:r>
-            <a:endParaRPr lang="nb-NO" dirty="0" smtClean="0"/>
-          </a:p>
-          <a:p>
-            <a:pPr lvl="1"/>
-            <a:r>
-              <a:rPr lang="nb-NO" dirty="0" err="1" smtClean="0"/>
-              <a:t>Unprocessed</a:t>
-            </a:r>
-            <a:r>
-              <a:rPr lang="nb-NO" dirty="0" smtClean="0"/>
-              <a:t> data </a:t>
-            </a:r>
-            <a:r>
-              <a:rPr lang="nb-NO" dirty="0" err="1" smtClean="0"/>
-              <a:t>set</a:t>
-            </a:r>
-            <a:r>
-              <a:rPr lang="nb-NO" dirty="0" smtClean="0"/>
-              <a:t> vs. all singular features, and </a:t>
-            </a:r>
-            <a:r>
-              <a:rPr lang="nb-NO" dirty="0" err="1" smtClean="0"/>
-              <a:t>question</a:t>
-            </a:r>
-            <a:r>
-              <a:rPr lang="nb-NO" dirty="0" smtClean="0"/>
-              <a:t> </a:t>
-            </a:r>
-            <a:r>
-              <a:rPr lang="nb-NO" dirty="0" err="1" smtClean="0"/>
-              <a:t>occurence</a:t>
-            </a:r>
-            <a:r>
-              <a:rPr lang="nb-NO" dirty="0" smtClean="0"/>
-              <a:t> </a:t>
-            </a:r>
-            <a:r>
-              <a:rPr lang="nb-NO" dirty="0" err="1" smtClean="0"/>
-              <a:t>only</a:t>
-            </a:r>
-            <a:endParaRPr lang="nb-NO" dirty="0" smtClean="0"/>
-          </a:p>
-          <a:p>
-            <a:pPr lvl="1"/>
-            <a:r>
-              <a:rPr lang="nb-NO" dirty="0" err="1" smtClean="0"/>
-              <a:t>Unprocessed</a:t>
-            </a:r>
-            <a:r>
-              <a:rPr lang="nb-NO" dirty="0" smtClean="0"/>
-              <a:t> </a:t>
-            </a:r>
-            <a:r>
-              <a:rPr lang="nb-NO" dirty="0" smtClean="0"/>
-              <a:t>data </a:t>
-            </a:r>
-            <a:r>
-              <a:rPr lang="nb-NO" dirty="0" err="1" smtClean="0"/>
-              <a:t>set</a:t>
-            </a:r>
-            <a:r>
-              <a:rPr lang="nb-NO" dirty="0" smtClean="0"/>
-              <a:t> vs. </a:t>
-            </a:r>
-            <a:r>
-              <a:rPr lang="nb-NO" dirty="0" err="1" smtClean="0"/>
-              <a:t>selected</a:t>
-            </a:r>
-            <a:r>
-              <a:rPr lang="nb-NO" dirty="0" smtClean="0"/>
-              <a:t> </a:t>
-            </a:r>
-            <a:r>
-              <a:rPr lang="nb-NO" dirty="0" err="1" smtClean="0"/>
-              <a:t>set</a:t>
-            </a:r>
-            <a:r>
-              <a:rPr lang="nb-NO" dirty="0" smtClean="0"/>
-              <a:t> </a:t>
-            </a:r>
-            <a:r>
-              <a:rPr lang="nb-NO" dirty="0" err="1" smtClean="0"/>
-              <a:t>of</a:t>
-            </a:r>
-            <a:r>
-              <a:rPr lang="nb-NO" dirty="0" smtClean="0"/>
-              <a:t> features </a:t>
-            </a:r>
-            <a:r>
-              <a:rPr lang="nb-NO" dirty="0" err="1" smtClean="0"/>
-              <a:t>only</a:t>
-            </a:r>
-            <a:endParaRPr lang="nb-NO" dirty="0" smtClean="0"/>
-          </a:p>
-          <a:p>
-            <a:pPr lvl="1"/>
-            <a:r>
-              <a:rPr lang="nb-NO" dirty="0" err="1" smtClean="0"/>
-              <a:t>Stochastic</a:t>
-            </a:r>
-            <a:r>
-              <a:rPr lang="nb-NO" dirty="0" smtClean="0"/>
-              <a:t> Gradient </a:t>
-            </a:r>
-            <a:r>
-              <a:rPr lang="nb-NO" dirty="0" err="1" smtClean="0"/>
-              <a:t>Descent</a:t>
-            </a:r>
-            <a:r>
-              <a:rPr lang="nb-NO" dirty="0" smtClean="0"/>
-              <a:t> (SGD) as </a:t>
-            </a:r>
-            <a:r>
-              <a:rPr lang="nb-NO" dirty="0" err="1" smtClean="0"/>
-              <a:t>classifier</a:t>
-            </a:r>
-            <a:endParaRPr lang="nb-NO" dirty="0" smtClean="0"/>
-          </a:p>
-        </p:txBody>
-      </p:sp>
-      <p:sp>
-        <p:nvSpPr>
-          <p:cNvPr id="4" name="TekstSylinder 3"/>
-          <p:cNvSpPr txBox="1"/>
-          <p:nvPr/>
-        </p:nvSpPr>
-        <p:spPr>
-          <a:xfrm rot="16200000">
-            <a:off x="6866691" y="1723023"/>
-            <a:ext cx="3751343" cy="369332"/>
-          </a:xfrm>
-          <a:prstGeom prst="rect">
-            <a:avLst/>
-          </a:prstGeom>
-          <a:noFill/>
-        </p:spPr>
-        <p:txBody>
-          <a:bodyPr wrap="square" rtlCol="0">
-            <a:spAutoFit/>
-          </a:bodyPr>
-          <a:lstStyle/>
-          <a:p>
-            <a:r>
-              <a:rPr lang="nb-NO" spc="100" dirty="0">
-                <a:solidFill>
-                  <a:schemeClr val="bg1">
-                    <a:lumMod val="75000"/>
-                  </a:schemeClr>
-                </a:solidFill>
-                <a:latin typeface="Arial"/>
-                <a:cs typeface="Arial"/>
-              </a:rPr>
-              <a:t>Trondheim – Gjøvik – Ålesund</a:t>
-            </a:r>
+              <a:rPr lang="en-GB" dirty="0" smtClean="0"/>
+              <a:t>Word mapping and processing</a:t>
+            </a:r>
+            <a:endParaRPr lang="en-GB" dirty="0"/>
           </a:p>
         </p:txBody>
       </p:sp>
     </p:spTree>
-    <p:extLst>
-      <p:ext uri="{BB962C8B-B14F-4D97-AF65-F5344CB8AC3E}">
-        <p14:creationId xmlns="" xmlns:p14="http://schemas.microsoft.com/office/powerpoint/2010/main" val="314013529"/>
-      </p:ext>
-    </p:extLst>
   </p:cSld>
   <p:clrMapOvr>
     <a:masterClrMapping/>
@@ -4682,16 +5032,29 @@
         </p:nvSpPr>
         <p:spPr/>
         <p:txBody>
-          <a:bodyPr>
-            <a:normAutofit/>
-          </a:bodyPr>
+          <a:bodyPr/>
           <a:lstStyle/>
           <a:p>
             <a:r>
-              <a:rPr lang="nb-NO" dirty="0" err="1" smtClean="0"/>
-              <a:t>Conclusion</a:t>
-            </a:r>
-            <a:endParaRPr lang="nb-NO" dirty="0"/>
+              <a:rPr lang="nb-NO" dirty="0" smtClean="0"/>
+              <a:t>Support </a:t>
+            </a:r>
+            <a:r>
+              <a:rPr lang="nb-NO" dirty="0" err="1" smtClean="0"/>
+              <a:t>Vector</a:t>
+            </a:r>
+            <a:r>
+              <a:rPr lang="nb-NO" dirty="0" smtClean="0"/>
+              <a:t> </a:t>
+            </a:r>
+            <a:r>
+              <a:rPr lang="nb-NO" dirty="0" err="1" smtClean="0"/>
+              <a:t>Machine</a:t>
+            </a:r>
+            <a:r>
+              <a:rPr lang="nb-NO" dirty="0" smtClean="0"/>
+              <a:t> (SVM)</a:t>
+            </a:r>
           </a:p>
         </p:txBody>
       </p:sp>
@@ -4711,156 +5074,71 @@
           <a:lstStyle/>
           <a:p>
             <a:r>
-              <a:rPr lang="en-US" dirty="0" smtClean="0"/>
-              <a:t>Stack overflow as a question quality metric</a:t>
-            </a:r>
-          </a:p>
-          <a:p>
-            <a:r>
-              <a:rPr lang="en-US" dirty="0" smtClean="0"/>
-              <a:t>Limitations and issues</a:t>
-            </a:r>
-          </a:p>
-          <a:p>
-            <a:r>
-              <a:rPr lang="nb-NO" dirty="0" err="1" smtClean="0"/>
-              <a:t>Further</a:t>
-            </a:r>
-            <a:r>
-              <a:rPr lang="nb-NO" dirty="0" smtClean="0"/>
-              <a:t> </a:t>
-            </a:r>
-            <a:r>
-              <a:rPr lang="nb-NO" dirty="0" err="1" smtClean="0"/>
-              <a:t>work</a:t>
-            </a:r>
-            <a:endParaRPr lang="nb-NO" dirty="0" smtClean="0"/>
+              <a:rPr lang="en-GB" dirty="0" smtClean="0"/>
+              <a:t>Good for regression and classification problems</a:t>
+            </a:r>
+          </a:p>
+          <a:p>
+            <a:r>
+              <a:rPr lang="en-GB" dirty="0" smtClean="0"/>
+              <a:t>Main focus is binary classification</a:t>
+            </a:r>
+          </a:p>
+          <a:p>
+            <a:r>
+              <a:rPr lang="en-GB" dirty="0" smtClean="0"/>
+              <a:t>Often used for text classification</a:t>
+            </a:r>
+          </a:p>
+          <a:p>
+            <a:r>
+              <a:rPr lang="en-GB" dirty="0" smtClean="0"/>
+              <a:t>Separates classes by using a </a:t>
+            </a:r>
+            <a:r>
+              <a:rPr lang="en-GB" dirty="0" err="1" smtClean="0"/>
+              <a:t>hyperplane</a:t>
+            </a:r>
+            <a:endParaRPr lang="en-GB" dirty="0" smtClean="0"/>
+          </a:p>
+          <a:p>
+            <a:r>
+              <a:rPr lang="en-GB" dirty="0" smtClean="0"/>
+              <a:t>Four kernels:</a:t>
+            </a:r>
           </a:p>
           <a:p>
             <a:pPr lvl="1"/>
             <a:r>
-              <a:rPr lang="nb-NO" dirty="0" err="1" smtClean="0"/>
-              <a:t>Code</a:t>
-            </a:r>
-            <a:r>
-              <a:rPr lang="nb-NO" dirty="0" smtClean="0"/>
-              <a:t> </a:t>
-            </a:r>
-            <a:r>
-              <a:rPr lang="nb-NO" dirty="0" err="1" smtClean="0"/>
-              <a:t>blocks</a:t>
-            </a:r>
-            <a:r>
-              <a:rPr lang="nb-NO" dirty="0" smtClean="0"/>
-              <a:t>, Links and </a:t>
-            </a:r>
-            <a:r>
-              <a:rPr lang="nb-NO" dirty="0" err="1" smtClean="0"/>
-              <a:t>Numerical</a:t>
-            </a:r>
-            <a:r>
-              <a:rPr lang="nb-NO" dirty="0" smtClean="0"/>
-              <a:t> as a feature </a:t>
-            </a:r>
-            <a:r>
-              <a:rPr lang="nb-NO" dirty="0" err="1" smtClean="0"/>
-              <a:t>set</a:t>
-            </a:r>
-            <a:endParaRPr lang="nb-NO" dirty="0" smtClean="0"/>
+              <a:rPr lang="en-GB" dirty="0" smtClean="0"/>
+              <a:t>Linear</a:t>
+            </a:r>
           </a:p>
           <a:p>
             <a:pPr lvl="1"/>
             <a:r>
-              <a:rPr lang="nb-NO" dirty="0" err="1" smtClean="0"/>
-              <a:t>Code</a:t>
-            </a:r>
-            <a:r>
-              <a:rPr lang="nb-NO" dirty="0" smtClean="0"/>
-              <a:t> </a:t>
-            </a:r>
-            <a:r>
-              <a:rPr lang="nb-NO" dirty="0" err="1" smtClean="0"/>
-              <a:t>analysis</a:t>
-            </a:r>
-            <a:endParaRPr lang="nb-NO" dirty="0" smtClean="0"/>
+              <a:rPr lang="en-GB" dirty="0" smtClean="0"/>
+              <a:t>Radial Basis Function (RBF)</a:t>
+            </a:r>
           </a:p>
           <a:p>
             <a:pPr lvl="1"/>
             <a:r>
-              <a:rPr lang="nb-NO" dirty="0" err="1" smtClean="0"/>
-              <a:t>Sentiment</a:t>
-            </a:r>
-            <a:r>
-              <a:rPr lang="nb-NO" dirty="0" smtClean="0"/>
-              <a:t> </a:t>
-            </a:r>
-            <a:r>
-              <a:rPr lang="nb-NO" dirty="0" err="1" smtClean="0"/>
-              <a:t>analysis</a:t>
-            </a:r>
-            <a:endParaRPr lang="nb-NO" dirty="0" smtClean="0"/>
+              <a:rPr lang="en-GB" dirty="0" smtClean="0"/>
+              <a:t>Polynomial</a:t>
+            </a:r>
           </a:p>
           <a:p>
             <a:pPr lvl="1"/>
             <a:r>
-              <a:rPr lang="nb-NO" dirty="0" err="1" smtClean="0"/>
-              <a:t>Version</a:t>
-            </a:r>
-            <a:r>
-              <a:rPr lang="nb-NO" dirty="0" smtClean="0"/>
-              <a:t> </a:t>
-            </a:r>
-            <a:r>
-              <a:rPr lang="nb-NO" dirty="0" err="1" smtClean="0"/>
-              <a:t>numbering</a:t>
-            </a:r>
-            <a:endParaRPr lang="nb-NO" dirty="0" smtClean="0"/>
-          </a:p>
-        </p:txBody>
-      </p:sp>
-      <p:sp>
-        <p:nvSpPr>
-          <p:cNvPr id="4" name="TekstSylinder 3"/>
-          <p:cNvSpPr txBox="1"/>
-          <p:nvPr/>
-        </p:nvSpPr>
-        <p:spPr>
-          <a:xfrm rot="16200000">
-            <a:off x="6866691" y="1723023"/>
-            <a:ext cx="3751343" cy="369332"/>
-          </a:xfrm>
-          <a:prstGeom prst="rect">
-            <a:avLst/>
-          </a:prstGeom>
-          <a:noFill/>
-        </p:spPr>
-        <p:txBody>
-          <a:bodyPr wrap="square" rtlCol="0">
-            <a:spAutoFit/>
-          </a:bodyPr>
-          <a:lstStyle/>
-          <a:p>
-            <a:r>
-              <a:rPr lang="nb-NO" spc="100" dirty="0">
-                <a:solidFill>
-                  <a:schemeClr val="bg1">
-                    <a:lumMod val="75000"/>
-                  </a:schemeClr>
-                </a:solidFill>
-                <a:latin typeface="Arial"/>
-                <a:cs typeface="Arial"/>
-              </a:rPr>
-              <a:t>Trondheim – Gjøvik – Ålesund</a:t>
-            </a:r>
+              <a:rPr lang="en-GB" dirty="0" smtClean="0"/>
+              <a:t>Sigmoid</a:t>
+            </a:r>
+            <a:endParaRPr lang="en-GB" dirty="0"/>
           </a:p>
         </p:txBody>
       </p:sp>
     </p:spTree>
-    <p:extLst>
-      <p:ext uri="{BB962C8B-B14F-4D97-AF65-F5344CB8AC3E}">
-        <p14:creationId xmlns="" xmlns:p14="http://schemas.microsoft.com/office/powerpoint/2010/main" val="314013529"/>
-      </p:ext>
-    </p:extLst>
   </p:cSld>
   <p:clrMapOvr>
     <a:masterClrMapping/>
@@ -4902,22 +5180,247 @@
             <p:ph type="title"/>
           </p:nvPr>
         </p:nvSpPr>
-        <p:spPr>
-          <a:xfrm>
-            <a:off x="457200" y="2022990"/>
-            <a:ext cx="8229600" cy="1143000"/>
-          </a:xfrm>
-        </p:spPr>
+        <p:spPr/>
+        <p:txBody>
+          <a:bodyPr>
+            <a:normAutofit/>
+          </a:bodyPr>
+          <a:lstStyle/>
+          <a:p>
+            <a:r>
+              <a:rPr lang="nb-NO" dirty="0" err="1" smtClean="0"/>
+              <a:t>Methodology</a:t>
+            </a:r>
+            <a:endParaRPr lang="nb-NO" dirty="0"/>
+          </a:p>
+        </p:txBody>
+      </p:sp>
+      <p:sp>
+        <p:nvSpPr>
+          <p:cNvPr id="3" name="Plassholder for innhold 2"/>
+          <p:cNvSpPr>
+            <a:spLocks noGrp="1"/>
+          </p:cNvSpPr>
+          <p:nvPr>
+            <p:ph idx="1"/>
+          </p:nvPr>
+        </p:nvSpPr>
+        <p:spPr/>
         <p:txBody>
           <a:bodyPr/>
           <a:lstStyle/>
           <a:p>
-            <a:pPr algn="ctr"/>
-            <a:r>
-              <a:rPr lang="nb-NO" dirty="0" smtClean="0"/>
-              <a:t>Demo</a:t>
-            </a:r>
-            <a:endParaRPr lang="nb-NO" dirty="0"/>
+            <a:r>
+              <a:rPr lang="nb-NO" dirty="0" smtClean="0"/>
+              <a:t>Data </a:t>
+            </a:r>
+            <a:r>
+              <a:rPr lang="nb-NO" dirty="0" err="1" smtClean="0"/>
+              <a:t>set</a:t>
+            </a:r>
+            <a:r>
+              <a:rPr lang="nb-NO" dirty="0" smtClean="0"/>
+              <a:t> </a:t>
+            </a:r>
+            <a:r>
+              <a:rPr lang="nb-NO" dirty="0" err="1" smtClean="0"/>
+              <a:t>based</a:t>
+            </a:r>
+            <a:r>
+              <a:rPr lang="nb-NO" dirty="0" smtClean="0"/>
+              <a:t> </a:t>
+            </a:r>
+            <a:r>
+              <a:rPr lang="nb-NO" dirty="0" err="1" smtClean="0"/>
+              <a:t>on</a:t>
+            </a:r>
+            <a:r>
+              <a:rPr lang="nb-NO" dirty="0" smtClean="0"/>
+              <a:t> data dump from </a:t>
+            </a:r>
+            <a:r>
+              <a:rPr lang="nb-NO" dirty="0" err="1" smtClean="0"/>
+              <a:t>Stack</a:t>
+            </a:r>
+            <a:r>
+              <a:rPr lang="nb-NO" dirty="0" smtClean="0"/>
+              <a:t> Exchange </a:t>
+            </a:r>
+            <a:r>
+              <a:rPr lang="nb-NO" dirty="0" err="1" smtClean="0"/>
+              <a:t>Archive</a:t>
+            </a:r>
+            <a:endParaRPr lang="nb-NO" dirty="0" smtClean="0"/>
+          </a:p>
+          <a:p>
+            <a:pPr lvl="1"/>
+            <a:r>
+              <a:rPr lang="nb-NO" dirty="0" err="1" smtClean="0"/>
+              <a:t>Contains</a:t>
+            </a:r>
+            <a:r>
+              <a:rPr lang="nb-NO" dirty="0" smtClean="0"/>
+              <a:t> XML files </a:t>
+            </a:r>
+            <a:r>
+              <a:rPr lang="nb-NO" dirty="0" err="1" smtClean="0"/>
+              <a:t>based</a:t>
+            </a:r>
+            <a:r>
+              <a:rPr lang="nb-NO" dirty="0" smtClean="0"/>
+              <a:t> </a:t>
+            </a:r>
+            <a:r>
+              <a:rPr lang="nb-NO" dirty="0" err="1" smtClean="0"/>
+              <a:t>on</a:t>
+            </a:r>
+            <a:r>
+              <a:rPr lang="nb-NO" dirty="0" smtClean="0"/>
+              <a:t> </a:t>
+            </a:r>
+            <a:r>
+              <a:rPr lang="nb-NO" dirty="0" err="1" smtClean="0"/>
+              <a:t>table</a:t>
+            </a:r>
+            <a:r>
+              <a:rPr lang="nb-NO" dirty="0" smtClean="0"/>
+              <a:t> </a:t>
+            </a:r>
+            <a:r>
+              <a:rPr lang="nb-NO" dirty="0" err="1" smtClean="0"/>
+              <a:t>content</a:t>
+            </a:r>
+            <a:endParaRPr lang="nb-NO" dirty="0" smtClean="0"/>
+          </a:p>
+          <a:p>
+            <a:pPr lvl="1"/>
+            <a:r>
+              <a:rPr lang="nb-NO" dirty="0" err="1" smtClean="0"/>
+              <a:t>Imported</a:t>
+            </a:r>
+            <a:r>
+              <a:rPr lang="nb-NO" dirty="0" smtClean="0"/>
+              <a:t> data </a:t>
+            </a:r>
+            <a:r>
+              <a:rPr lang="nb-NO" dirty="0" err="1" smtClean="0"/>
+              <a:t>into</a:t>
+            </a:r>
+            <a:r>
+              <a:rPr lang="nb-NO" dirty="0" smtClean="0"/>
+              <a:t> </a:t>
+            </a:r>
+            <a:r>
+              <a:rPr lang="nb-NO" dirty="0" err="1" smtClean="0"/>
+              <a:t>MySQL</a:t>
+            </a:r>
+            <a:r>
+              <a:rPr lang="nb-NO" dirty="0" smtClean="0"/>
+              <a:t> database</a:t>
+            </a:r>
+          </a:p>
+          <a:p>
+            <a:pPr lvl="1"/>
+            <a:r>
+              <a:rPr lang="nb-NO" dirty="0" err="1" smtClean="0"/>
+              <a:t>Imported</a:t>
+            </a:r>
+            <a:r>
+              <a:rPr lang="nb-NO" dirty="0" smtClean="0"/>
+              <a:t> data from </a:t>
+            </a:r>
+            <a:r>
+              <a:rPr lang="nb-NO" dirty="0" err="1" smtClean="0"/>
+              <a:t>MySQL</a:t>
+            </a:r>
+            <a:r>
+              <a:rPr lang="nb-NO" dirty="0" smtClean="0"/>
+              <a:t> database </a:t>
+            </a:r>
+            <a:r>
+              <a:rPr lang="nb-NO" dirty="0" err="1" smtClean="0"/>
+              <a:t>into</a:t>
+            </a:r>
+            <a:r>
+              <a:rPr lang="nb-NO" dirty="0" smtClean="0"/>
+              <a:t> </a:t>
+            </a:r>
+            <a:r>
+              <a:rPr lang="nb-NO" dirty="0" err="1" smtClean="0"/>
+              <a:t>Pandas.DataFrame</a:t>
+            </a:r>
+            <a:endParaRPr lang="nb-NO" dirty="0" smtClean="0"/>
+          </a:p>
+          <a:p>
+            <a:r>
+              <a:rPr lang="nb-NO" dirty="0" err="1" smtClean="0"/>
+              <a:t>Development</a:t>
+            </a:r>
+            <a:r>
+              <a:rPr lang="nb-NO" dirty="0" smtClean="0"/>
+              <a:t>: </a:t>
+            </a:r>
+            <a:r>
+              <a:rPr lang="nb-NO" dirty="0" err="1" smtClean="0"/>
+              <a:t>Python</a:t>
+            </a:r>
+            <a:r>
+              <a:rPr lang="nb-NO" dirty="0" smtClean="0"/>
+              <a:t> 3.5 and </a:t>
+            </a:r>
+            <a:r>
+              <a:rPr lang="nb-NO" dirty="0" err="1" smtClean="0"/>
+              <a:t>Scikit-learn</a:t>
+            </a:r>
+            <a:r>
+              <a:rPr lang="nb-NO" dirty="0" smtClean="0"/>
+              <a:t> (</a:t>
+            </a:r>
+            <a:r>
+              <a:rPr lang="en-GB" dirty="0" smtClean="0"/>
+              <a:t>0.18.dev0)</a:t>
+            </a:r>
+            <a:endParaRPr lang="nb-NO" dirty="0" smtClean="0"/>
+          </a:p>
+          <a:p>
+            <a:r>
+              <a:rPr lang="nb-NO" dirty="0" err="1" smtClean="0"/>
+              <a:t>Question</a:t>
+            </a:r>
+            <a:r>
+              <a:rPr lang="nb-NO" dirty="0" smtClean="0"/>
+              <a:t> </a:t>
+            </a:r>
+            <a:r>
+              <a:rPr lang="nb-NO" dirty="0" err="1" smtClean="0"/>
+              <a:t>processing</a:t>
+            </a:r>
+            <a:endParaRPr lang="nb-NO" dirty="0" smtClean="0"/>
+          </a:p>
+          <a:p>
+            <a:r>
+              <a:rPr lang="nb-NO" dirty="0" err="1" smtClean="0"/>
+              <a:t>Selecting</a:t>
+            </a:r>
+            <a:r>
+              <a:rPr lang="nb-NO" dirty="0" smtClean="0"/>
+              <a:t> </a:t>
+            </a:r>
+            <a:r>
+              <a:rPr lang="nb-NO" dirty="0" err="1" smtClean="0"/>
+              <a:t>questions</a:t>
+            </a:r>
+            <a:r>
+              <a:rPr lang="nb-NO" dirty="0" smtClean="0"/>
+              <a:t> and features</a:t>
+            </a:r>
+          </a:p>
+          <a:p>
+            <a:r>
+              <a:rPr lang="en-US" dirty="0" smtClean="0"/>
+              <a:t>Selecting estimator and parameters for classification</a:t>
+            </a:r>
+            <a:endParaRPr lang="nb-NO" dirty="0" smtClean="0"/>
           </a:p>
         </p:txBody>
       </p:sp>

</xml_diff>

<commit_message>
added bounty and started on manuscript
</commit_message>
<xml_diff>
--- a/IMT4904_Msc_Presentation.pptx
+++ b/IMT4904_Msc_Presentation.pptx
@@ -206,7 +206,7 @@
             <a:fld id="{423E070F-056A-EF46-8F28-B603D057C661}" type="datetimeFigureOut">
               <a:rPr lang="nb-NO" smtClean="0"/>
               <a:pPr/>
-              <a:t>03.06.2016</a:t>
+              <a:t>04.06.2016</a:t>
             </a:fld>
             <a:endParaRPr lang="nb-NO"/>
           </a:p>
@@ -375,7 +375,7 @@
     </p:spTree>
     <p:extLst>
       <p:ext uri="{BB962C8B-B14F-4D97-AF65-F5344CB8AC3E}">
-        <p14:creationId xmlns="" xmlns:p14="http://schemas.microsoft.com/office/powerpoint/2010/main" val="3760678024"/>
+        <p14:creationId xmlns:p14="http://schemas.microsoft.com/office/powerpoint/2010/main" xmlns="" val="3760678024"/>
       </p:ext>
     </p:extLst>
   </p:cSld>
@@ -724,7 +724,7 @@
     </p:spTree>
     <p:extLst>
       <p:ext uri="{BB962C8B-B14F-4D97-AF65-F5344CB8AC3E}">
-        <p14:creationId xmlns="" xmlns:p14="http://schemas.microsoft.com/office/powerpoint/2010/main" val="1000159590"/>
+        <p14:creationId xmlns:p14="http://schemas.microsoft.com/office/powerpoint/2010/main" xmlns="" val="1000159590"/>
       </p:ext>
     </p:extLst>
   </p:cSld>
@@ -829,7 +829,7 @@
     </p:spTree>
     <p:extLst>
       <p:ext uri="{BB962C8B-B14F-4D97-AF65-F5344CB8AC3E}">
-        <p14:creationId xmlns="" xmlns:p14="http://schemas.microsoft.com/office/powerpoint/2010/main" val="1983850659"/>
+        <p14:creationId xmlns:p14="http://schemas.microsoft.com/office/powerpoint/2010/main" xmlns="" val="1983850659"/>
       </p:ext>
     </p:extLst>
   </p:cSld>
@@ -944,7 +944,7 @@
     </p:spTree>
     <p:extLst>
       <p:ext uri="{BB962C8B-B14F-4D97-AF65-F5344CB8AC3E}">
-        <p14:creationId xmlns="" xmlns:p14="http://schemas.microsoft.com/office/powerpoint/2010/main" val="3031831969"/>
+        <p14:creationId xmlns:p14="http://schemas.microsoft.com/office/powerpoint/2010/main" xmlns="" val="3031831969"/>
       </p:ext>
     </p:extLst>
   </p:cSld>
@@ -1186,7 +1186,7 @@
     </p:spTree>
     <p:extLst>
       <p:ext uri="{BB962C8B-B14F-4D97-AF65-F5344CB8AC3E}">
-        <p14:creationId xmlns="" xmlns:p14="http://schemas.microsoft.com/office/powerpoint/2010/main" val="2060019826"/>
+        <p14:creationId xmlns:p14="http://schemas.microsoft.com/office/powerpoint/2010/main" xmlns="" val="2060019826"/>
       </p:ext>
     </p:extLst>
   </p:cSld>
@@ -1410,7 +1410,7 @@
     </p:spTree>
     <p:extLst>
       <p:ext uri="{BB962C8B-B14F-4D97-AF65-F5344CB8AC3E}">
-        <p14:creationId xmlns="" xmlns:p14="http://schemas.microsoft.com/office/powerpoint/2010/main" val="2982460490"/>
+        <p14:creationId xmlns:p14="http://schemas.microsoft.com/office/powerpoint/2010/main" xmlns="" val="2982460490"/>
       </p:ext>
     </p:extLst>
   </p:cSld>
@@ -1633,7 +1633,7 @@
     </p:spTree>
     <p:extLst>
       <p:ext uri="{BB962C8B-B14F-4D97-AF65-F5344CB8AC3E}">
-        <p14:creationId xmlns="" xmlns:p14="http://schemas.microsoft.com/office/powerpoint/2010/main" val="1372914248"/>
+        <p14:creationId xmlns:p14="http://schemas.microsoft.com/office/powerpoint/2010/main" xmlns="" val="1372914248"/>
       </p:ext>
     </p:extLst>
   </p:cSld>
@@ -1990,7 +1990,7 @@
     </p:spTree>
     <p:extLst>
       <p:ext uri="{BB962C8B-B14F-4D97-AF65-F5344CB8AC3E}">
-        <p14:creationId xmlns="" xmlns:p14="http://schemas.microsoft.com/office/powerpoint/2010/main" val="702236646"/>
+        <p14:creationId xmlns:p14="http://schemas.microsoft.com/office/powerpoint/2010/main" xmlns="" val="702236646"/>
       </p:ext>
     </p:extLst>
   </p:cSld>
@@ -2043,7 +2043,7 @@
     </p:spTree>
     <p:extLst>
       <p:ext uri="{BB962C8B-B14F-4D97-AF65-F5344CB8AC3E}">
-        <p14:creationId xmlns="" xmlns:p14="http://schemas.microsoft.com/office/powerpoint/2010/main" val="3172249624"/>
+        <p14:creationId xmlns:p14="http://schemas.microsoft.com/office/powerpoint/2010/main" xmlns="" val="3172249624"/>
       </p:ext>
     </p:extLst>
   </p:cSld>
@@ -2073,7 +2073,7 @@
     </p:spTree>
     <p:extLst>
       <p:ext uri="{BB962C8B-B14F-4D97-AF65-F5344CB8AC3E}">
-        <p14:creationId xmlns="" xmlns:p14="http://schemas.microsoft.com/office/powerpoint/2010/main" val="1649718507"/>
+        <p14:creationId xmlns:p14="http://schemas.microsoft.com/office/powerpoint/2010/main" xmlns="" val="1649718507"/>
       </p:ext>
     </p:extLst>
   </p:cSld>
@@ -2285,7 +2285,7 @@
     </p:spTree>
     <p:extLst>
       <p:ext uri="{BB962C8B-B14F-4D97-AF65-F5344CB8AC3E}">
-        <p14:creationId xmlns="" xmlns:p14="http://schemas.microsoft.com/office/powerpoint/2010/main" val="1596486207"/>
+        <p14:creationId xmlns:p14="http://schemas.microsoft.com/office/powerpoint/2010/main" xmlns="" val="1596486207"/>
       </p:ext>
     </p:extLst>
   </p:cSld>
@@ -2473,7 +2473,7 @@
     </p:spTree>
     <p:extLst>
       <p:ext uri="{BB962C8B-B14F-4D97-AF65-F5344CB8AC3E}">
-        <p14:creationId xmlns="" xmlns:p14="http://schemas.microsoft.com/office/powerpoint/2010/main" val="3532236857"/>
+        <p14:creationId xmlns:p14="http://schemas.microsoft.com/office/powerpoint/2010/main" xmlns="" val="3532236857"/>
       </p:ext>
     </p:extLst>
   </p:cSld>
@@ -2612,7 +2612,7 @@
           <a:blip r:embed="rId13">
             <a:extLst>
               <a:ext uri="{28A0092B-C50C-407E-A947-70E740481C1C}">
-                <a14:useLocalDpi xmlns="" xmlns:a14="http://schemas.microsoft.com/office/drawing/2010/main" val="0"/>
+                <a14:useLocalDpi xmlns:a14="http://schemas.microsoft.com/office/drawing/2010/main" xmlns="" val="0"/>
               </a:ext>
             </a:extLst>
           </a:blip>
@@ -2633,7 +2633,7 @@
     </p:spTree>
     <p:extLst>
       <p:ext uri="{BB962C8B-B14F-4D97-AF65-F5344CB8AC3E}">
-        <p14:creationId xmlns="" xmlns:p14="http://schemas.microsoft.com/office/powerpoint/2010/main" val="5777989"/>
+        <p14:creationId xmlns:p14="http://schemas.microsoft.com/office/powerpoint/2010/main" xmlns="" val="5777989"/>
       </p:ext>
     </p:extLst>
   </p:cSld>
@@ -3050,7 +3050,7 @@
     </p:spTree>
     <p:extLst>
       <p:ext uri="{BB962C8B-B14F-4D97-AF65-F5344CB8AC3E}">
-        <p14:creationId xmlns="" xmlns:p14="http://schemas.microsoft.com/office/powerpoint/2010/main" val="3243102052"/>
+        <p14:creationId xmlns:p14="http://schemas.microsoft.com/office/powerpoint/2010/main" xmlns="" val="3243102052"/>
       </p:ext>
     </p:extLst>
   </p:cSld>
@@ -3422,7 +3422,7 @@
     </p:spTree>
     <p:extLst>
       <p:ext uri="{BB962C8B-B14F-4D97-AF65-F5344CB8AC3E}">
-        <p14:creationId xmlns="" xmlns:p14="http://schemas.microsoft.com/office/powerpoint/2010/main" val="314013529"/>
+        <p14:creationId xmlns:p14="http://schemas.microsoft.com/office/powerpoint/2010/main" xmlns="" val="314013529"/>
       </p:ext>
     </p:extLst>
   </p:cSld>
@@ -3644,7 +3644,7 @@
     </p:spTree>
     <p:extLst>
       <p:ext uri="{BB962C8B-B14F-4D97-AF65-F5344CB8AC3E}">
-        <p14:creationId xmlns="" xmlns:p14="http://schemas.microsoft.com/office/powerpoint/2010/main" val="314013529"/>
+        <p14:creationId xmlns:p14="http://schemas.microsoft.com/office/powerpoint/2010/main" xmlns="" val="314013529"/>
       </p:ext>
     </p:extLst>
   </p:cSld>
@@ -3747,7 +3747,7 @@
     </p:spTree>
     <p:extLst>
       <p:ext uri="{BB962C8B-B14F-4D97-AF65-F5344CB8AC3E}">
-        <p14:creationId xmlns="" xmlns:p14="http://schemas.microsoft.com/office/powerpoint/2010/main" val="314013529"/>
+        <p14:creationId xmlns:p14="http://schemas.microsoft.com/office/powerpoint/2010/main" xmlns="" val="314013529"/>
       </p:ext>
     </p:extLst>
   </p:cSld>
@@ -3858,7 +3858,7 @@
     </p:spTree>
     <p:extLst>
       <p:ext uri="{BB962C8B-B14F-4D97-AF65-F5344CB8AC3E}">
-        <p14:creationId xmlns="" xmlns:p14="http://schemas.microsoft.com/office/powerpoint/2010/main" val="314013529"/>
+        <p14:creationId xmlns:p14="http://schemas.microsoft.com/office/powerpoint/2010/main" xmlns="" val="314013529"/>
       </p:ext>
     </p:extLst>
   </p:cSld>
@@ -4184,7 +4184,7 @@
     </p:spTree>
     <p:extLst>
       <p:ext uri="{BB962C8B-B14F-4D97-AF65-F5344CB8AC3E}">
-        <p14:creationId xmlns="" xmlns:p14="http://schemas.microsoft.com/office/powerpoint/2010/main" val="314013529"/>
+        <p14:creationId xmlns:p14="http://schemas.microsoft.com/office/powerpoint/2010/main" xmlns="" val="314013529"/>
       </p:ext>
     </p:extLst>
   </p:cSld>
@@ -4267,7 +4267,9 @@
         </p:nvSpPr>
         <p:spPr/>
         <p:txBody>
-          <a:bodyPr/>
+          <a:bodyPr>
+            <a:normAutofit lnSpcReduction="10000"/>
+          </a:bodyPr>
           <a:lstStyle/>
           <a:p>
             <a:r>
@@ -4424,6 +4426,14 @@
             <a:r>
               <a:rPr lang="nb-NO" dirty="0" err="1" smtClean="0"/>
               <a:t>answer</a:t>
+            </a:r>
+            <a:endParaRPr lang="nb-NO" dirty="0" smtClean="0"/>
+          </a:p>
+          <a:p>
+            <a:pPr lvl="1"/>
+            <a:r>
+              <a:rPr lang="nb-NO" smtClean="0"/>
+              <a:t>Bounty</a:t>
             </a:r>
             <a:endParaRPr lang="nb-NO" dirty="0" smtClean="0"/>
           </a:p>
@@ -4549,7 +4559,7 @@
     </p:spTree>
     <p:extLst>
       <p:ext uri="{BB962C8B-B14F-4D97-AF65-F5344CB8AC3E}">
-        <p14:creationId xmlns="" xmlns:p14="http://schemas.microsoft.com/office/powerpoint/2010/main" val="314013529"/>
+        <p14:creationId xmlns:p14="http://schemas.microsoft.com/office/powerpoint/2010/main" xmlns="" val="314013529"/>
       </p:ext>
     </p:extLst>
   </p:cSld>
@@ -5464,7 +5474,7 @@
     </p:spTree>
     <p:extLst>
       <p:ext uri="{BB962C8B-B14F-4D97-AF65-F5344CB8AC3E}">
-        <p14:creationId xmlns="" xmlns:p14="http://schemas.microsoft.com/office/powerpoint/2010/main" val="314013529"/>
+        <p14:creationId xmlns:p14="http://schemas.microsoft.com/office/powerpoint/2010/main" xmlns="" val="314013529"/>
       </p:ext>
     </p:extLst>
   </p:cSld>

</xml_diff>

<commit_message>
Hyperlinks and more manuscript text
Added hyperlinks for the slides in the PPT.
Added image from SO of "dummy" words.
Only 2 slides left to write presentational content for + re-writing it.
</commit_message>
<xml_diff>
--- a/IMT4904_Msc_Presentation.pptx
+++ b/IMT4904_Msc_Presentation.pptx
@@ -5,7 +5,7 @@
     <p:sldMasterId id="2147483648" r:id="rId1"/>
   </p:sldMasterIdLst>
   <p:notesMasterIdLst>
-    <p:notesMasterId r:id="rId16"/>
+    <p:notesMasterId r:id="rId17"/>
   </p:notesMasterIdLst>
   <p:sldIdLst>
     <p:sldId id="256" r:id="rId2"/>
@@ -17,11 +17,12 @@
     <p:sldId id="267" r:id="rId8"/>
     <p:sldId id="268" r:id="rId9"/>
     <p:sldId id="264" r:id="rId10"/>
-    <p:sldId id="262" r:id="rId11"/>
-    <p:sldId id="265" r:id="rId12"/>
-    <p:sldId id="266" r:id="rId13"/>
-    <p:sldId id="261" r:id="rId14"/>
-    <p:sldId id="272" r:id="rId15"/>
+    <p:sldId id="273" r:id="rId11"/>
+    <p:sldId id="262" r:id="rId12"/>
+    <p:sldId id="265" r:id="rId13"/>
+    <p:sldId id="266" r:id="rId14"/>
+    <p:sldId id="261" r:id="rId15"/>
+    <p:sldId id="272" r:id="rId16"/>
   </p:sldIdLst>
   <p:sldSz cx="9144000" cy="6858000" type="screen4x3"/>
   <p:notesSz cx="6858000" cy="9144000"/>
@@ -206,7 +207,7 @@
             <a:fld id="{423E070F-056A-EF46-8F28-B603D057C661}" type="datetimeFigureOut">
               <a:rPr lang="nb-NO" smtClean="0"/>
               <a:pPr/>
-              <a:t>04.06.2016</a:t>
+              <a:t>05.06.2016</a:t>
             </a:fld>
             <a:endParaRPr lang="nb-NO"/>
           </a:p>
@@ -3084,314 +3085,40 @@
           <a:chExt cx="0" cy="0"/>
         </a:xfrm>
       </p:grpSpPr>
-      <p:sp>
-        <p:nvSpPr>
-          <p:cNvPr id="2" name="Tittel 1"/>
-          <p:cNvSpPr>
-            <a:spLocks noGrp="1"/>
-          </p:cNvSpPr>
-          <p:nvPr>
-            <p:ph type="title"/>
-          </p:nvPr>
-        </p:nvSpPr>
-        <p:spPr/>
-        <p:txBody>
-          <a:bodyPr>
-            <a:normAutofit/>
-          </a:bodyPr>
-          <a:lstStyle/>
-          <a:p>
-            <a:r>
-              <a:rPr lang="nb-NO" dirty="0" err="1" smtClean="0"/>
-              <a:t>Experiments</a:t>
-            </a:r>
-            <a:r>
-              <a:rPr lang="nb-NO" dirty="0" smtClean="0"/>
-              <a:t> and </a:t>
-            </a:r>
-            <a:r>
-              <a:rPr lang="nb-NO" dirty="0" err="1" smtClean="0"/>
-              <a:t>Results</a:t>
-            </a:r>
-            <a:endParaRPr lang="nb-NO" dirty="0"/>
-          </a:p>
-        </p:txBody>
-      </p:sp>
-      <p:sp>
-        <p:nvSpPr>
-          <p:cNvPr id="3" name="Plassholder for innhold 2"/>
-          <p:cNvSpPr>
-            <a:spLocks noGrp="1"/>
-          </p:cNvSpPr>
-          <p:nvPr>
-            <p:ph idx="1"/>
-          </p:nvPr>
-        </p:nvSpPr>
+      <p:pic>
+        <p:nvPicPr>
+          <p:cNvPr id="4" name="Bilde 3" descr="dummy_word.PNG"/>
+          <p:cNvPicPr>
+            <a:picLocks noChangeAspect="1"/>
+          </p:cNvPicPr>
+          <p:nvPr/>
+        </p:nvPicPr>
+        <p:blipFill>
+          <a:blip r:embed="rId2"/>
+          <a:stretch>
+            <a:fillRect/>
+          </a:stretch>
+        </p:blipFill>
         <p:spPr>
           <a:xfrm>
-            <a:off x="457200" y="1600200"/>
-            <a:ext cx="8229600" cy="4830745"/>
+            <a:off x="865667" y="224569"/>
+            <a:ext cx="7573433" cy="6087325"/>
           </a:xfrm>
+          <a:prstGeom prst="rect">
+            <a:avLst/>
+          </a:prstGeom>
         </p:spPr>
-        <p:txBody>
-          <a:bodyPr>
-            <a:normAutofit lnSpcReduction="10000"/>
-          </a:bodyPr>
-          <a:lstStyle/>
-          <a:p>
-            <a:r>
-              <a:rPr lang="nb-NO" dirty="0" smtClean="0"/>
-              <a:t>6 </a:t>
-            </a:r>
-            <a:r>
-              <a:rPr lang="nb-NO" dirty="0" err="1" smtClean="0"/>
-              <a:t>different</a:t>
-            </a:r>
-            <a:r>
-              <a:rPr lang="nb-NO" dirty="0" smtClean="0"/>
-              <a:t> features</a:t>
-            </a:r>
-          </a:p>
-          <a:p>
-            <a:pPr lvl="1"/>
-            <a:r>
-              <a:rPr lang="nb-NO" dirty="0" err="1" smtClean="0"/>
-              <a:t>Code</a:t>
-            </a:r>
-            <a:r>
-              <a:rPr lang="nb-NO" dirty="0" smtClean="0"/>
-              <a:t> </a:t>
-            </a:r>
-            <a:r>
-              <a:rPr lang="nb-NO" dirty="0" err="1" smtClean="0"/>
-              <a:t>samples</a:t>
-            </a:r>
-            <a:endParaRPr lang="nb-NO" dirty="0" smtClean="0"/>
-          </a:p>
-          <a:p>
-            <a:pPr lvl="1"/>
-            <a:r>
-              <a:rPr lang="nb-NO" dirty="0" err="1" smtClean="0"/>
-              <a:t>Hexadecimal</a:t>
-            </a:r>
-            <a:endParaRPr lang="nb-NO" dirty="0" smtClean="0"/>
-          </a:p>
-          <a:p>
-            <a:pPr lvl="1"/>
-            <a:r>
-              <a:rPr lang="nb-NO" dirty="0" err="1" smtClean="0"/>
-              <a:t>Homework</a:t>
-            </a:r>
-            <a:r>
-              <a:rPr lang="nb-NO" dirty="0" smtClean="0"/>
-              <a:t> (synonyms for </a:t>
-            </a:r>
-            <a:r>
-              <a:rPr lang="nb-NO" dirty="0" err="1" smtClean="0"/>
-              <a:t>homework</a:t>
-            </a:r>
-            <a:r>
-              <a:rPr lang="nb-NO" dirty="0" smtClean="0"/>
-              <a:t>)</a:t>
-            </a:r>
-          </a:p>
-          <a:p>
-            <a:pPr lvl="1"/>
-            <a:r>
-              <a:rPr lang="nb-NO" dirty="0" smtClean="0"/>
-              <a:t>Links</a:t>
-            </a:r>
-          </a:p>
-          <a:p>
-            <a:pPr lvl="1"/>
-            <a:r>
-              <a:rPr lang="nb-NO" dirty="0" err="1" smtClean="0"/>
-              <a:t>Numerical</a:t>
-            </a:r>
-            <a:endParaRPr lang="nb-NO" dirty="0" smtClean="0"/>
-          </a:p>
-          <a:p>
-            <a:pPr lvl="1"/>
-            <a:r>
-              <a:rPr lang="nb-NO" dirty="0" err="1" smtClean="0"/>
-              <a:t>Tags</a:t>
-            </a:r>
-            <a:endParaRPr lang="nb-NO" dirty="0" smtClean="0"/>
-          </a:p>
-          <a:p>
-            <a:pPr lvl="1"/>
-            <a:r>
-              <a:rPr lang="nb-NO" dirty="0" smtClean="0"/>
-              <a:t>All features</a:t>
-            </a:r>
-          </a:p>
-          <a:p>
-            <a:r>
-              <a:rPr lang="nb-NO" dirty="0" smtClean="0"/>
-              <a:t>4 </a:t>
-            </a:r>
-            <a:r>
-              <a:rPr lang="nb-NO" dirty="0" err="1" smtClean="0"/>
-              <a:t>different</a:t>
-            </a:r>
-            <a:r>
-              <a:rPr lang="nb-NO" dirty="0" smtClean="0"/>
-              <a:t> </a:t>
-            </a:r>
-            <a:r>
-              <a:rPr lang="nb-NO" dirty="0" err="1" smtClean="0"/>
-              <a:t>experiments</a:t>
-            </a:r>
-            <a:endParaRPr lang="nb-NO" dirty="0" smtClean="0"/>
-          </a:p>
-          <a:p>
-            <a:pPr lvl="1"/>
-            <a:r>
-              <a:rPr lang="nb-NO" dirty="0" err="1" smtClean="0"/>
-              <a:t>Unprocessed</a:t>
-            </a:r>
-            <a:r>
-              <a:rPr lang="nb-NO" dirty="0" smtClean="0"/>
-              <a:t> data </a:t>
-            </a:r>
-            <a:r>
-              <a:rPr lang="nb-NO" dirty="0" err="1" smtClean="0"/>
-              <a:t>set</a:t>
-            </a:r>
-            <a:r>
-              <a:rPr lang="nb-NO" dirty="0" smtClean="0"/>
-              <a:t> vs. all singular feature, and all </a:t>
-            </a:r>
-            <a:r>
-              <a:rPr lang="nb-NO" dirty="0" err="1" smtClean="0"/>
-              <a:t>questions</a:t>
-            </a:r>
-            <a:endParaRPr lang="nb-NO" dirty="0" smtClean="0"/>
-          </a:p>
-          <a:p>
-            <a:pPr lvl="1"/>
-            <a:r>
-              <a:rPr lang="nb-NO" dirty="0" err="1" smtClean="0"/>
-              <a:t>Unprocessed</a:t>
-            </a:r>
-            <a:r>
-              <a:rPr lang="nb-NO" dirty="0" smtClean="0"/>
-              <a:t> data </a:t>
-            </a:r>
-            <a:r>
-              <a:rPr lang="nb-NO" dirty="0" err="1" smtClean="0"/>
-              <a:t>set</a:t>
-            </a:r>
-            <a:r>
-              <a:rPr lang="nb-NO" dirty="0" smtClean="0"/>
-              <a:t> vs. all singular features, and </a:t>
-            </a:r>
-            <a:r>
-              <a:rPr lang="nb-NO" dirty="0" err="1" smtClean="0"/>
-              <a:t>question</a:t>
-            </a:r>
-            <a:r>
-              <a:rPr lang="nb-NO" dirty="0" smtClean="0"/>
-              <a:t> </a:t>
-            </a:r>
-            <a:r>
-              <a:rPr lang="nb-NO" dirty="0" err="1" smtClean="0"/>
-              <a:t>occurence</a:t>
-            </a:r>
-            <a:r>
-              <a:rPr lang="nb-NO" dirty="0" smtClean="0"/>
-              <a:t> </a:t>
-            </a:r>
-            <a:r>
-              <a:rPr lang="nb-NO" dirty="0" err="1" smtClean="0"/>
-              <a:t>only</a:t>
-            </a:r>
-            <a:endParaRPr lang="nb-NO" dirty="0" smtClean="0"/>
-          </a:p>
-          <a:p>
-            <a:pPr lvl="1"/>
-            <a:r>
-              <a:rPr lang="nb-NO" dirty="0" err="1" smtClean="0"/>
-              <a:t>Unprocessed</a:t>
-            </a:r>
-            <a:r>
-              <a:rPr lang="nb-NO" dirty="0" smtClean="0"/>
-              <a:t> data </a:t>
-            </a:r>
-            <a:r>
-              <a:rPr lang="nb-NO" dirty="0" err="1" smtClean="0"/>
-              <a:t>set</a:t>
-            </a:r>
-            <a:r>
-              <a:rPr lang="nb-NO" dirty="0" smtClean="0"/>
-              <a:t> vs. </a:t>
-            </a:r>
-            <a:r>
-              <a:rPr lang="nb-NO" dirty="0" err="1" smtClean="0"/>
-              <a:t>selected</a:t>
-            </a:r>
-            <a:r>
-              <a:rPr lang="nb-NO" dirty="0" smtClean="0"/>
-              <a:t> </a:t>
-            </a:r>
-            <a:r>
-              <a:rPr lang="nb-NO" dirty="0" err="1" smtClean="0"/>
-              <a:t>set</a:t>
-            </a:r>
-            <a:r>
-              <a:rPr lang="nb-NO" dirty="0" smtClean="0"/>
-              <a:t> </a:t>
-            </a:r>
-            <a:r>
-              <a:rPr lang="nb-NO" dirty="0" err="1" smtClean="0"/>
-              <a:t>of</a:t>
-            </a:r>
-            <a:r>
-              <a:rPr lang="nb-NO" dirty="0" smtClean="0"/>
-              <a:t> features </a:t>
-            </a:r>
-            <a:r>
-              <a:rPr lang="nb-NO" dirty="0" err="1" smtClean="0"/>
-              <a:t>only</a:t>
-            </a:r>
-            <a:endParaRPr lang="nb-NO" dirty="0" smtClean="0"/>
-          </a:p>
-          <a:p>
-            <a:pPr lvl="1"/>
-            <a:r>
-              <a:rPr lang="nb-NO" dirty="0" err="1" smtClean="0"/>
-              <a:t>Stochastic</a:t>
-            </a:r>
-            <a:r>
-              <a:rPr lang="nb-NO" dirty="0" smtClean="0"/>
-              <a:t> Gradient </a:t>
-            </a:r>
-            <a:r>
-              <a:rPr lang="nb-NO" dirty="0" err="1" smtClean="0"/>
-              <a:t>Descent</a:t>
-            </a:r>
-            <a:r>
-              <a:rPr lang="nb-NO" dirty="0" smtClean="0"/>
-              <a:t> (SGD) as </a:t>
-            </a:r>
-            <a:r>
-              <a:rPr lang="nb-NO" dirty="0" err="1" smtClean="0"/>
-              <a:t>classifier</a:t>
-            </a:r>
-            <a:endParaRPr lang="nb-NO" dirty="0" smtClean="0"/>
-          </a:p>
-        </p:txBody>
-      </p:sp>
-      <p:sp>
-        <p:nvSpPr>
-          <p:cNvPr id="4" name="TekstSylinder 3"/>
+      </p:pic>
+      <p:sp>
+        <p:nvSpPr>
+          <p:cNvPr id="5" name="TekstSylinder 4"/>
           <p:cNvSpPr txBox="1"/>
           <p:nvPr/>
         </p:nvSpPr>
         <p:spPr>
-          <a:xfrm rot="16200000">
-            <a:off x="6866691" y="1723023"/>
-            <a:ext cx="3751343" cy="369332"/>
+          <a:xfrm>
+            <a:off x="8551147" y="6035264"/>
+            <a:ext cx="442750" cy="369332"/>
           </a:xfrm>
           <a:prstGeom prst="rect">
             <a:avLst/>
@@ -3399,43 +3126,39 @@
           <a:noFill/>
         </p:spPr>
         <p:txBody>
-          <a:bodyPr wrap="square" rtlCol="0">
+          <a:bodyPr wrap="none" rtlCol="0">
             <a:spAutoFit/>
           </a:bodyPr>
           <a:lstStyle/>
           <a:p>
             <a:r>
-              <a:rPr lang="nb-NO" spc="100" dirty="0">
+              <a:rPr lang="en-GB" dirty="0" smtClean="0">
                 <a:solidFill>
-                  <a:schemeClr val="bg1">
-                    <a:lumMod val="75000"/>
+                  <a:schemeClr val="tx1">
+                    <a:lumMod val="50000"/>
+                    <a:lumOff val="50000"/>
                   </a:schemeClr>
                 </a:solidFill>
-                <a:latin typeface="Arial"/>
-                <a:cs typeface="Arial"/>
+                <a:hlinkClick r:id="rId3" action="ppaction://hlinksldjump"/>
               </a:rPr>
-              <a:t>Trondheim – Gjøvik – Ålesund</a:t>
-            </a:r>
+              <a:t>[4]</a:t>
+            </a:r>
+            <a:endParaRPr lang="en-GB" dirty="0">
+              <a:solidFill>
+                <a:schemeClr val="tx1">
+                  <a:lumMod val="50000"/>
+                  <a:lumOff val="50000"/>
+                </a:schemeClr>
+              </a:solidFill>
+            </a:endParaRPr>
           </a:p>
         </p:txBody>
       </p:sp>
     </p:spTree>
-    <p:extLst>
-      <p:ext uri="{BB962C8B-B14F-4D97-AF65-F5344CB8AC3E}">
-        <p14:creationId xmlns:p14="http://schemas.microsoft.com/office/powerpoint/2010/main" xmlns="" val="314013529"/>
-      </p:ext>
-    </p:extLst>
   </p:cSld>
   <p:clrMapOvr>
     <a:masterClrMapping/>
   </p:clrMapOvr>
-  <p:timing>
-    <p:tnLst>
-      <p:par>
-        <p:cTn id="1" dur="indefinite" restart="never" nodeType="tmRoot"/>
-      </p:par>
-    </p:tnLst>
-  </p:timing>
 </p:sld>
 </file>
 
@@ -3475,7 +3198,15 @@
           <a:p>
             <a:r>
               <a:rPr lang="nb-NO" dirty="0" err="1" smtClean="0"/>
-              <a:t>Conclusion</a:t>
+              <a:t>Experiments</a:t>
+            </a:r>
+            <a:r>
+              <a:rPr lang="nb-NO" dirty="0" smtClean="0"/>
+              <a:t> and </a:t>
+            </a:r>
+            <a:r>
+              <a:rPr lang="nb-NO" dirty="0" err="1" smtClean="0"/>
+              <a:t>Results</a:t>
             </a:r>
             <a:endParaRPr lang="nb-NO" dirty="0"/>
           </a:p>
@@ -3491,26 +3222,36 @@
             <p:ph idx="1"/>
           </p:nvPr>
         </p:nvSpPr>
-        <p:spPr/>
-        <p:txBody>
-          <a:bodyPr/>
+        <p:spPr>
+          <a:xfrm>
+            <a:off x="457200" y="1600200"/>
+            <a:ext cx="8229600" cy="4830745"/>
+          </a:xfrm>
+        </p:spPr>
+        <p:txBody>
+          <a:bodyPr>
+            <a:normAutofit lnSpcReduction="10000"/>
+          </a:bodyPr>
           <a:lstStyle/>
           <a:p>
             <a:r>
-              <a:rPr lang="en-US" dirty="0" smtClean="0"/>
-              <a:t>Stack overflow as a question quality metric</a:t>
-            </a:r>
-          </a:p>
-          <a:p>
-            <a:r>
-              <a:rPr lang="en-US" dirty="0" smtClean="0"/>
-              <a:t>Limitations and issues</a:t>
-            </a:r>
-          </a:p>
-          <a:p>
-            <a:r>
-              <a:rPr lang="nb-NO" dirty="0" err="1" smtClean="0"/>
-              <a:t>Further</a:t>
+              <a:rPr lang="nb-NO" dirty="0" smtClean="0"/>
+              <a:t>6 </a:t>
+            </a:r>
+            <a:r>
+              <a:rPr lang="nb-NO" dirty="0" err="1" smtClean="0"/>
+              <a:t>different</a:t>
+            </a:r>
+            <a:r>
+              <a:rPr lang="nb-NO" dirty="0" smtClean="0"/>
+              <a:t> features</a:t>
+            </a:r>
+          </a:p>
+          <a:p>
+            <a:pPr lvl="1"/>
+            <a:r>
+              <a:rPr lang="nb-NO" dirty="0" err="1" smtClean="0"/>
+              <a:t>Code</a:t>
             </a:r>
             <a:r>
               <a:rPr lang="nb-NO" dirty="0" smtClean="0"/>
@@ -3518,7 +3259,7 @@
             </a:r>
             <a:r>
               <a:rPr lang="nb-NO" dirty="0" err="1" smtClean="0"/>
-              <a:t>work</a:t>
+              <a:t>samples</a:t>
             </a:r>
             <a:endParaRPr lang="nb-NO" dirty="0" smtClean="0"/>
           </a:p>
@@ -3526,7 +3267,67 @@
             <a:pPr lvl="1"/>
             <a:r>
               <a:rPr lang="nb-NO" dirty="0" err="1" smtClean="0"/>
-              <a:t>Code</a:t>
+              <a:t>Hexadecimal</a:t>
+            </a:r>
+            <a:endParaRPr lang="nb-NO" dirty="0" smtClean="0"/>
+          </a:p>
+          <a:p>
+            <a:pPr lvl="1"/>
+            <a:r>
+              <a:rPr lang="nb-NO" dirty="0" err="1" smtClean="0"/>
+              <a:t>Homework</a:t>
+            </a:r>
+            <a:r>
+              <a:rPr lang="nb-NO" dirty="0" smtClean="0"/>
+              <a:t> (synonyms for </a:t>
+            </a:r>
+            <a:r>
+              <a:rPr lang="nb-NO" dirty="0" err="1" smtClean="0"/>
+              <a:t>homework</a:t>
+            </a:r>
+            <a:r>
+              <a:rPr lang="nb-NO" dirty="0" smtClean="0"/>
+              <a:t>)</a:t>
+            </a:r>
+          </a:p>
+          <a:p>
+            <a:pPr lvl="1"/>
+            <a:r>
+              <a:rPr lang="nb-NO" dirty="0" smtClean="0"/>
+              <a:t>Links</a:t>
+            </a:r>
+          </a:p>
+          <a:p>
+            <a:pPr lvl="1"/>
+            <a:r>
+              <a:rPr lang="nb-NO" dirty="0" err="1" smtClean="0"/>
+              <a:t>Numerical</a:t>
+            </a:r>
+            <a:endParaRPr lang="nb-NO" dirty="0" smtClean="0"/>
+          </a:p>
+          <a:p>
+            <a:pPr lvl="1"/>
+            <a:r>
+              <a:rPr lang="nb-NO" dirty="0" err="1" smtClean="0"/>
+              <a:t>Tags</a:t>
+            </a:r>
+            <a:endParaRPr lang="nb-NO" dirty="0" smtClean="0"/>
+          </a:p>
+          <a:p>
+            <a:pPr lvl="1"/>
+            <a:r>
+              <a:rPr lang="nb-NO" dirty="0" smtClean="0"/>
+              <a:t>All features</a:t>
+            </a:r>
+          </a:p>
+          <a:p>
+            <a:r>
+              <a:rPr lang="nb-NO" dirty="0" smtClean="0"/>
+              <a:t>4 </a:t>
+            </a:r>
+            <a:r>
+              <a:rPr lang="nb-NO" dirty="0" err="1" smtClean="0"/>
+              <a:t>different</a:t>
             </a:r>
             <a:r>
               <a:rPr lang="nb-NO" dirty="0" smtClean="0"/>
@@ -3534,31 +3335,55 @@
             </a:r>
             <a:r>
               <a:rPr lang="nb-NO" dirty="0" err="1" smtClean="0"/>
-              <a:t>blocks</a:t>
-            </a:r>
-            <a:r>
-              <a:rPr lang="nb-NO" dirty="0" smtClean="0"/>
-              <a:t>, Links and </a:t>
-            </a:r>
-            <a:r>
-              <a:rPr lang="nb-NO" dirty="0" err="1" smtClean="0"/>
-              <a:t>Numerical</a:t>
-            </a:r>
-            <a:r>
-              <a:rPr lang="nb-NO" dirty="0" smtClean="0"/>
-              <a:t> as a feature </a:t>
+              <a:t>experiments</a:t>
+            </a:r>
+            <a:endParaRPr lang="nb-NO" dirty="0" smtClean="0"/>
+          </a:p>
+          <a:p>
+            <a:pPr lvl="1"/>
+            <a:r>
+              <a:rPr lang="nb-NO" dirty="0" err="1" smtClean="0"/>
+              <a:t>Unprocessed</a:t>
+            </a:r>
+            <a:r>
+              <a:rPr lang="nb-NO" dirty="0" smtClean="0"/>
+              <a:t> data </a:t>
             </a:r>
             <a:r>
               <a:rPr lang="nb-NO" dirty="0" err="1" smtClean="0"/>
               <a:t>set</a:t>
             </a:r>
+            <a:r>
+              <a:rPr lang="nb-NO" dirty="0" smtClean="0"/>
+              <a:t> vs. all singular feature, and all </a:t>
+            </a:r>
+            <a:r>
+              <a:rPr lang="nb-NO" dirty="0" err="1" smtClean="0"/>
+              <a:t>questions</a:t>
+            </a:r>
             <a:endParaRPr lang="nb-NO" dirty="0" smtClean="0"/>
           </a:p>
           <a:p>
             <a:pPr lvl="1"/>
             <a:r>
               <a:rPr lang="nb-NO" dirty="0" err="1" smtClean="0"/>
-              <a:t>Code</a:t>
+              <a:t>Unprocessed</a:t>
+            </a:r>
+            <a:r>
+              <a:rPr lang="nb-NO" dirty="0" smtClean="0"/>
+              <a:t> data </a:t>
+            </a:r>
+            <a:r>
+              <a:rPr lang="nb-NO" dirty="0" err="1" smtClean="0"/>
+              <a:t>set</a:t>
+            </a:r>
+            <a:r>
+              <a:rPr lang="nb-NO" dirty="0" smtClean="0"/>
+              <a:t> vs. all singular features, and </a:t>
+            </a:r>
+            <a:r>
+              <a:rPr lang="nb-NO" dirty="0" err="1" smtClean="0"/>
+              <a:t>question</a:t>
             </a:r>
             <a:r>
               <a:rPr lang="nb-NO" dirty="0" smtClean="0"/>
@@ -3566,7 +3391,15 @@
             </a:r>
             <a:r>
               <a:rPr lang="nb-NO" dirty="0" err="1" smtClean="0"/>
-              <a:t>analysis</a:t>
+              <a:t>occurence</a:t>
+            </a:r>
+            <a:r>
+              <a:rPr lang="nb-NO" dirty="0" smtClean="0"/>
+              <a:t> </a:t>
+            </a:r>
+            <a:r>
+              <a:rPr lang="nb-NO" dirty="0" err="1" smtClean="0"/>
+              <a:t>only</a:t>
             </a:r>
             <a:endParaRPr lang="nb-NO" dirty="0" smtClean="0"/>
           </a:p>
@@ -3574,7 +3407,23 @@
             <a:pPr lvl="1"/>
             <a:r>
               <a:rPr lang="nb-NO" dirty="0" err="1" smtClean="0"/>
-              <a:t>Sentiment</a:t>
+              <a:t>Unprocessed</a:t>
+            </a:r>
+            <a:r>
+              <a:rPr lang="nb-NO" dirty="0" smtClean="0"/>
+              <a:t> data </a:t>
+            </a:r>
+            <a:r>
+              <a:rPr lang="nb-NO" dirty="0" err="1" smtClean="0"/>
+              <a:t>set</a:t>
+            </a:r>
+            <a:r>
+              <a:rPr lang="nb-NO" dirty="0" smtClean="0"/>
+              <a:t> vs. </a:t>
+            </a:r>
+            <a:r>
+              <a:rPr lang="nb-NO" dirty="0" err="1" smtClean="0"/>
+              <a:t>selected</a:t>
             </a:r>
             <a:r>
               <a:rPr lang="nb-NO" dirty="0" smtClean="0"/>
@@ -3582,7 +3431,23 @@
             </a:r>
             <a:r>
               <a:rPr lang="nb-NO" dirty="0" err="1" smtClean="0"/>
-              <a:t>analysis</a:t>
+              <a:t>set</a:t>
+            </a:r>
+            <a:r>
+              <a:rPr lang="nb-NO" dirty="0" smtClean="0"/>
+              <a:t> </a:t>
+            </a:r>
+            <a:r>
+              <a:rPr lang="nb-NO" dirty="0" err="1" smtClean="0"/>
+              <a:t>of</a:t>
+            </a:r>
+            <a:r>
+              <a:rPr lang="nb-NO" dirty="0" smtClean="0"/>
+              <a:t> features </a:t>
+            </a:r>
+            <a:r>
+              <a:rPr lang="nb-NO" dirty="0" err="1" smtClean="0"/>
+              <a:t>only</a:t>
             </a:r>
             <a:endParaRPr lang="nb-NO" dirty="0" smtClean="0"/>
           </a:p>
@@ -3590,15 +3455,23 @@
             <a:pPr lvl="1"/>
             <a:r>
               <a:rPr lang="nb-NO" dirty="0" err="1" smtClean="0"/>
-              <a:t>Version</a:t>
-            </a:r>
-            <a:r>
-              <a:rPr lang="nb-NO" dirty="0" smtClean="0"/>
-              <a:t> </a:t>
-            </a:r>
-            <a:r>
-              <a:rPr lang="nb-NO" dirty="0" err="1" smtClean="0"/>
-              <a:t>numbering</a:t>
+              <a:t>Stochastic</a:t>
+            </a:r>
+            <a:r>
+              <a:rPr lang="nb-NO" dirty="0" smtClean="0"/>
+              <a:t> Gradient </a:t>
+            </a:r>
+            <a:r>
+              <a:rPr lang="nb-NO" dirty="0" err="1" smtClean="0"/>
+              <a:t>Descent</a:t>
+            </a:r>
+            <a:r>
+              <a:rPr lang="nb-NO" dirty="0" smtClean="0"/>
+              <a:t> (SGD) as </a:t>
+            </a:r>
+            <a:r>
+              <a:rPr lang="nb-NO" dirty="0" err="1" smtClean="0"/>
+              <a:t>classifier</a:t>
             </a:r>
             <a:endParaRPr lang="nb-NO" dirty="0" smtClean="0"/>
           </a:p>
@@ -3688,22 +3561,141 @@
             <p:ph type="title"/>
           </p:nvPr>
         </p:nvSpPr>
-        <p:spPr>
-          <a:xfrm>
-            <a:off x="457200" y="2022990"/>
-            <a:ext cx="8229600" cy="1143000"/>
-          </a:xfrm>
-        </p:spPr>
+        <p:spPr/>
+        <p:txBody>
+          <a:bodyPr>
+            <a:normAutofit/>
+          </a:bodyPr>
+          <a:lstStyle/>
+          <a:p>
+            <a:r>
+              <a:rPr lang="nb-NO" dirty="0" err="1" smtClean="0"/>
+              <a:t>Summary</a:t>
+            </a:r>
+            <a:endParaRPr lang="nb-NO" dirty="0"/>
+          </a:p>
+        </p:txBody>
+      </p:sp>
+      <p:sp>
+        <p:nvSpPr>
+          <p:cNvPr id="3" name="Plassholder for innhold 2"/>
+          <p:cNvSpPr>
+            <a:spLocks noGrp="1"/>
+          </p:cNvSpPr>
+          <p:nvPr>
+            <p:ph idx="1"/>
+          </p:nvPr>
+        </p:nvSpPr>
+        <p:spPr/>
         <p:txBody>
           <a:bodyPr/>
           <a:lstStyle/>
           <a:p>
-            <a:pPr algn="ctr"/>
-            <a:r>
-              <a:rPr lang="nb-NO" dirty="0" smtClean="0"/>
-              <a:t>Demo</a:t>
-            </a:r>
-            <a:endParaRPr lang="nb-NO" dirty="0"/>
+            <a:r>
+              <a:rPr lang="en-US" dirty="0" smtClean="0"/>
+              <a:t>Stack overflow as a question quality metric</a:t>
+            </a:r>
+          </a:p>
+          <a:p>
+            <a:r>
+              <a:rPr lang="en-US" dirty="0" smtClean="0"/>
+              <a:t>Limitations and issues</a:t>
+            </a:r>
+          </a:p>
+          <a:p>
+            <a:r>
+              <a:rPr lang="nb-NO" dirty="0" err="1" smtClean="0"/>
+              <a:t>Further</a:t>
+            </a:r>
+            <a:r>
+              <a:rPr lang="nb-NO" dirty="0" smtClean="0"/>
+              <a:t> </a:t>
+            </a:r>
+            <a:r>
+              <a:rPr lang="nb-NO" dirty="0" err="1" smtClean="0"/>
+              <a:t>work</a:t>
+            </a:r>
+            <a:endParaRPr lang="nb-NO" dirty="0" smtClean="0"/>
+          </a:p>
+          <a:p>
+            <a:pPr lvl="1"/>
+            <a:r>
+              <a:rPr lang="nb-NO" dirty="0" err="1" smtClean="0"/>
+              <a:t>Code</a:t>
+            </a:r>
+            <a:r>
+              <a:rPr lang="nb-NO" dirty="0" smtClean="0"/>
+              <a:t> </a:t>
+            </a:r>
+            <a:r>
+              <a:rPr lang="nb-NO" dirty="0" err="1" smtClean="0"/>
+              <a:t>blocks</a:t>
+            </a:r>
+            <a:r>
+              <a:rPr lang="nb-NO" dirty="0" smtClean="0"/>
+              <a:t>, Links and </a:t>
+            </a:r>
+            <a:r>
+              <a:rPr lang="nb-NO" dirty="0" err="1" smtClean="0"/>
+              <a:t>Numerical</a:t>
+            </a:r>
+            <a:r>
+              <a:rPr lang="nb-NO" dirty="0" smtClean="0"/>
+              <a:t> as a feature </a:t>
+            </a:r>
+            <a:r>
+              <a:rPr lang="nb-NO" dirty="0" err="1" smtClean="0"/>
+              <a:t>set</a:t>
+            </a:r>
+            <a:endParaRPr lang="nb-NO" dirty="0" smtClean="0"/>
+          </a:p>
+          <a:p>
+            <a:pPr lvl="1"/>
+            <a:r>
+              <a:rPr lang="nb-NO" dirty="0" err="1" smtClean="0"/>
+              <a:t>Code</a:t>
+            </a:r>
+            <a:r>
+              <a:rPr lang="nb-NO" dirty="0" smtClean="0"/>
+              <a:t> </a:t>
+            </a:r>
+            <a:r>
+              <a:rPr lang="nb-NO" dirty="0" err="1" smtClean="0"/>
+              <a:t>analysis</a:t>
+            </a:r>
+            <a:endParaRPr lang="nb-NO" dirty="0" smtClean="0"/>
+          </a:p>
+          <a:p>
+            <a:pPr lvl="1"/>
+            <a:r>
+              <a:rPr lang="nb-NO" dirty="0" err="1" smtClean="0"/>
+              <a:t>Sentiment</a:t>
+            </a:r>
+            <a:r>
+              <a:rPr lang="nb-NO" dirty="0" smtClean="0"/>
+              <a:t> </a:t>
+            </a:r>
+            <a:r>
+              <a:rPr lang="nb-NO" dirty="0" err="1" smtClean="0"/>
+              <a:t>analysis</a:t>
+            </a:r>
+            <a:endParaRPr lang="nb-NO" dirty="0" smtClean="0"/>
+          </a:p>
+          <a:p>
+            <a:pPr lvl="1"/>
+            <a:r>
+              <a:rPr lang="nb-NO" dirty="0" err="1" smtClean="0"/>
+              <a:t>Version</a:t>
+            </a:r>
+            <a:r>
+              <a:rPr lang="nb-NO" dirty="0" smtClean="0"/>
+              <a:t> </a:t>
+            </a:r>
+            <a:r>
+              <a:rPr lang="nb-NO" dirty="0" err="1" smtClean="0"/>
+              <a:t>numbering</a:t>
+            </a:r>
+            <a:endParaRPr lang="nb-NO" dirty="0" smtClean="0"/>
           </a:p>
         </p:txBody>
       </p:sp>
@@ -3803,16 +3795,8 @@
           <a:p>
             <a:pPr algn="ctr"/>
             <a:r>
-              <a:rPr lang="nb-NO" dirty="0" err="1" smtClean="0"/>
-              <a:t>Thanks</a:t>
-            </a:r>
-            <a:r>
-              <a:rPr lang="nb-NO" dirty="0" smtClean="0"/>
-              <a:t> for </a:t>
-            </a:r>
-            <a:r>
-              <a:rPr lang="nb-NO" dirty="0" err="1" smtClean="0"/>
-              <a:t>listening</a:t>
+              <a:rPr lang="nb-NO" dirty="0" smtClean="0"/>
+              <a:t>Demo</a:t>
             </a:r>
             <a:endParaRPr lang="nb-NO" dirty="0"/>
           </a:p>
@@ -3902,6 +3886,117 @@
             <p:ph type="title"/>
           </p:nvPr>
         </p:nvSpPr>
+        <p:spPr>
+          <a:xfrm>
+            <a:off x="457200" y="2022990"/>
+            <a:ext cx="8229600" cy="1143000"/>
+          </a:xfrm>
+        </p:spPr>
+        <p:txBody>
+          <a:bodyPr/>
+          <a:lstStyle/>
+          <a:p>
+            <a:pPr algn="ctr"/>
+            <a:r>
+              <a:rPr lang="nb-NO" dirty="0" err="1" smtClean="0"/>
+              <a:t>Thanks</a:t>
+            </a:r>
+            <a:r>
+              <a:rPr lang="nb-NO" dirty="0" smtClean="0"/>
+              <a:t> for </a:t>
+            </a:r>
+            <a:r>
+              <a:rPr lang="nb-NO" dirty="0" err="1" smtClean="0"/>
+              <a:t>listening</a:t>
+            </a:r>
+            <a:endParaRPr lang="nb-NO" dirty="0"/>
+          </a:p>
+        </p:txBody>
+      </p:sp>
+      <p:sp>
+        <p:nvSpPr>
+          <p:cNvPr id="4" name="TekstSylinder 3"/>
+          <p:cNvSpPr txBox="1"/>
+          <p:nvPr/>
+        </p:nvSpPr>
+        <p:spPr>
+          <a:xfrm rot="16200000">
+            <a:off x="6866691" y="1723023"/>
+            <a:ext cx="3751343" cy="369332"/>
+          </a:xfrm>
+          <a:prstGeom prst="rect">
+            <a:avLst/>
+          </a:prstGeom>
+          <a:noFill/>
+        </p:spPr>
+        <p:txBody>
+          <a:bodyPr wrap="square" rtlCol="0">
+            <a:spAutoFit/>
+          </a:bodyPr>
+          <a:lstStyle/>
+          <a:p>
+            <a:r>
+              <a:rPr lang="nb-NO" spc="100" dirty="0">
+                <a:solidFill>
+                  <a:schemeClr val="bg1">
+                    <a:lumMod val="75000"/>
+                  </a:schemeClr>
+                </a:solidFill>
+                <a:latin typeface="Arial"/>
+                <a:cs typeface="Arial"/>
+              </a:rPr>
+              <a:t>Trondheim – Gjøvik – Ålesund</a:t>
+            </a:r>
+          </a:p>
+        </p:txBody>
+      </p:sp>
+    </p:spTree>
+    <p:extLst>
+      <p:ext uri="{BB962C8B-B14F-4D97-AF65-F5344CB8AC3E}">
+        <p14:creationId xmlns:p14="http://schemas.microsoft.com/office/powerpoint/2010/main" xmlns="" val="314013529"/>
+      </p:ext>
+    </p:extLst>
+  </p:cSld>
+  <p:clrMapOvr>
+    <a:masterClrMapping/>
+  </p:clrMapOvr>
+  <p:timing>
+    <p:tnLst>
+      <p:par>
+        <p:cTn id="1" dur="indefinite" restart="never" nodeType="tmRoot"/>
+      </p:par>
+    </p:tnLst>
+  </p:timing>
+</p:sld>
+</file>
+
+<file path=ppt/slides/slide15.xml><?xml version="1.0" encoding="utf-8"?>
+<p:sld xmlns:a="http://schemas.openxmlformats.org/drawingml/2006/main" xmlns:r="http://schemas.openxmlformats.org/officeDocument/2006/relationships" xmlns:p="http://schemas.openxmlformats.org/presentationml/2006/main">
+  <p:cSld>
+    <p:spTree>
+      <p:nvGrpSpPr>
+        <p:cNvPr id="1" name=""/>
+        <p:cNvGrpSpPr/>
+        <p:nvPr/>
+      </p:nvGrpSpPr>
+      <p:grpSpPr>
+        <a:xfrm>
+          <a:off x="0" y="0"/>
+          <a:ext cx="0" cy="0"/>
+          <a:chOff x="0" y="0"/>
+          <a:chExt cx="0" cy="0"/>
+        </a:xfrm>
+      </p:grpSpPr>
+      <p:sp>
+        <p:nvSpPr>
+          <p:cNvPr id="2" name="Tittel 1"/>
+          <p:cNvSpPr>
+            <a:spLocks noGrp="1"/>
+          </p:cNvSpPr>
+          <p:nvPr>
+            <p:ph type="title"/>
+          </p:nvPr>
+        </p:nvSpPr>
         <p:spPr/>
         <p:txBody>
           <a:bodyPr/>
@@ -3925,7 +4020,12 @@
             <p:ph idx="1"/>
           </p:nvPr>
         </p:nvSpPr>
-        <p:spPr/>
+        <p:spPr>
+          <a:xfrm>
+            <a:off x="457199" y="1600200"/>
+            <a:ext cx="8546123" cy="4525963"/>
+          </a:xfrm>
+        </p:spPr>
         <p:txBody>
           <a:bodyPr/>
           <a:lstStyle/>
@@ -3965,6 +4065,19 @@
                 <a:hlinkClick r:id="rId4"/>
               </a:rPr>
               <a:t>http://stackoverflow.com/help/badges</a:t>
+            </a:r>
+            <a:endParaRPr lang="en-GB" dirty="0" smtClean="0"/>
+          </a:p>
+          <a:p>
+            <a:r>
+              <a:rPr lang="en-GB" dirty="0" smtClean="0"/>
+              <a:t>[4] </a:t>
+            </a:r>
+            <a:r>
+              <a:rPr lang="en-GB" dirty="0" smtClean="0">
+                <a:hlinkClick r:id="rId5"/>
+              </a:rPr>
+              <a:t>http://stackoverflow.com/questions/856307/wordwrap-a-very-long-string</a:t>
             </a:r>
             <a:endParaRPr lang="en-GB" dirty="0" smtClean="0"/>
           </a:p>
@@ -4050,87 +4163,126 @@
           <a:lstStyle/>
           <a:p>
             <a:r>
-              <a:rPr lang="nb-NO" dirty="0" err="1" smtClean="0"/>
+              <a:rPr lang="nb-NO" dirty="0" err="1" smtClean="0">
+                <a:hlinkClick r:id="rId2" action="ppaction://hlinksldjump"/>
+              </a:rPr>
               <a:t>Stack</a:t>
             </a:r>
             <a:r>
-              <a:rPr lang="nb-NO" dirty="0" smtClean="0"/>
+              <a:rPr lang="nb-NO" dirty="0" smtClean="0">
+                <a:hlinkClick r:id="rId2" action="ppaction://hlinksldjump"/>
+              </a:rPr>
               <a:t> </a:t>
             </a:r>
             <a:r>
-              <a:rPr lang="nb-NO" dirty="0" err="1" smtClean="0"/>
+              <a:rPr lang="nb-NO" dirty="0" err="1" smtClean="0">
+                <a:hlinkClick r:id="rId2" action="ppaction://hlinksldjump"/>
+              </a:rPr>
               <a:t>Overflow</a:t>
             </a:r>
             <a:r>
-              <a:rPr lang="nb-NO" dirty="0" smtClean="0"/>
+              <a:rPr lang="nb-NO" dirty="0" smtClean="0">
+                <a:hlinkClick r:id="rId2" action="ppaction://hlinksldjump"/>
+              </a:rPr>
               <a:t> (SO)</a:t>
             </a:r>
-          </a:p>
-          <a:p>
-            <a:r>
-              <a:rPr lang="nb-NO" dirty="0" err="1" smtClean="0"/>
+            <a:endParaRPr lang="nb-NO" dirty="0" smtClean="0"/>
+          </a:p>
+          <a:p>
+            <a:r>
+              <a:rPr lang="nb-NO" dirty="0" err="1" smtClean="0">
+                <a:hlinkClick r:id="rId3" action="ppaction://hlinksldjump"/>
+              </a:rPr>
               <a:t>What</a:t>
             </a:r>
             <a:r>
-              <a:rPr lang="nb-NO" dirty="0" smtClean="0"/>
+              <a:rPr lang="nb-NO" dirty="0" smtClean="0">
+                <a:hlinkClick r:id="rId3" action="ppaction://hlinksldjump"/>
+              </a:rPr>
               <a:t> is a </a:t>
             </a:r>
             <a:r>
-              <a:rPr lang="nb-NO" dirty="0" err="1" smtClean="0"/>
+              <a:rPr lang="nb-NO" dirty="0" err="1" smtClean="0">
+                <a:hlinkClick r:id="rId3" action="ppaction://hlinksldjump"/>
+              </a:rPr>
               <a:t>question</a:t>
             </a:r>
             <a:r>
-              <a:rPr lang="nb-NO" dirty="0" smtClean="0"/>
+              <a:rPr lang="nb-NO" dirty="0" smtClean="0">
+                <a:hlinkClick r:id="rId3" action="ppaction://hlinksldjump"/>
+              </a:rPr>
               <a:t>?</a:t>
             </a:r>
-          </a:p>
-          <a:p>
-            <a:r>
-              <a:rPr lang="nb-NO" dirty="0" smtClean="0"/>
+            <a:endParaRPr lang="nb-NO" dirty="0" smtClean="0"/>
+          </a:p>
+          <a:p>
+            <a:r>
+              <a:rPr lang="nb-NO" dirty="0" smtClean="0">
+                <a:hlinkClick r:id="rId4" action="ppaction://hlinksldjump"/>
+              </a:rPr>
               <a:t>Support </a:t>
             </a:r>
             <a:r>
-              <a:rPr lang="nb-NO" dirty="0" err="1" smtClean="0"/>
+              <a:rPr lang="nb-NO" dirty="0" err="1" smtClean="0">
+                <a:hlinkClick r:id="rId4" action="ppaction://hlinksldjump"/>
+              </a:rPr>
               <a:t>Vector</a:t>
             </a:r>
             <a:r>
-              <a:rPr lang="nb-NO" dirty="0" smtClean="0"/>
+              <a:rPr lang="nb-NO" dirty="0" smtClean="0">
+                <a:hlinkClick r:id="rId4" action="ppaction://hlinksldjump"/>
+              </a:rPr>
               <a:t> </a:t>
             </a:r>
             <a:r>
-              <a:rPr lang="nb-NO" dirty="0" err="1" smtClean="0"/>
+              <a:rPr lang="nb-NO" dirty="0" err="1" smtClean="0">
+                <a:hlinkClick r:id="rId4" action="ppaction://hlinksldjump"/>
+              </a:rPr>
               <a:t>Machine</a:t>
             </a:r>
             <a:r>
-              <a:rPr lang="nb-NO" dirty="0" smtClean="0"/>
+              <a:rPr lang="nb-NO" dirty="0" smtClean="0">
+                <a:hlinkClick r:id="rId4" action="ppaction://hlinksldjump"/>
+              </a:rPr>
               <a:t> (SVM)</a:t>
             </a:r>
-          </a:p>
-          <a:p>
-            <a:r>
-              <a:rPr lang="nb-NO" dirty="0" err="1" smtClean="0"/>
+            <a:endParaRPr lang="nb-NO" dirty="0" smtClean="0"/>
+          </a:p>
+          <a:p>
+            <a:r>
+              <a:rPr lang="nb-NO" dirty="0" err="1" smtClean="0">
+                <a:hlinkClick r:id="rId5" action="ppaction://hlinksldjump"/>
+              </a:rPr>
               <a:t>Methodology</a:t>
             </a:r>
             <a:endParaRPr lang="nb-NO" dirty="0" smtClean="0"/>
           </a:p>
           <a:p>
             <a:r>
-              <a:rPr lang="nb-NO" dirty="0" err="1" smtClean="0"/>
+              <a:rPr lang="nb-NO" dirty="0" err="1" smtClean="0">
+                <a:hlinkClick r:id="rId6" action="ppaction://hlinksldjump"/>
+              </a:rPr>
               <a:t>Experiments</a:t>
             </a:r>
             <a:r>
-              <a:rPr lang="nb-NO" dirty="0" smtClean="0"/>
+              <a:rPr lang="nb-NO" dirty="0" smtClean="0">
+                <a:hlinkClick r:id="rId6" action="ppaction://hlinksldjump"/>
+              </a:rPr>
               <a:t> and </a:t>
             </a:r>
             <a:r>
-              <a:rPr lang="nb-NO" dirty="0" err="1" smtClean="0"/>
+              <a:rPr lang="nb-NO" dirty="0" err="1" smtClean="0">
+                <a:hlinkClick r:id="rId6" action="ppaction://hlinksldjump"/>
+              </a:rPr>
               <a:t>Results</a:t>
             </a:r>
             <a:endParaRPr lang="nb-NO" dirty="0" smtClean="0"/>
           </a:p>
           <a:p>
             <a:r>
-              <a:rPr lang="nb-NO" dirty="0" err="1" smtClean="0"/>
+              <a:rPr lang="nb-NO" dirty="0" err="1" smtClean="0">
+                <a:hlinkClick r:id="rId7" action="ppaction://hlinksldjump"/>
+              </a:rPr>
               <a:t>Summary</a:t>
             </a:r>
             <a:endParaRPr lang="nb-NO" dirty="0" smtClean="0"/>
@@ -4139,6 +4291,14 @@
             <a:r>
               <a:rPr lang="nb-NO" dirty="0" smtClean="0"/>
               <a:t>Demo</a:t>
+            </a:r>
+          </a:p>
+          <a:p>
+            <a:r>
+              <a:rPr lang="nb-NO" dirty="0" err="1" smtClean="0">
+                <a:hlinkClick r:id="rId8" action="ppaction://hlinksldjump"/>
+              </a:rPr>
+              <a:t>References</a:t>
             </a:r>
             <a:endParaRPr lang="nb-NO" dirty="0"/>
           </a:p>
@@ -4647,6 +4807,7 @@
                     <a:lumOff val="50000"/>
                   </a:schemeClr>
                 </a:solidFill>
+                <a:hlinkClick r:id="rId3" action="ppaction://hlinksldjump"/>
               </a:rPr>
               <a:t>[1]</a:t>
             </a:r>
@@ -4747,6 +4908,7 @@
                     <a:lumOff val="50000"/>
                   </a:schemeClr>
                 </a:solidFill>
+                <a:hlinkClick r:id="rId4" action="ppaction://hlinksldjump"/>
               </a:rPr>
               <a:t>[2]</a:t>
             </a:r>
@@ -4847,6 +5009,7 @@
                     <a:lumOff val="50000"/>
                   </a:schemeClr>
                 </a:solidFill>
+                <a:hlinkClick r:id="rId3" action="ppaction://hlinksldjump"/>
               </a:rPr>
               <a:t>[3]</a:t>
             </a:r>

</xml_diff>

<commit_message>
Cleaned up manuscript text
Cleaned up manuscript text, re-written some parts (e.g. Tags paragraph).
Also added rating and cost to the manuscript and to the ppt
</commit_message>
<xml_diff>
--- a/IMT4904_Msc_Presentation.pptx
+++ b/IMT4904_Msc_Presentation.pptx
@@ -10,7 +10,7 @@
   <p:sldIdLst>
     <p:sldId id="256" r:id="rId2"/>
     <p:sldId id="259" r:id="rId3"/>
-    <p:sldId id="263" r:id="rId4"/>
+    <p:sldId id="274" r:id="rId4"/>
     <p:sldId id="269" r:id="rId5"/>
     <p:sldId id="271" r:id="rId6"/>
     <p:sldId id="270" r:id="rId7"/>
@@ -207,7 +207,7 @@
             <a:fld id="{423E070F-056A-EF46-8F28-B603D057C661}" type="datetimeFigureOut">
               <a:rPr lang="nb-NO" smtClean="0"/>
               <a:pPr/>
-              <a:t>05.06.2016</a:t>
+              <a:t>07.06.2016</a:t>
             </a:fld>
             <a:endParaRPr lang="nb-NO"/>
           </a:p>
@@ -376,7 +376,7 @@
     </p:spTree>
     <p:extLst>
       <p:ext uri="{BB962C8B-B14F-4D97-AF65-F5344CB8AC3E}">
-        <p14:creationId xmlns:p14="http://schemas.microsoft.com/office/powerpoint/2010/main" xmlns="" val="3760678024"/>
+        <p14:creationId xmlns="" xmlns:p14="http://schemas.microsoft.com/office/powerpoint/2010/main" val="3760678024"/>
       </p:ext>
     </p:extLst>
   </p:cSld>
@@ -725,7 +725,7 @@
     </p:spTree>
     <p:extLst>
       <p:ext uri="{BB962C8B-B14F-4D97-AF65-F5344CB8AC3E}">
-        <p14:creationId xmlns:p14="http://schemas.microsoft.com/office/powerpoint/2010/main" xmlns="" val="1000159590"/>
+        <p14:creationId xmlns="" xmlns:p14="http://schemas.microsoft.com/office/powerpoint/2010/main" val="1000159590"/>
       </p:ext>
     </p:extLst>
   </p:cSld>
@@ -830,7 +830,7 @@
     </p:spTree>
     <p:extLst>
       <p:ext uri="{BB962C8B-B14F-4D97-AF65-F5344CB8AC3E}">
-        <p14:creationId xmlns:p14="http://schemas.microsoft.com/office/powerpoint/2010/main" xmlns="" val="1983850659"/>
+        <p14:creationId xmlns="" xmlns:p14="http://schemas.microsoft.com/office/powerpoint/2010/main" val="1983850659"/>
       </p:ext>
     </p:extLst>
   </p:cSld>
@@ -945,7 +945,7 @@
     </p:spTree>
     <p:extLst>
       <p:ext uri="{BB962C8B-B14F-4D97-AF65-F5344CB8AC3E}">
-        <p14:creationId xmlns:p14="http://schemas.microsoft.com/office/powerpoint/2010/main" xmlns="" val="3031831969"/>
+        <p14:creationId xmlns="" xmlns:p14="http://schemas.microsoft.com/office/powerpoint/2010/main" val="3031831969"/>
       </p:ext>
     </p:extLst>
   </p:cSld>
@@ -1187,7 +1187,7 @@
     </p:spTree>
     <p:extLst>
       <p:ext uri="{BB962C8B-B14F-4D97-AF65-F5344CB8AC3E}">
-        <p14:creationId xmlns:p14="http://schemas.microsoft.com/office/powerpoint/2010/main" xmlns="" val="2060019826"/>
+        <p14:creationId xmlns="" xmlns:p14="http://schemas.microsoft.com/office/powerpoint/2010/main" val="2060019826"/>
       </p:ext>
     </p:extLst>
   </p:cSld>
@@ -1411,7 +1411,7 @@
     </p:spTree>
     <p:extLst>
       <p:ext uri="{BB962C8B-B14F-4D97-AF65-F5344CB8AC3E}">
-        <p14:creationId xmlns:p14="http://schemas.microsoft.com/office/powerpoint/2010/main" xmlns="" val="2982460490"/>
+        <p14:creationId xmlns="" xmlns:p14="http://schemas.microsoft.com/office/powerpoint/2010/main" val="2982460490"/>
       </p:ext>
     </p:extLst>
   </p:cSld>
@@ -1634,7 +1634,7 @@
     </p:spTree>
     <p:extLst>
       <p:ext uri="{BB962C8B-B14F-4D97-AF65-F5344CB8AC3E}">
-        <p14:creationId xmlns:p14="http://schemas.microsoft.com/office/powerpoint/2010/main" xmlns="" val="1372914248"/>
+        <p14:creationId xmlns="" xmlns:p14="http://schemas.microsoft.com/office/powerpoint/2010/main" val="1372914248"/>
       </p:ext>
     </p:extLst>
   </p:cSld>
@@ -1991,7 +1991,7 @@
     </p:spTree>
     <p:extLst>
       <p:ext uri="{BB962C8B-B14F-4D97-AF65-F5344CB8AC3E}">
-        <p14:creationId xmlns:p14="http://schemas.microsoft.com/office/powerpoint/2010/main" xmlns="" val="702236646"/>
+        <p14:creationId xmlns="" xmlns:p14="http://schemas.microsoft.com/office/powerpoint/2010/main" val="702236646"/>
       </p:ext>
     </p:extLst>
   </p:cSld>
@@ -2044,7 +2044,7 @@
     </p:spTree>
     <p:extLst>
       <p:ext uri="{BB962C8B-B14F-4D97-AF65-F5344CB8AC3E}">
-        <p14:creationId xmlns:p14="http://schemas.microsoft.com/office/powerpoint/2010/main" xmlns="" val="3172249624"/>
+        <p14:creationId xmlns="" xmlns:p14="http://schemas.microsoft.com/office/powerpoint/2010/main" val="3172249624"/>
       </p:ext>
     </p:extLst>
   </p:cSld>
@@ -2074,7 +2074,7 @@
     </p:spTree>
     <p:extLst>
       <p:ext uri="{BB962C8B-B14F-4D97-AF65-F5344CB8AC3E}">
-        <p14:creationId xmlns:p14="http://schemas.microsoft.com/office/powerpoint/2010/main" xmlns="" val="1649718507"/>
+        <p14:creationId xmlns="" xmlns:p14="http://schemas.microsoft.com/office/powerpoint/2010/main" val="1649718507"/>
       </p:ext>
     </p:extLst>
   </p:cSld>
@@ -2286,7 +2286,7 @@
     </p:spTree>
     <p:extLst>
       <p:ext uri="{BB962C8B-B14F-4D97-AF65-F5344CB8AC3E}">
-        <p14:creationId xmlns:p14="http://schemas.microsoft.com/office/powerpoint/2010/main" xmlns="" val="1596486207"/>
+        <p14:creationId xmlns="" xmlns:p14="http://schemas.microsoft.com/office/powerpoint/2010/main" val="1596486207"/>
       </p:ext>
     </p:extLst>
   </p:cSld>
@@ -2474,7 +2474,7 @@
     </p:spTree>
     <p:extLst>
       <p:ext uri="{BB962C8B-B14F-4D97-AF65-F5344CB8AC3E}">
-        <p14:creationId xmlns:p14="http://schemas.microsoft.com/office/powerpoint/2010/main" xmlns="" val="3532236857"/>
+        <p14:creationId xmlns="" xmlns:p14="http://schemas.microsoft.com/office/powerpoint/2010/main" val="3532236857"/>
       </p:ext>
     </p:extLst>
   </p:cSld>
@@ -2613,7 +2613,7 @@
           <a:blip r:embed="rId13">
             <a:extLst>
               <a:ext uri="{28A0092B-C50C-407E-A947-70E740481C1C}">
-                <a14:useLocalDpi xmlns:a14="http://schemas.microsoft.com/office/drawing/2010/main" xmlns="" val="0"/>
+                <a14:useLocalDpi xmlns="" xmlns:a14="http://schemas.microsoft.com/office/drawing/2010/main" val="0"/>
               </a:ext>
             </a:extLst>
           </a:blip>
@@ -2634,7 +2634,7 @@
     </p:spTree>
     <p:extLst>
       <p:ext uri="{BB962C8B-B14F-4D97-AF65-F5344CB8AC3E}">
-        <p14:creationId xmlns:p14="http://schemas.microsoft.com/office/powerpoint/2010/main" xmlns="" val="5777989"/>
+        <p14:creationId xmlns="" xmlns:p14="http://schemas.microsoft.com/office/powerpoint/2010/main" val="5777989"/>
       </p:ext>
     </p:extLst>
   </p:cSld>
@@ -3051,7 +3051,7 @@
     </p:spTree>
     <p:extLst>
       <p:ext uri="{BB962C8B-B14F-4D97-AF65-F5344CB8AC3E}">
-        <p14:creationId xmlns:p14="http://schemas.microsoft.com/office/powerpoint/2010/main" xmlns="" val="3243102052"/>
+        <p14:creationId xmlns="" xmlns:p14="http://schemas.microsoft.com/office/powerpoint/2010/main" val="3243102052"/>
       </p:ext>
     </p:extLst>
   </p:cSld>
@@ -3517,7 +3517,7 @@
     </p:spTree>
     <p:extLst>
       <p:ext uri="{BB962C8B-B14F-4D97-AF65-F5344CB8AC3E}">
-        <p14:creationId xmlns:p14="http://schemas.microsoft.com/office/powerpoint/2010/main" xmlns="" val="314013529"/>
+        <p14:creationId xmlns="" xmlns:p14="http://schemas.microsoft.com/office/powerpoint/2010/main" val="314013529"/>
       </p:ext>
     </p:extLst>
   </p:cSld>
@@ -3739,7 +3739,7 @@
     </p:spTree>
     <p:extLst>
       <p:ext uri="{BB962C8B-B14F-4D97-AF65-F5344CB8AC3E}">
-        <p14:creationId xmlns:p14="http://schemas.microsoft.com/office/powerpoint/2010/main" xmlns="" val="314013529"/>
+        <p14:creationId xmlns="" xmlns:p14="http://schemas.microsoft.com/office/powerpoint/2010/main" val="314013529"/>
       </p:ext>
     </p:extLst>
   </p:cSld>
@@ -3842,7 +3842,7 @@
     </p:spTree>
     <p:extLst>
       <p:ext uri="{BB962C8B-B14F-4D97-AF65-F5344CB8AC3E}">
-        <p14:creationId xmlns:p14="http://schemas.microsoft.com/office/powerpoint/2010/main" xmlns="" val="314013529"/>
+        <p14:creationId xmlns="" xmlns:p14="http://schemas.microsoft.com/office/powerpoint/2010/main" val="314013529"/>
       </p:ext>
     </p:extLst>
   </p:cSld>
@@ -3953,7 +3953,7 @@
     </p:spTree>
     <p:extLst>
       <p:ext uri="{BB962C8B-B14F-4D97-AF65-F5344CB8AC3E}">
-        <p14:creationId xmlns:p14="http://schemas.microsoft.com/office/powerpoint/2010/main" xmlns="" val="314013529"/>
+        <p14:creationId xmlns="" xmlns:p14="http://schemas.microsoft.com/office/powerpoint/2010/main" val="314013529"/>
       </p:ext>
     </p:extLst>
   </p:cSld>
@@ -4077,15 +4077,45 @@
               <a:rPr lang="en-GB" dirty="0" smtClean="0">
                 <a:hlinkClick r:id="rId5"/>
               </a:rPr>
-              <a:t>http://stackoverflow.com/questions/856307/wordwrap-a-very-long-string</a:t>
+              <a:t>http://</a:t>
+            </a:r>
+            <a:r>
+              <a:rPr lang="en-GB" dirty="0" smtClean="0">
+                <a:hlinkClick r:id="rId5"/>
+              </a:rPr>
+              <a:t>stackoverflow.com/questions/856307/wordwrap-a-very-long-string</a:t>
             </a:r>
             <a:endParaRPr lang="en-GB" dirty="0" smtClean="0"/>
           </a:p>
           <a:p>
+            <a:endParaRPr lang="en-GB" dirty="0" smtClean="0"/>
+          </a:p>
+          <a:p>
             <a:r>
               <a:rPr lang="en-GB" dirty="0" smtClean="0"/>
-              <a:t>[X] </a:t>
-            </a:r>
+              <a:t>Amazon </a:t>
+            </a:r>
+            <a:r>
+              <a:rPr lang="en-GB" dirty="0" err="1" smtClean="0"/>
+              <a:t>mTurk</a:t>
+            </a:r>
+            <a:r>
+              <a:rPr lang="en-GB" dirty="0" smtClean="0"/>
+              <a:t>: </a:t>
+            </a:r>
+            <a:r>
+              <a:rPr lang="en-GB" dirty="0" smtClean="0">
+                <a:hlinkClick r:id="rId6"/>
+              </a:rPr>
+              <a:t>https://</a:t>
+            </a:r>
+            <a:r>
+              <a:rPr lang="en-GB" dirty="0" smtClean="0">
+                <a:hlinkClick r:id="rId6"/>
+              </a:rPr>
+              <a:t>www.mturk.com/mturk/welcome</a:t>
+            </a:r>
+            <a:endParaRPr lang="en-GB" dirty="0" smtClean="0"/>
           </a:p>
           <a:p>
             <a:endParaRPr lang="en-GB" dirty="0"/>
@@ -4344,7 +4374,7 @@
     </p:spTree>
     <p:extLst>
       <p:ext uri="{BB962C8B-B14F-4D97-AF65-F5344CB8AC3E}">
-        <p14:creationId xmlns:p14="http://schemas.microsoft.com/office/powerpoint/2010/main" xmlns="" val="314013529"/>
+        <p14:creationId xmlns="" xmlns:p14="http://schemas.microsoft.com/office/powerpoint/2010/main" val="314013529"/>
       </p:ext>
     </p:extLst>
   </p:cSld>
@@ -4390,9 +4420,7 @@
         </p:nvSpPr>
         <p:spPr/>
         <p:txBody>
-          <a:bodyPr>
-            <a:normAutofit/>
-          </a:bodyPr>
+          <a:bodyPr/>
           <a:lstStyle/>
           <a:p>
             <a:r>
@@ -4411,7 +4439,7 @@
               <a:rPr lang="nb-NO" dirty="0" smtClean="0"/>
               <a:t> (SO)</a:t>
             </a:r>
-            <a:endParaRPr lang="nb-NO" dirty="0"/>
+            <a:endParaRPr lang="en-GB" dirty="0"/>
           </a:p>
         </p:txBody>
       </p:sp>
@@ -4425,10 +4453,15 @@
             <p:ph idx="1"/>
           </p:nvPr>
         </p:nvSpPr>
-        <p:spPr/>
+        <p:spPr>
+          <a:xfrm>
+            <a:off x="457200" y="1328904"/>
+            <a:ext cx="8229600" cy="5122138"/>
+          </a:xfrm>
+        </p:spPr>
         <p:txBody>
           <a:bodyPr>
-            <a:normAutofit lnSpcReduction="10000"/>
+            <a:normAutofit fontScale="92500"/>
           </a:bodyPr>
           <a:lstStyle/>
           <a:p>
@@ -4552,50 +4585,49 @@
           <a:p>
             <a:pPr lvl="1"/>
             <a:r>
-              <a:rPr lang="nb-NO" dirty="0" err="1" smtClean="0"/>
+              <a:rPr lang="nb-NO" sz="2400" dirty="0" err="1" smtClean="0"/>
               <a:t>Reputation</a:t>
             </a:r>
-            <a:endParaRPr lang="nb-NO" dirty="0" smtClean="0"/>
+            <a:endParaRPr lang="nb-NO" sz="2400" dirty="0" smtClean="0"/>
           </a:p>
           <a:p>
             <a:pPr lvl="1"/>
             <a:r>
-              <a:rPr lang="nb-NO" dirty="0" err="1" smtClean="0"/>
+              <a:rPr lang="nb-NO" sz="2400" dirty="0" err="1" smtClean="0"/>
               <a:t>Votes</a:t>
             </a:r>
-            <a:endParaRPr lang="nb-NO" dirty="0" smtClean="0"/>
+            <a:endParaRPr lang="nb-NO" sz="2400" dirty="0" smtClean="0"/>
           </a:p>
           <a:p>
             <a:pPr lvl="1"/>
             <a:r>
-              <a:rPr lang="nb-NO" dirty="0" err="1" smtClean="0"/>
+              <a:rPr lang="nb-NO" sz="2400" dirty="0" err="1" smtClean="0"/>
               <a:t>Badges</a:t>
             </a:r>
-            <a:endParaRPr lang="nb-NO" dirty="0" smtClean="0"/>
+            <a:endParaRPr lang="nb-NO" sz="2400" dirty="0" smtClean="0"/>
           </a:p>
           <a:p>
             <a:pPr lvl="1"/>
             <a:r>
-              <a:rPr lang="nb-NO" dirty="0" err="1" smtClean="0"/>
+              <a:rPr lang="nb-NO" sz="2400" dirty="0" err="1" smtClean="0"/>
               <a:t>Accepted</a:t>
             </a:r>
             <a:r>
-              <a:rPr lang="nb-NO" dirty="0" smtClean="0"/>
+              <a:rPr lang="nb-NO" sz="2400" dirty="0" smtClean="0"/>
               <a:t> </a:t>
             </a:r>
             <a:r>
-              <a:rPr lang="nb-NO" dirty="0" err="1" smtClean="0"/>
+              <a:rPr lang="nb-NO" sz="2400" dirty="0" err="1" smtClean="0"/>
               <a:t>answer</a:t>
             </a:r>
-            <a:endParaRPr lang="nb-NO" dirty="0" smtClean="0"/>
+            <a:endParaRPr lang="nb-NO" sz="2400" dirty="0" smtClean="0"/>
           </a:p>
           <a:p>
             <a:pPr lvl="1"/>
             <a:r>
-              <a:rPr lang="nb-NO" smtClean="0"/>
+              <a:rPr lang="nb-NO" sz="2400" dirty="0" smtClean="0"/>
               <a:t>Bounty</a:t>
             </a:r>
-            <a:endParaRPr lang="nb-NO" dirty="0" smtClean="0"/>
           </a:p>
           <a:p>
             <a:r>
@@ -4630,6 +4662,64 @@
           <a:p>
             <a:r>
               <a:rPr lang="nb-NO" dirty="0" err="1" smtClean="0"/>
+              <a:t>Cost</a:t>
+            </a:r>
+            <a:r>
+              <a:rPr lang="nb-NO" dirty="0" smtClean="0"/>
+              <a:t> </a:t>
+            </a:r>
+            <a:r>
+              <a:rPr lang="nb-NO" dirty="0" err="1" smtClean="0"/>
+              <a:t>of</a:t>
+            </a:r>
+            <a:r>
+              <a:rPr lang="nb-NO" dirty="0" smtClean="0"/>
+              <a:t> </a:t>
+            </a:r>
+            <a:r>
+              <a:rPr lang="nb-NO" dirty="0" err="1" smtClean="0"/>
+              <a:t>rating</a:t>
+            </a:r>
+            <a:r>
+              <a:rPr lang="nb-NO" dirty="0" smtClean="0"/>
+              <a:t> </a:t>
+            </a:r>
+            <a:r>
+              <a:rPr lang="nb-NO" dirty="0" err="1" smtClean="0"/>
+              <a:t>answers</a:t>
+            </a:r>
+            <a:r>
+              <a:rPr lang="nb-NO" dirty="0" smtClean="0"/>
+              <a:t> (0.15$ for </a:t>
+            </a:r>
+            <a:r>
+              <a:rPr lang="nb-NO" dirty="0" err="1" smtClean="0"/>
+              <a:t>rating</a:t>
+            </a:r>
+            <a:r>
+              <a:rPr lang="nb-NO" dirty="0" smtClean="0"/>
+              <a:t> </a:t>
+            </a:r>
+            <a:r>
+              <a:rPr lang="nb-NO" dirty="0" err="1" smtClean="0"/>
+              <a:t>on</a:t>
+            </a:r>
+            <a:r>
+              <a:rPr lang="nb-NO" dirty="0" smtClean="0"/>
+              <a:t> Amazon </a:t>
+            </a:r>
+            <a:r>
+              <a:rPr lang="nb-NO" dirty="0" err="1" smtClean="0"/>
+              <a:t>mTurk</a:t>
+            </a:r>
+            <a:r>
+              <a:rPr lang="nb-NO" dirty="0" smtClean="0"/>
+              <a:t>)</a:t>
+            </a:r>
+          </a:p>
+          <a:p>
+            <a:r>
+              <a:rPr lang="nb-NO" dirty="0" err="1" smtClean="0"/>
               <a:t>What</a:t>
             </a:r>
             <a:r>
@@ -4677,11 +4767,14 @@
               <a:t> SO?</a:t>
             </a:r>
           </a:p>
-        </p:txBody>
-      </p:sp>
-      <p:sp>
-        <p:nvSpPr>
-          <p:cNvPr id="4" name="TekstSylinder 3"/>
+          <a:p>
+            <a:endParaRPr lang="en-GB" dirty="0"/>
+          </a:p>
+        </p:txBody>
+      </p:sp>
+      <p:sp>
+        <p:nvSpPr>
+          <p:cNvPr id="5" name="TekstSylinder 4"/>
           <p:cNvSpPr txBox="1"/>
           <p:nvPr/>
         </p:nvSpPr>
@@ -4717,22 +4810,10 @@
         </p:txBody>
       </p:sp>
     </p:spTree>
-    <p:extLst>
-      <p:ext uri="{BB962C8B-B14F-4D97-AF65-F5344CB8AC3E}">
-        <p14:creationId xmlns:p14="http://schemas.microsoft.com/office/powerpoint/2010/main" xmlns="" val="314013529"/>
-      </p:ext>
-    </p:extLst>
   </p:cSld>
   <p:clrMapOvr>
     <a:masterClrMapping/>
   </p:clrMapOvr>
-  <p:timing>
-    <p:tnLst>
-      <p:par>
-        <p:cTn id="1" dur="indefinite" restart="never" nodeType="tmRoot"/>
-      </p:par>
-    </p:tnLst>
-  </p:timing>
 </p:sld>
 </file>
 
@@ -5637,7 +5718,7 @@
     </p:spTree>
     <p:extLst>
       <p:ext uri="{BB962C8B-B14F-4D97-AF65-F5344CB8AC3E}">
-        <p14:creationId xmlns:p14="http://schemas.microsoft.com/office/powerpoint/2010/main" xmlns="" val="314013529"/>
+        <p14:creationId xmlns="" xmlns:p14="http://schemas.microsoft.com/office/powerpoint/2010/main" val="314013529"/>
       </p:ext>
     </p:extLst>
   </p:cSld>

</xml_diff>